<commit_message>
Add Optimization section to slides.
</commit_message>
<xml_diff>
--- a/Hansen - Get Your Optimizer to Give up All Its Secrets.pptx
+++ b/Hansen - Get Your Optimizer to Give up All Its Secrets.pptx
@@ -5,10 +5,10 @@
     <p:sldMasterId id="2147483648" r:id="rId4"/>
   </p:sldMasterIdLst>
   <p:notesMasterIdLst>
-    <p:notesMasterId r:id="rId53"/>
+    <p:notesMasterId r:id="rId61"/>
   </p:notesMasterIdLst>
   <p:handoutMasterIdLst>
-    <p:handoutMasterId r:id="rId54"/>
+    <p:handoutMasterId r:id="rId62"/>
   </p:handoutMasterIdLst>
   <p:sldIdLst>
     <p:sldId id="295" r:id="rId5"/>
@@ -37,33 +37,41 @@
     <p:sldId id="316" r:id="rId28"/>
     <p:sldId id="317" r:id="rId29"/>
     <p:sldId id="318" r:id="rId30"/>
-    <p:sldId id="294" r:id="rId31"/>
-    <p:sldId id="296" r:id="rId32"/>
-    <p:sldId id="261" r:id="rId33"/>
-    <p:sldId id="262" r:id="rId34"/>
-    <p:sldId id="275" r:id="rId35"/>
-    <p:sldId id="288" r:id="rId36"/>
-    <p:sldId id="289" r:id="rId37"/>
-    <p:sldId id="290" r:id="rId38"/>
-    <p:sldId id="265" r:id="rId39"/>
-    <p:sldId id="266" r:id="rId40"/>
-    <p:sldId id="267" r:id="rId41"/>
-    <p:sldId id="268" r:id="rId42"/>
-    <p:sldId id="274" r:id="rId43"/>
-    <p:sldId id="285" r:id="rId44"/>
-    <p:sldId id="292" r:id="rId45"/>
-    <p:sldId id="278" r:id="rId46"/>
-    <p:sldId id="279" r:id="rId47"/>
-    <p:sldId id="280" r:id="rId48"/>
-    <p:sldId id="281" r:id="rId49"/>
-    <p:sldId id="282" r:id="rId50"/>
-    <p:sldId id="291" r:id="rId51"/>
-    <p:sldId id="284" r:id="rId52"/>
+    <p:sldId id="319" r:id="rId31"/>
+    <p:sldId id="320" r:id="rId32"/>
+    <p:sldId id="321" r:id="rId33"/>
+    <p:sldId id="322" r:id="rId34"/>
+    <p:sldId id="323" r:id="rId35"/>
+    <p:sldId id="324" r:id="rId36"/>
+    <p:sldId id="325" r:id="rId37"/>
+    <p:sldId id="326" r:id="rId38"/>
+    <p:sldId id="294" r:id="rId39"/>
+    <p:sldId id="296" r:id="rId40"/>
+    <p:sldId id="261" r:id="rId41"/>
+    <p:sldId id="262" r:id="rId42"/>
+    <p:sldId id="275" r:id="rId43"/>
+    <p:sldId id="288" r:id="rId44"/>
+    <p:sldId id="289" r:id="rId45"/>
+    <p:sldId id="290" r:id="rId46"/>
+    <p:sldId id="265" r:id="rId47"/>
+    <p:sldId id="266" r:id="rId48"/>
+    <p:sldId id="267" r:id="rId49"/>
+    <p:sldId id="268" r:id="rId50"/>
+    <p:sldId id="274" r:id="rId51"/>
+    <p:sldId id="285" r:id="rId52"/>
+    <p:sldId id="292" r:id="rId53"/>
+    <p:sldId id="278" r:id="rId54"/>
+    <p:sldId id="279" r:id="rId55"/>
+    <p:sldId id="280" r:id="rId56"/>
+    <p:sldId id="281" r:id="rId57"/>
+    <p:sldId id="282" r:id="rId58"/>
+    <p:sldId id="291" r:id="rId59"/>
+    <p:sldId id="284" r:id="rId60"/>
   </p:sldIdLst>
   <p:sldSz cx="9144000" cy="5143500" type="screen16x9"/>
   <p:notesSz cx="6858000" cy="9144000"/>
   <p:custDataLst>
-    <p:tags r:id="rId55"/>
+    <p:tags r:id="rId63"/>
   </p:custDataLst>
   <p:defaultTextStyle>
     <a:defPPr>
@@ -191,6 +199,14 @@
             <p14:sldId id="316"/>
             <p14:sldId id="317"/>
             <p14:sldId id="318"/>
+            <p14:sldId id="319"/>
+            <p14:sldId id="320"/>
+            <p14:sldId id="321"/>
+            <p14:sldId id="322"/>
+            <p14:sldId id="323"/>
+            <p14:sldId id="324"/>
+            <p14:sldId id="325"/>
+            <p14:sldId id="326"/>
             <p14:sldId id="294"/>
             <p14:sldId id="296"/>
           </p14:sldIdLst>
@@ -21383,31 +21399,10 @@
       </p:grpSpPr>
       <p:sp>
         <p:nvSpPr>
-          <p:cNvPr id="2" name="Picture Placeholder 1">
-            <a:extLst>
-              <a:ext uri="{FF2B5EF4-FFF2-40B4-BE49-F238E27FC236}">
-                <a16:creationId xmlns:a16="http://schemas.microsoft.com/office/drawing/2014/main" id="{27DAD504-4696-4D55-B492-7ADCD2860673}"/>
-              </a:ext>
-              <a:ext uri="{C183D7F6-B498-43B3-948B-1728B52AA6E4}">
-                <adec:decorative xmlns:adec="http://schemas.microsoft.com/office/drawing/2017/decorative" val="1"/>
-              </a:ext>
-            </a:extLst>
-          </p:cNvPr>
-          <p:cNvSpPr>
-            <a:spLocks noGrp="1"/>
-          </p:cNvSpPr>
-          <p:nvPr>
-            <p:ph type="pic" sz="quarter" idx="10"/>
-          </p:nvPr>
-        </p:nvSpPr>
-        <p:spPr/>
-      </p:sp>
-      <p:sp>
-        <p:nvSpPr>
-          <p:cNvPr id="3" name="Title 2">
-            <a:extLst>
-              <a:ext uri="{FF2B5EF4-FFF2-40B4-BE49-F238E27FC236}">
-                <a16:creationId xmlns:a16="http://schemas.microsoft.com/office/drawing/2014/main" id="{30F34D72-EB09-4D3F-9260-1059E5026D6C}"/>
+          <p:cNvPr id="2" name="Title 1">
+            <a:extLst>
+              <a:ext uri="{FF2B5EF4-FFF2-40B4-BE49-F238E27FC236}">
+                <a16:creationId xmlns:a16="http://schemas.microsoft.com/office/drawing/2014/main" id="{4EE52E64-C7D2-447E-8956-74B3D8BC13F6}"/>
               </a:ext>
             </a:extLst>
           </p:cNvPr>
@@ -21424,18 +21419,18 @@
           <a:lstStyle/>
           <a:p>
             <a:r>
-              <a:rPr lang="en-CA" dirty="0"/>
-              <a:t>Brian Hansen</a:t>
+              <a:rPr lang="en-US" dirty="0"/>
+              <a:t>Logical Plans</a:t>
             </a:r>
           </a:p>
         </p:txBody>
       </p:sp>
       <p:sp>
         <p:nvSpPr>
-          <p:cNvPr id="4" name="Text Placeholder 3">
-            <a:extLst>
-              <a:ext uri="{FF2B5EF4-FFF2-40B4-BE49-F238E27FC236}">
-                <a16:creationId xmlns:a16="http://schemas.microsoft.com/office/drawing/2014/main" id="{FADA50D9-CD2D-4641-9159-9D3C760CFECC}"/>
+          <p:cNvPr id="5" name="Text Placeholder 4">
+            <a:extLst>
+              <a:ext uri="{FF2B5EF4-FFF2-40B4-BE49-F238E27FC236}">
+                <a16:creationId xmlns:a16="http://schemas.microsoft.com/office/drawing/2014/main" id="{FCF38D3C-B5FC-4224-A1B1-76B384587382}"/>
               </a:ext>
             </a:extLst>
           </p:cNvPr>
@@ -21443,154 +21438,94 @@
             <a:spLocks noGrp="1"/>
           </p:cNvSpPr>
           <p:nvPr>
-            <p:ph type="body" sz="quarter" idx="11"/>
+            <p:ph type="body" sz="quarter" idx="22"/>
           </p:nvPr>
         </p:nvSpPr>
         <p:spPr>
           <a:xfrm>
-            <a:off x="337299" y="1256881"/>
-            <a:ext cx="4077744" cy="774700"/>
+            <a:off x="304355" y="1051964"/>
+            <a:ext cx="8481212" cy="3314295"/>
           </a:xfrm>
         </p:spPr>
         <p:txBody>
           <a:bodyPr/>
           <a:lstStyle/>
           <a:p>
-            <a:r>
-              <a:rPr lang="en-CA" dirty="0"/>
-              <a:t>brian@tf3604.com</a:t>
-            </a:r>
-          </a:p>
-          <a:p>
-            <a:r>
-              <a:rPr lang="en-CA" dirty="0"/>
-              <a:t>www.tf3604.com</a:t>
+            <a:pPr marL="571500" indent="-571500">
+              <a:buFont typeface="Arial" panose="020B0604020202020204" pitchFamily="34" charset="0"/>
+              <a:buChar char="•"/>
+            </a:pPr>
+            <a:r>
+              <a:rPr lang="en-US" dirty="0"/>
+              <a:t>Similar to physical execution plans</a:t>
+            </a:r>
+          </a:p>
+          <a:p>
+            <a:pPr marL="571500" indent="-571500">
+              <a:buFont typeface="Arial" panose="020B0604020202020204" pitchFamily="34" charset="0"/>
+              <a:buChar char="•"/>
+            </a:pPr>
+            <a:r>
+              <a:rPr lang="en-US" dirty="0"/>
+              <a:t>Multiple logical plans generated during query optimization</a:t>
+            </a:r>
+          </a:p>
+          <a:p>
+            <a:pPr marL="571500" indent="-571500">
+              <a:buFont typeface="Arial" panose="020B0604020202020204" pitchFamily="34" charset="0"/>
+              <a:buChar char="•"/>
+            </a:pPr>
+            <a:r>
+              <a:rPr lang="en-US" dirty="0"/>
+              <a:t>Have no physical properties, such as</a:t>
+            </a:r>
+          </a:p>
+          <a:p>
+            <a:pPr marL="1033227" lvl="1" indent="-457200">
+              <a:buFont typeface="Arial" panose="020B0604020202020204" pitchFamily="34" charset="0"/>
+              <a:buChar char="•"/>
+            </a:pPr>
+            <a:r>
+              <a:rPr lang="en-US" dirty="0"/>
+              <a:t>Indexes</a:t>
+            </a:r>
+          </a:p>
+          <a:p>
+            <a:pPr marL="1033227" lvl="1" indent="-457200">
+              <a:buFont typeface="Arial" panose="020B0604020202020204" pitchFamily="34" charset="0"/>
+              <a:buChar char="•"/>
+            </a:pPr>
+            <a:r>
+              <a:rPr lang="en-US" dirty="0"/>
+              <a:t>Row counts</a:t>
+            </a:r>
+          </a:p>
+          <a:p>
+            <a:pPr marL="1033227" lvl="1" indent="-457200">
+              <a:buFont typeface="Arial" panose="020B0604020202020204" pitchFamily="34" charset="0"/>
+              <a:buChar char="•"/>
+            </a:pPr>
+            <a:r>
+              <a:rPr lang="en-US" dirty="0"/>
+              <a:t>Keys</a:t>
+            </a:r>
+          </a:p>
+          <a:p>
+            <a:pPr marL="571500" indent="-571500">
+              <a:buFont typeface="Arial" panose="020B0604020202020204" pitchFamily="34" charset="0"/>
+              <a:buChar char="•"/>
+            </a:pPr>
+            <a:r>
+              <a:rPr lang="en-US" dirty="0"/>
+              <a:t>Logical operators only</a:t>
             </a:r>
           </a:p>
         </p:txBody>
       </p:sp>
-      <p:sp>
-        <p:nvSpPr>
-          <p:cNvPr id="5" name="Text Placeholder 4">
-            <a:extLst>
-              <a:ext uri="{FF2B5EF4-FFF2-40B4-BE49-F238E27FC236}">
-                <a16:creationId xmlns:a16="http://schemas.microsoft.com/office/drawing/2014/main" id="{8FC4220A-4283-41AB-9074-319E2CDBE317}"/>
-              </a:ext>
-            </a:extLst>
-          </p:cNvPr>
-          <p:cNvSpPr>
-            <a:spLocks noGrp="1"/>
-          </p:cNvSpPr>
-          <p:nvPr>
-            <p:ph type="body" sz="quarter" idx="12"/>
-          </p:nvPr>
-        </p:nvSpPr>
-        <p:spPr/>
-        <p:txBody>
-          <a:bodyPr/>
-          <a:lstStyle/>
-          <a:p>
-            <a:endParaRPr lang="en-CA" dirty="0"/>
-          </a:p>
-          <a:p>
-            <a:pPr lvl="0"/>
-            <a:r>
-              <a:rPr lang="en-US" dirty="0"/>
-              <a:t>@tf3604</a:t>
-            </a:r>
-          </a:p>
-          <a:p>
-            <a:endParaRPr lang="en-CA" dirty="0"/>
-          </a:p>
-        </p:txBody>
-      </p:sp>
-      <p:sp>
-        <p:nvSpPr>
-          <p:cNvPr id="7" name="Text Placeholder 6">
-            <a:extLst>
-              <a:ext uri="{FF2B5EF4-FFF2-40B4-BE49-F238E27FC236}">
-                <a16:creationId xmlns:a16="http://schemas.microsoft.com/office/drawing/2014/main" id="{206940A9-7384-4B97-8E84-BE8E5B2B51F1}"/>
-              </a:ext>
-            </a:extLst>
-          </p:cNvPr>
-          <p:cNvSpPr>
-            <a:spLocks noGrp="1"/>
-          </p:cNvSpPr>
-          <p:nvPr>
-            <p:ph type="body" sz="quarter" idx="16"/>
-          </p:nvPr>
-        </p:nvSpPr>
-        <p:spPr/>
-        <p:txBody>
-          <a:bodyPr/>
-          <a:lstStyle/>
-          <a:p>
-            <a:endParaRPr lang="en-CA" dirty="0"/>
-          </a:p>
-        </p:txBody>
-      </p:sp>
-      <p:sp>
-        <p:nvSpPr>
-          <p:cNvPr id="6" name="Text Placeholder 5">
-            <a:extLst>
-              <a:ext uri="{FF2B5EF4-FFF2-40B4-BE49-F238E27FC236}">
-                <a16:creationId xmlns:a16="http://schemas.microsoft.com/office/drawing/2014/main" id="{24A7EF43-E019-4D3D-B62A-917851DCEFC5}"/>
-              </a:ext>
-            </a:extLst>
-          </p:cNvPr>
-          <p:cNvSpPr>
-            <a:spLocks noGrp="1"/>
-          </p:cNvSpPr>
-          <p:nvPr>
-            <p:ph type="body" sz="quarter" idx="15"/>
-          </p:nvPr>
-        </p:nvSpPr>
-        <p:spPr/>
-        <p:txBody>
-          <a:bodyPr/>
-          <a:lstStyle/>
-          <a:p>
-            <a:endParaRPr lang="en-CA" dirty="0"/>
-          </a:p>
-        </p:txBody>
-      </p:sp>
-      <p:pic>
-        <p:nvPicPr>
-          <p:cNvPr id="10" name="Picture 9">
-            <a:extLst>
-              <a:ext uri="{FF2B5EF4-FFF2-40B4-BE49-F238E27FC236}">
-                <a16:creationId xmlns:a16="http://schemas.microsoft.com/office/drawing/2014/main" id="{0EBBAD6A-1319-4AAC-8063-348FD93B4877}"/>
-              </a:ext>
-              <a:ext uri="{C183D7F6-B498-43B3-948B-1728B52AA6E4}">
-                <adec:decorative xmlns:adec="http://schemas.microsoft.com/office/drawing/2017/decorative" val="1"/>
-              </a:ext>
-            </a:extLst>
-          </p:cNvPr>
-          <p:cNvPicPr>
-            <a:picLocks noChangeAspect="1"/>
-          </p:cNvPicPr>
-          <p:nvPr/>
-        </p:nvPicPr>
-        <p:blipFill>
-          <a:blip r:embed="rId2"/>
-          <a:stretch>
-            <a:fillRect/>
-          </a:stretch>
-        </p:blipFill>
-        <p:spPr>
-          <a:xfrm>
-            <a:off x="510414" y="2571750"/>
-            <a:ext cx="342900" cy="342900"/>
-          </a:xfrm>
-          <a:prstGeom prst="rect">
-            <a:avLst/>
-          </a:prstGeom>
-        </p:spPr>
-      </p:pic>
     </p:spTree>
     <p:extLst>
       <p:ext uri="{BB962C8B-B14F-4D97-AF65-F5344CB8AC3E}">
-        <p14:creationId xmlns:p14="http://schemas.microsoft.com/office/powerpoint/2010/main" val="3950039542"/>
+        <p14:creationId xmlns:p14="http://schemas.microsoft.com/office/powerpoint/2010/main" val="2008736364"/>
       </p:ext>
     </p:extLst>
   </p:cSld>
@@ -21622,7 +21557,7 @@
           <p:cNvPr id="2" name="Title 1">
             <a:extLst>
               <a:ext uri="{FF2B5EF4-FFF2-40B4-BE49-F238E27FC236}">
-                <a16:creationId xmlns:a16="http://schemas.microsoft.com/office/drawing/2014/main" id="{75411F71-6F32-4042-858E-E14B6BEA1A48}"/>
+                <a16:creationId xmlns:a16="http://schemas.microsoft.com/office/drawing/2014/main" id="{C78F1978-211B-4BE5-A295-1FF0F3546116}"/>
               </a:ext>
             </a:extLst>
           </p:cNvPr>
@@ -21639,42 +21574,8 @@
           <a:lstStyle/>
           <a:p>
             <a:r>
-              <a:rPr lang="en-CA" dirty="0"/>
-              <a:t>Brian Hansen</a:t>
-            </a:r>
-          </a:p>
-        </p:txBody>
-      </p:sp>
-      <p:sp>
-        <p:nvSpPr>
-          <p:cNvPr id="3" name="Text Placeholder 2">
-            <a:extLst>
-              <a:ext uri="{FF2B5EF4-FFF2-40B4-BE49-F238E27FC236}">
-                <a16:creationId xmlns:a16="http://schemas.microsoft.com/office/drawing/2014/main" id="{6CA62344-CDF4-411F-9A64-67A7D654AA97}"/>
-              </a:ext>
-            </a:extLst>
-          </p:cNvPr>
-          <p:cNvSpPr>
-            <a:spLocks noGrp="1"/>
-          </p:cNvSpPr>
-          <p:nvPr>
-            <p:ph type="body" sz="quarter" idx="13"/>
-          </p:nvPr>
-        </p:nvSpPr>
-        <p:spPr/>
-        <p:txBody>
-          <a:bodyPr/>
-          <a:lstStyle/>
-          <a:p>
-            <a:r>
               <a:rPr lang="en-US" dirty="0"/>
-              <a:t>@tf3604</a:t>
-            </a:r>
-          </a:p>
-          <a:p>
-            <a:r>
-              <a:rPr lang="en-US" dirty="0"/>
-              <a:t>brian@tf3604.com</a:t>
+              <a:t>Displaying query trees</a:t>
             </a:r>
           </a:p>
         </p:txBody>
@@ -21682,7 +21583,7 @@
     </p:spTree>
     <p:extLst>
       <p:ext uri="{BB962C8B-B14F-4D97-AF65-F5344CB8AC3E}">
-        <p14:creationId xmlns:p14="http://schemas.microsoft.com/office/powerpoint/2010/main" val="3380234151"/>
+        <p14:creationId xmlns:p14="http://schemas.microsoft.com/office/powerpoint/2010/main" val="2691691089"/>
       </p:ext>
     </p:extLst>
   </p:cSld>
@@ -21711,10 +21612,10 @@
       </p:grpSpPr>
       <p:sp>
         <p:nvSpPr>
-          <p:cNvPr id="2" name="Title 1">
-            <a:extLst>
-              <a:ext uri="{FF2B5EF4-FFF2-40B4-BE49-F238E27FC236}">
-                <a16:creationId xmlns:a16="http://schemas.microsoft.com/office/drawing/2014/main" id="{85239CF5-D7FE-43AA-B0E2-34186B0CDBAE}"/>
+          <p:cNvPr id="2" name="Text Placeholder 1">
+            <a:extLst>
+              <a:ext uri="{FF2B5EF4-FFF2-40B4-BE49-F238E27FC236}">
+                <a16:creationId xmlns:a16="http://schemas.microsoft.com/office/drawing/2014/main" id="{443C73E3-42C3-4FD3-B9BF-7C522D837E74}"/>
               </a:ext>
             </a:extLst>
           </p:cNvPr>
@@ -21722,7 +21623,7 @@
             <a:spLocks noGrp="1"/>
           </p:cNvSpPr>
           <p:nvPr>
-            <p:ph type="title"/>
+            <p:ph type="body" sz="quarter" idx="10"/>
           </p:nvPr>
         </p:nvSpPr>
         <p:spPr/>
@@ -21731,8 +21632,8 @@
           <a:lstStyle/>
           <a:p>
             <a:r>
-              <a:rPr lang="en-CA" dirty="0"/>
-              <a:t>Palette</a:t>
+              <a:rPr lang="en-US" dirty="0"/>
+              <a:t>Optimization</a:t>
             </a:r>
           </a:p>
         </p:txBody>
@@ -21740,7 +21641,7 @@
     </p:spTree>
     <p:extLst>
       <p:ext uri="{BB962C8B-B14F-4D97-AF65-F5344CB8AC3E}">
-        <p14:creationId xmlns:p14="http://schemas.microsoft.com/office/powerpoint/2010/main" val="3502767713"/>
+        <p14:creationId xmlns:p14="http://schemas.microsoft.com/office/powerpoint/2010/main" val="367369108"/>
       </p:ext>
     </p:extLst>
   </p:cSld>
@@ -21799,6 +21700,1376 @@
       </p:grpSpPr>
       <p:sp>
         <p:nvSpPr>
+          <p:cNvPr id="4" name="Title 3">
+            <a:extLst>
+              <a:ext uri="{FF2B5EF4-FFF2-40B4-BE49-F238E27FC236}">
+                <a16:creationId xmlns:a16="http://schemas.microsoft.com/office/drawing/2014/main" id="{12480C5A-6E68-4CBB-8B2D-B6B5EF4F52DF}"/>
+              </a:ext>
+            </a:extLst>
+          </p:cNvPr>
+          <p:cNvSpPr>
+            <a:spLocks noGrp="1"/>
+          </p:cNvSpPr>
+          <p:nvPr>
+            <p:ph type="title"/>
+          </p:nvPr>
+        </p:nvSpPr>
+        <p:spPr/>
+        <p:txBody>
+          <a:bodyPr/>
+          <a:lstStyle/>
+          <a:p>
+            <a:r>
+              <a:rPr lang="en-US" dirty="0"/>
+              <a:t>Optimization</a:t>
+            </a:r>
+          </a:p>
+        </p:txBody>
+      </p:sp>
+      <p:sp>
+        <p:nvSpPr>
+          <p:cNvPr id="6" name="Text Placeholder 5">
+            <a:extLst>
+              <a:ext uri="{FF2B5EF4-FFF2-40B4-BE49-F238E27FC236}">
+                <a16:creationId xmlns:a16="http://schemas.microsoft.com/office/drawing/2014/main" id="{713B4703-FE51-4D36-B024-C614BDD80DF8}"/>
+              </a:ext>
+            </a:extLst>
+          </p:cNvPr>
+          <p:cNvSpPr>
+            <a:spLocks noGrp="1"/>
+          </p:cNvSpPr>
+          <p:nvPr>
+            <p:ph type="body" sz="quarter" idx="27"/>
+          </p:nvPr>
+        </p:nvSpPr>
+        <p:spPr>
+          <a:xfrm>
+            <a:off x="331394" y="1630681"/>
+            <a:ext cx="8326831" cy="415596"/>
+          </a:xfrm>
+        </p:spPr>
+        <p:txBody>
+          <a:bodyPr/>
+          <a:lstStyle/>
+          <a:p>
+            <a:r>
+              <a:rPr lang="en-US" dirty="0"/>
+              <a:t>Standardize queries, remove redundancies</a:t>
+            </a:r>
+          </a:p>
+          <a:p>
+            <a:endParaRPr lang="en-US" dirty="0"/>
+          </a:p>
+        </p:txBody>
+      </p:sp>
+      <p:sp>
+        <p:nvSpPr>
+          <p:cNvPr id="7" name="Text Placeholder 6">
+            <a:extLst>
+              <a:ext uri="{FF2B5EF4-FFF2-40B4-BE49-F238E27FC236}">
+                <a16:creationId xmlns:a16="http://schemas.microsoft.com/office/drawing/2014/main" id="{127D1CCB-F7A5-4667-987E-0E55F19D082B}"/>
+              </a:ext>
+            </a:extLst>
+          </p:cNvPr>
+          <p:cNvSpPr>
+            <a:spLocks noGrp="1"/>
+          </p:cNvSpPr>
+          <p:nvPr>
+            <p:ph type="body" sz="quarter" idx="28"/>
+          </p:nvPr>
+        </p:nvSpPr>
+        <p:spPr>
+          <a:xfrm>
+            <a:off x="312745" y="2168230"/>
+            <a:ext cx="3949862" cy="1866788"/>
+          </a:xfrm>
+        </p:spPr>
+        <p:txBody>
+          <a:bodyPr/>
+          <a:lstStyle/>
+          <a:p>
+            <a:r>
+              <a:rPr lang="en-US" dirty="0"/>
+              <a:t>Subqueries to joins</a:t>
+            </a:r>
+          </a:p>
+          <a:p>
+            <a:r>
+              <a:rPr lang="en-US" dirty="0"/>
+              <a:t>Predicate pushdown</a:t>
+            </a:r>
+          </a:p>
+          <a:p>
+            <a:r>
+              <a:rPr lang="en-US" dirty="0"/>
+              <a:t>Foreign key table removal</a:t>
+            </a:r>
+          </a:p>
+        </p:txBody>
+      </p:sp>
+      <p:sp>
+        <p:nvSpPr>
+          <p:cNvPr id="8" name="Text Placeholder 7">
+            <a:extLst>
+              <a:ext uri="{FF2B5EF4-FFF2-40B4-BE49-F238E27FC236}">
+                <a16:creationId xmlns:a16="http://schemas.microsoft.com/office/drawing/2014/main" id="{9389D8E6-F5CA-47DC-AA21-0C599CA0EB21}"/>
+              </a:ext>
+            </a:extLst>
+          </p:cNvPr>
+          <p:cNvSpPr>
+            <a:spLocks noGrp="1"/>
+          </p:cNvSpPr>
+          <p:nvPr>
+            <p:ph type="body" sz="quarter" idx="29"/>
+          </p:nvPr>
+        </p:nvSpPr>
+        <p:spPr>
+          <a:xfrm>
+            <a:off x="4708576" y="2168230"/>
+            <a:ext cx="3949862" cy="1866788"/>
+          </a:xfrm>
+        </p:spPr>
+        <p:txBody>
+          <a:bodyPr/>
+          <a:lstStyle/>
+          <a:p>
+            <a:pPr>
+              <a:buFont typeface="Arial" panose="020B0604020202020204" pitchFamily="34" charset="0"/>
+              <a:buChar char="•"/>
+            </a:pPr>
+            <a:r>
+              <a:rPr lang="en-US" sz="2400" dirty="0"/>
+              <a:t>Contradiction detection</a:t>
+            </a:r>
+          </a:p>
+          <a:p>
+            <a:pPr>
+              <a:buFont typeface="Arial" panose="020B0604020202020204" pitchFamily="34" charset="0"/>
+              <a:buChar char="•"/>
+            </a:pPr>
+            <a:r>
+              <a:rPr lang="en-US" sz="2400" dirty="0"/>
+              <a:t>Aggregates on unique keys</a:t>
+            </a:r>
+          </a:p>
+          <a:p>
+            <a:pPr>
+              <a:buFont typeface="Arial" panose="020B0604020202020204" pitchFamily="34" charset="0"/>
+              <a:buChar char="•"/>
+            </a:pPr>
+            <a:r>
+              <a:rPr lang="en-US" sz="2400" dirty="0"/>
+              <a:t>Convert outer join to inner</a:t>
+            </a:r>
+          </a:p>
+        </p:txBody>
+      </p:sp>
+      <p:sp>
+        <p:nvSpPr>
+          <p:cNvPr id="9" name="Text Placeholder 3">
+            <a:extLst>
+              <a:ext uri="{FF2B5EF4-FFF2-40B4-BE49-F238E27FC236}">
+                <a16:creationId xmlns:a16="http://schemas.microsoft.com/office/drawing/2014/main" id="{F765EE15-C1B5-43BF-8C86-7821665312A3}"/>
+              </a:ext>
+            </a:extLst>
+          </p:cNvPr>
+          <p:cNvSpPr txBox="1">
+            <a:spLocks/>
+          </p:cNvSpPr>
+          <p:nvPr/>
+        </p:nvSpPr>
+        <p:spPr>
+          <a:xfrm>
+            <a:off x="331394" y="1118204"/>
+            <a:ext cx="8481211" cy="390525"/>
+          </a:xfrm>
+          <a:prstGeom prst="rect">
+            <a:avLst/>
+          </a:prstGeom>
+        </p:spPr>
+        <p:txBody>
+          <a:bodyPr/>
+          <a:lstStyle>
+            <a:lvl1pPr marL="0" indent="0" algn="l" defTabSz="914400" rtl="0" eaLnBrk="1" latinLnBrk="0" hangingPunct="1">
+              <a:spcBef>
+                <a:spcPct val="20000"/>
+              </a:spcBef>
+              <a:buClr>
+                <a:schemeClr val="accent3"/>
+              </a:buClr>
+              <a:buFont typeface="Arial"/>
+              <a:buNone/>
+              <a:defRPr sz="2400" b="1" i="0" kern="1200">
+                <a:solidFill>
+                  <a:srgbClr val="C00000"/>
+                </a:solidFill>
+                <a:latin typeface="Segoe UI Semibold" panose="020B0502040204020203" pitchFamily="34" charset="0"/>
+                <a:ea typeface="+mn-ea"/>
+                <a:cs typeface="Segoe UI Semibold" panose="020B0502040204020203" pitchFamily="34" charset="0"/>
+              </a:defRPr>
+            </a:lvl1pPr>
+            <a:lvl2pPr marL="342900" indent="-342900" algn="l" defTabSz="914400" rtl="0" eaLnBrk="1" latinLnBrk="0" hangingPunct="1">
+              <a:spcBef>
+                <a:spcPct val="20000"/>
+              </a:spcBef>
+              <a:buClr>
+                <a:schemeClr val="accent3"/>
+              </a:buClr>
+              <a:buFont typeface="Arial"/>
+              <a:buChar char="•"/>
+              <a:defRPr lang="en-US" sz="2000" b="0" i="0" kern="1200" dirty="0" smtClean="0">
+                <a:solidFill>
+                  <a:schemeClr val="tx1"/>
+                </a:solidFill>
+                <a:latin typeface="Segoe UI Semilight" panose="020B0402040204020203" pitchFamily="34" charset="0"/>
+                <a:ea typeface="+mn-ea"/>
+                <a:cs typeface="Segoe UI Semilight" panose="020B0402040204020203" pitchFamily="34" charset="0"/>
+              </a:defRPr>
+            </a:lvl2pPr>
+            <a:lvl3pPr marL="638175" indent="-342900" algn="l" defTabSz="914400" rtl="0" eaLnBrk="1" latinLnBrk="0" hangingPunct="1">
+              <a:spcBef>
+                <a:spcPct val="20000"/>
+              </a:spcBef>
+              <a:buClr>
+                <a:schemeClr val="accent3"/>
+              </a:buClr>
+              <a:buFont typeface="Arial"/>
+              <a:buChar char="•"/>
+              <a:defRPr lang="en-US" sz="1800" b="0" i="0" kern="1200" dirty="0" smtClean="0">
+                <a:solidFill>
+                  <a:schemeClr val="tx1"/>
+                </a:solidFill>
+                <a:latin typeface="Segoe UI Semilight" panose="020B0402040204020203" pitchFamily="34" charset="0"/>
+                <a:ea typeface="+mn-ea"/>
+                <a:cs typeface="Segoe UI Semilight" panose="020B0402040204020203" pitchFamily="34" charset="0"/>
+              </a:defRPr>
+            </a:lvl3pPr>
+            <a:lvl4pPr marL="922338" indent="-342900" algn="l" defTabSz="914400" rtl="0" eaLnBrk="1" latinLnBrk="0" hangingPunct="1">
+              <a:spcBef>
+                <a:spcPct val="20000"/>
+              </a:spcBef>
+              <a:buClr>
+                <a:schemeClr val="accent3"/>
+              </a:buClr>
+              <a:buFont typeface="Arial"/>
+              <a:buChar char="•"/>
+              <a:defRPr lang="en-US" sz="1800" b="0" i="0" kern="1200" dirty="0" smtClean="0">
+                <a:solidFill>
+                  <a:schemeClr val="tx1"/>
+                </a:solidFill>
+                <a:latin typeface="Segoe UI Semilight" panose="020B0402040204020203" pitchFamily="34" charset="0"/>
+                <a:ea typeface="+mn-ea"/>
+                <a:cs typeface="Segoe UI Semilight" panose="020B0402040204020203" pitchFamily="34" charset="0"/>
+              </a:defRPr>
+            </a:lvl4pPr>
+            <a:lvl5pPr marL="1189038" indent="-342900" algn="l" defTabSz="914400" rtl="0" eaLnBrk="1" latinLnBrk="0" hangingPunct="1">
+              <a:spcBef>
+                <a:spcPct val="20000"/>
+              </a:spcBef>
+              <a:buClr>
+                <a:schemeClr val="accent3"/>
+              </a:buClr>
+              <a:buFont typeface="Arial"/>
+              <a:buChar char="•"/>
+              <a:defRPr lang="en-US" sz="1800" b="0" i="0" kern="1200" dirty="0">
+                <a:solidFill>
+                  <a:schemeClr val="tx1"/>
+                </a:solidFill>
+                <a:latin typeface="Segoe UI Semilight" panose="020B0402040204020203" pitchFamily="34" charset="0"/>
+                <a:ea typeface="+mn-ea"/>
+                <a:cs typeface="Segoe UI Semilight" panose="020B0402040204020203" pitchFamily="34" charset="0"/>
+              </a:defRPr>
+            </a:lvl5pPr>
+            <a:lvl6pPr marL="2514600" indent="-228600" algn="l" defTabSz="914400" rtl="0" eaLnBrk="1" latinLnBrk="0" hangingPunct="1">
+              <a:spcBef>
+                <a:spcPct val="20000"/>
+              </a:spcBef>
+              <a:buFont typeface="Arial" pitchFamily="34" charset="0"/>
+              <a:buChar char="•"/>
+              <a:defRPr sz="2000" kern="1200">
+                <a:solidFill>
+                  <a:schemeClr val="tx1"/>
+                </a:solidFill>
+                <a:latin typeface="+mn-lt"/>
+                <a:ea typeface="+mn-ea"/>
+                <a:cs typeface="+mn-cs"/>
+              </a:defRPr>
+            </a:lvl6pPr>
+            <a:lvl7pPr marL="2971800" indent="-228600" algn="l" defTabSz="914400" rtl="0" eaLnBrk="1" latinLnBrk="0" hangingPunct="1">
+              <a:spcBef>
+                <a:spcPct val="20000"/>
+              </a:spcBef>
+              <a:buFont typeface="Arial" pitchFamily="34" charset="0"/>
+              <a:buChar char="•"/>
+              <a:defRPr sz="2000" kern="1200">
+                <a:solidFill>
+                  <a:schemeClr val="tx1"/>
+                </a:solidFill>
+                <a:latin typeface="+mn-lt"/>
+                <a:ea typeface="+mn-ea"/>
+                <a:cs typeface="+mn-cs"/>
+              </a:defRPr>
+            </a:lvl7pPr>
+            <a:lvl8pPr marL="3429000" indent="-228600" algn="l" defTabSz="914400" rtl="0" eaLnBrk="1" latinLnBrk="0" hangingPunct="1">
+              <a:spcBef>
+                <a:spcPct val="20000"/>
+              </a:spcBef>
+              <a:buFont typeface="Arial" pitchFamily="34" charset="0"/>
+              <a:buChar char="•"/>
+              <a:defRPr sz="2000" kern="1200">
+                <a:solidFill>
+                  <a:schemeClr val="tx1"/>
+                </a:solidFill>
+                <a:latin typeface="+mn-lt"/>
+                <a:ea typeface="+mn-ea"/>
+                <a:cs typeface="+mn-cs"/>
+              </a:defRPr>
+            </a:lvl8pPr>
+            <a:lvl9pPr marL="3886200" indent="-228600" algn="l" defTabSz="914400" rtl="0" eaLnBrk="1" latinLnBrk="0" hangingPunct="1">
+              <a:spcBef>
+                <a:spcPct val="20000"/>
+              </a:spcBef>
+              <a:buFont typeface="Arial" pitchFamily="34" charset="0"/>
+              <a:buChar char="•"/>
+              <a:defRPr sz="2000" kern="1200">
+                <a:solidFill>
+                  <a:schemeClr val="tx1"/>
+                </a:solidFill>
+                <a:latin typeface="+mn-lt"/>
+                <a:ea typeface="+mn-ea"/>
+                <a:cs typeface="+mn-cs"/>
+              </a:defRPr>
+            </a:lvl9pPr>
+          </a:lstStyle>
+          <a:p>
+            <a:r>
+              <a:rPr lang="en-US" dirty="0"/>
+              <a:t>Simplification (heuristic rewrites, not cost-based)</a:t>
+            </a:r>
+          </a:p>
+          <a:p>
+            <a:endParaRPr lang="en-US" dirty="0"/>
+          </a:p>
+        </p:txBody>
+      </p:sp>
+    </p:spTree>
+    <p:extLst>
+      <p:ext uri="{BB962C8B-B14F-4D97-AF65-F5344CB8AC3E}">
+        <p14:creationId xmlns:p14="http://schemas.microsoft.com/office/powerpoint/2010/main" val="3407997305"/>
+      </p:ext>
+    </p:extLst>
+  </p:cSld>
+  <p:clrMapOvr>
+    <a:masterClrMapping/>
+  </p:clrMapOvr>
+</p:sld>
+</file>
+
+<file path=ppt/slides/slide31.xml><?xml version="1.0" encoding="utf-8"?>
+<p:sld xmlns:a="http://schemas.openxmlformats.org/drawingml/2006/main" xmlns:r="http://schemas.openxmlformats.org/officeDocument/2006/relationships" xmlns:p="http://schemas.openxmlformats.org/presentationml/2006/main">
+  <p:cSld>
+    <p:spTree>
+      <p:nvGrpSpPr>
+        <p:cNvPr id="1" name=""/>
+        <p:cNvGrpSpPr/>
+        <p:nvPr/>
+      </p:nvGrpSpPr>
+      <p:grpSpPr>
+        <a:xfrm>
+          <a:off x="0" y="0"/>
+          <a:ext cx="0" cy="0"/>
+          <a:chOff x="0" y="0"/>
+          <a:chExt cx="0" cy="0"/>
+        </a:xfrm>
+      </p:grpSpPr>
+      <p:sp>
+        <p:nvSpPr>
+          <p:cNvPr id="2" name="Title 1">
+            <a:extLst>
+              <a:ext uri="{FF2B5EF4-FFF2-40B4-BE49-F238E27FC236}">
+                <a16:creationId xmlns:a16="http://schemas.microsoft.com/office/drawing/2014/main" id="{4EE52E64-C7D2-447E-8956-74B3D8BC13F6}"/>
+              </a:ext>
+            </a:extLst>
+          </p:cNvPr>
+          <p:cNvSpPr>
+            <a:spLocks noGrp="1"/>
+          </p:cNvSpPr>
+          <p:nvPr>
+            <p:ph type="title"/>
+          </p:nvPr>
+        </p:nvSpPr>
+        <p:spPr/>
+        <p:txBody>
+          <a:bodyPr/>
+          <a:lstStyle/>
+          <a:p>
+            <a:r>
+              <a:rPr lang="en-US" dirty="0"/>
+              <a:t>Optimization</a:t>
+            </a:r>
+          </a:p>
+        </p:txBody>
+      </p:sp>
+      <p:sp>
+        <p:nvSpPr>
+          <p:cNvPr id="4" name="Text Placeholder 3">
+            <a:extLst>
+              <a:ext uri="{FF2B5EF4-FFF2-40B4-BE49-F238E27FC236}">
+                <a16:creationId xmlns:a16="http://schemas.microsoft.com/office/drawing/2014/main" id="{3ED082BD-F0CD-4BBF-8F16-7FE68CCBEE55}"/>
+              </a:ext>
+            </a:extLst>
+          </p:cNvPr>
+          <p:cNvSpPr>
+            <a:spLocks noGrp="1"/>
+          </p:cNvSpPr>
+          <p:nvPr>
+            <p:ph type="body" sz="quarter" idx="10"/>
+          </p:nvPr>
+        </p:nvSpPr>
+        <p:spPr>
+          <a:xfrm>
+            <a:off x="331394" y="1118204"/>
+            <a:ext cx="8481211" cy="390525"/>
+          </a:xfrm>
+        </p:spPr>
+        <p:txBody>
+          <a:bodyPr/>
+          <a:lstStyle/>
+          <a:p>
+            <a:r>
+              <a:rPr lang="en-US" dirty="0"/>
+              <a:t>Retrieve statistics; do cardinality estimation</a:t>
+            </a:r>
+          </a:p>
+        </p:txBody>
+      </p:sp>
+      <p:sp>
+        <p:nvSpPr>
+          <p:cNvPr id="5" name="Text Placeholder 4">
+            <a:extLst>
+              <a:ext uri="{FF2B5EF4-FFF2-40B4-BE49-F238E27FC236}">
+                <a16:creationId xmlns:a16="http://schemas.microsoft.com/office/drawing/2014/main" id="{FCF38D3C-B5FC-4224-A1B1-76B384587382}"/>
+              </a:ext>
+            </a:extLst>
+          </p:cNvPr>
+          <p:cNvSpPr>
+            <a:spLocks noGrp="1"/>
+          </p:cNvSpPr>
+          <p:nvPr>
+            <p:ph type="body" sz="quarter" idx="22"/>
+          </p:nvPr>
+        </p:nvSpPr>
+        <p:spPr>
+          <a:xfrm>
+            <a:off x="304355" y="1574969"/>
+            <a:ext cx="8481212" cy="2567374"/>
+          </a:xfrm>
+        </p:spPr>
+        <p:txBody>
+          <a:bodyPr/>
+          <a:lstStyle/>
+          <a:p>
+            <a:pPr marL="457200" lvl="1" indent="-457200">
+              <a:buFont typeface="Arial" panose="020B0604020202020204" pitchFamily="34" charset="0"/>
+              <a:buChar char="•"/>
+            </a:pPr>
+            <a:r>
+              <a:rPr lang="en-US" sz="2400" dirty="0"/>
+              <a:t>Create / update auto stats</a:t>
+            </a:r>
+          </a:p>
+          <a:p>
+            <a:pPr marL="457200" lvl="1" indent="-457200">
+              <a:buFont typeface="Arial" panose="020B0604020202020204" pitchFamily="34" charset="0"/>
+              <a:buChar char="•"/>
+            </a:pPr>
+            <a:r>
+              <a:rPr lang="en-US" sz="2400" dirty="0"/>
+              <a:t>SQL Server 7 vs 2014+ CE engine</a:t>
+            </a:r>
+          </a:p>
+          <a:p>
+            <a:pPr marL="457200" lvl="1" indent="-457200">
+              <a:buFont typeface="Arial" panose="020B0604020202020204" pitchFamily="34" charset="0"/>
+              <a:buChar char="•"/>
+            </a:pPr>
+            <a:r>
+              <a:rPr lang="en-US" sz="2400" dirty="0"/>
+              <a:t>Other physical properties (keys, nullability, constraints)</a:t>
+            </a:r>
+          </a:p>
+        </p:txBody>
+      </p:sp>
+    </p:spTree>
+    <p:extLst>
+      <p:ext uri="{BB962C8B-B14F-4D97-AF65-F5344CB8AC3E}">
+        <p14:creationId xmlns:p14="http://schemas.microsoft.com/office/powerpoint/2010/main" val="2227645001"/>
+      </p:ext>
+    </p:extLst>
+  </p:cSld>
+  <p:clrMapOvr>
+    <a:masterClrMapping/>
+  </p:clrMapOvr>
+</p:sld>
+</file>
+
+<file path=ppt/slides/slide32.xml><?xml version="1.0" encoding="utf-8"?>
+<p:sld xmlns:a="http://schemas.openxmlformats.org/drawingml/2006/main" xmlns:r="http://schemas.openxmlformats.org/officeDocument/2006/relationships" xmlns:p="http://schemas.openxmlformats.org/presentationml/2006/main">
+  <p:cSld>
+    <p:spTree>
+      <p:nvGrpSpPr>
+        <p:cNvPr id="1" name=""/>
+        <p:cNvGrpSpPr/>
+        <p:nvPr/>
+      </p:nvGrpSpPr>
+      <p:grpSpPr>
+        <a:xfrm>
+          <a:off x="0" y="0"/>
+          <a:ext cx="0" cy="0"/>
+          <a:chOff x="0" y="0"/>
+          <a:chExt cx="0" cy="0"/>
+        </a:xfrm>
+      </p:grpSpPr>
+      <p:sp>
+        <p:nvSpPr>
+          <p:cNvPr id="2" name="Title 1">
+            <a:extLst>
+              <a:ext uri="{FF2B5EF4-FFF2-40B4-BE49-F238E27FC236}">
+                <a16:creationId xmlns:a16="http://schemas.microsoft.com/office/drawing/2014/main" id="{4EE52E64-C7D2-447E-8956-74B3D8BC13F6}"/>
+              </a:ext>
+            </a:extLst>
+          </p:cNvPr>
+          <p:cNvSpPr>
+            <a:spLocks noGrp="1"/>
+          </p:cNvSpPr>
+          <p:nvPr>
+            <p:ph type="title"/>
+          </p:nvPr>
+        </p:nvSpPr>
+        <p:spPr/>
+        <p:txBody>
+          <a:bodyPr/>
+          <a:lstStyle/>
+          <a:p>
+            <a:r>
+              <a:rPr lang="en-US" dirty="0"/>
+              <a:t>Optimization</a:t>
+            </a:r>
+          </a:p>
+        </p:txBody>
+      </p:sp>
+      <p:sp>
+        <p:nvSpPr>
+          <p:cNvPr id="4" name="Text Placeholder 3">
+            <a:extLst>
+              <a:ext uri="{FF2B5EF4-FFF2-40B4-BE49-F238E27FC236}">
+                <a16:creationId xmlns:a16="http://schemas.microsoft.com/office/drawing/2014/main" id="{3ED082BD-F0CD-4BBF-8F16-7FE68CCBEE55}"/>
+              </a:ext>
+            </a:extLst>
+          </p:cNvPr>
+          <p:cNvSpPr>
+            <a:spLocks noGrp="1"/>
+          </p:cNvSpPr>
+          <p:nvPr>
+            <p:ph type="body" sz="quarter" idx="10"/>
+          </p:nvPr>
+        </p:nvSpPr>
+        <p:spPr>
+          <a:xfrm>
+            <a:off x="331394" y="1118204"/>
+            <a:ext cx="8481211" cy="390525"/>
+          </a:xfrm>
+        </p:spPr>
+        <p:txBody>
+          <a:bodyPr/>
+          <a:lstStyle/>
+          <a:p>
+            <a:r>
+              <a:rPr lang="en-US" dirty="0"/>
+              <a:t>Trivial plan</a:t>
+            </a:r>
+          </a:p>
+        </p:txBody>
+      </p:sp>
+      <p:sp>
+        <p:nvSpPr>
+          <p:cNvPr id="5" name="Text Placeholder 4">
+            <a:extLst>
+              <a:ext uri="{FF2B5EF4-FFF2-40B4-BE49-F238E27FC236}">
+                <a16:creationId xmlns:a16="http://schemas.microsoft.com/office/drawing/2014/main" id="{FCF38D3C-B5FC-4224-A1B1-76B384587382}"/>
+              </a:ext>
+            </a:extLst>
+          </p:cNvPr>
+          <p:cNvSpPr>
+            <a:spLocks noGrp="1"/>
+          </p:cNvSpPr>
+          <p:nvPr>
+            <p:ph type="body" sz="quarter" idx="22"/>
+          </p:nvPr>
+        </p:nvSpPr>
+        <p:spPr>
+          <a:xfrm>
+            <a:off x="304355" y="1574969"/>
+            <a:ext cx="8481212" cy="2567374"/>
+          </a:xfrm>
+        </p:spPr>
+        <p:txBody>
+          <a:bodyPr/>
+          <a:lstStyle/>
+          <a:p>
+            <a:pPr marL="457200" lvl="1" indent="-457200">
+              <a:buFont typeface="Arial" panose="020B0604020202020204" pitchFamily="34" charset="0"/>
+              <a:buChar char="•"/>
+            </a:pPr>
+            <a:r>
+              <a:rPr lang="en-US" sz="2400" dirty="0"/>
+              <a:t>Only one possible way to execute query</a:t>
+            </a:r>
+          </a:p>
+        </p:txBody>
+      </p:sp>
+    </p:spTree>
+    <p:extLst>
+      <p:ext uri="{BB962C8B-B14F-4D97-AF65-F5344CB8AC3E}">
+        <p14:creationId xmlns:p14="http://schemas.microsoft.com/office/powerpoint/2010/main" val="3500258253"/>
+      </p:ext>
+    </p:extLst>
+  </p:cSld>
+  <p:clrMapOvr>
+    <a:masterClrMapping/>
+  </p:clrMapOvr>
+</p:sld>
+</file>
+
+<file path=ppt/slides/slide33.xml><?xml version="1.0" encoding="utf-8"?>
+<p:sld xmlns:a="http://schemas.openxmlformats.org/drawingml/2006/main" xmlns:r="http://schemas.openxmlformats.org/officeDocument/2006/relationships" xmlns:p="http://schemas.openxmlformats.org/presentationml/2006/main">
+  <p:cSld>
+    <p:spTree>
+      <p:nvGrpSpPr>
+        <p:cNvPr id="1" name=""/>
+        <p:cNvGrpSpPr/>
+        <p:nvPr/>
+      </p:nvGrpSpPr>
+      <p:grpSpPr>
+        <a:xfrm>
+          <a:off x="0" y="0"/>
+          <a:ext cx="0" cy="0"/>
+          <a:chOff x="0" y="0"/>
+          <a:chExt cx="0" cy="0"/>
+        </a:xfrm>
+      </p:grpSpPr>
+      <p:sp>
+        <p:nvSpPr>
+          <p:cNvPr id="2" name="Title 1">
+            <a:extLst>
+              <a:ext uri="{FF2B5EF4-FFF2-40B4-BE49-F238E27FC236}">
+                <a16:creationId xmlns:a16="http://schemas.microsoft.com/office/drawing/2014/main" id="{4EE52E64-C7D2-447E-8956-74B3D8BC13F6}"/>
+              </a:ext>
+            </a:extLst>
+          </p:cNvPr>
+          <p:cNvSpPr>
+            <a:spLocks noGrp="1"/>
+          </p:cNvSpPr>
+          <p:nvPr>
+            <p:ph type="title"/>
+          </p:nvPr>
+        </p:nvSpPr>
+        <p:spPr/>
+        <p:txBody>
+          <a:bodyPr/>
+          <a:lstStyle/>
+          <a:p>
+            <a:r>
+              <a:rPr lang="en-US" dirty="0"/>
+              <a:t>Optimization</a:t>
+            </a:r>
+          </a:p>
+        </p:txBody>
+      </p:sp>
+      <p:sp>
+        <p:nvSpPr>
+          <p:cNvPr id="4" name="Text Placeholder 3">
+            <a:extLst>
+              <a:ext uri="{FF2B5EF4-FFF2-40B4-BE49-F238E27FC236}">
+                <a16:creationId xmlns:a16="http://schemas.microsoft.com/office/drawing/2014/main" id="{3ED082BD-F0CD-4BBF-8F16-7FE68CCBEE55}"/>
+              </a:ext>
+            </a:extLst>
+          </p:cNvPr>
+          <p:cNvSpPr>
+            <a:spLocks noGrp="1"/>
+          </p:cNvSpPr>
+          <p:nvPr>
+            <p:ph type="body" sz="quarter" idx="10"/>
+          </p:nvPr>
+        </p:nvSpPr>
+        <p:spPr>
+          <a:xfrm>
+            <a:off x="331394" y="1118204"/>
+            <a:ext cx="8481211" cy="390525"/>
+          </a:xfrm>
+        </p:spPr>
+        <p:txBody>
+          <a:bodyPr/>
+          <a:lstStyle/>
+          <a:p>
+            <a:r>
+              <a:rPr lang="en-US" dirty="0"/>
+              <a:t>Search phases 0 through 2</a:t>
+            </a:r>
+          </a:p>
+        </p:txBody>
+      </p:sp>
+      <p:sp>
+        <p:nvSpPr>
+          <p:cNvPr id="5" name="Text Placeholder 4">
+            <a:extLst>
+              <a:ext uri="{FF2B5EF4-FFF2-40B4-BE49-F238E27FC236}">
+                <a16:creationId xmlns:a16="http://schemas.microsoft.com/office/drawing/2014/main" id="{FCF38D3C-B5FC-4224-A1B1-76B384587382}"/>
+              </a:ext>
+            </a:extLst>
+          </p:cNvPr>
+          <p:cNvSpPr>
+            <a:spLocks noGrp="1"/>
+          </p:cNvSpPr>
+          <p:nvPr>
+            <p:ph type="body" sz="quarter" idx="22"/>
+          </p:nvPr>
+        </p:nvSpPr>
+        <p:spPr>
+          <a:xfrm>
+            <a:off x="304355" y="1574969"/>
+            <a:ext cx="8481212" cy="2567374"/>
+          </a:xfrm>
+        </p:spPr>
+        <p:txBody>
+          <a:bodyPr/>
+          <a:lstStyle/>
+          <a:p>
+            <a:pPr lvl="1">
+              <a:buFont typeface="Arial" panose="020B0604020202020204" pitchFamily="34" charset="0"/>
+              <a:buChar char="•"/>
+            </a:pPr>
+            <a:r>
+              <a:rPr lang="en-US" sz="2400" dirty="0"/>
+              <a:t>Search 0: “Transaction Processing”</a:t>
+            </a:r>
+          </a:p>
+          <a:p>
+            <a:pPr marL="627063" lvl="3">
+              <a:buFont typeface="Arial" panose="020B0604020202020204" pitchFamily="34" charset="0"/>
+              <a:buChar char="•"/>
+            </a:pPr>
+            <a:r>
+              <a:rPr lang="en-US" sz="2000" dirty="0"/>
+              <a:t>Simple, basic tests; internal cost threshold</a:t>
+            </a:r>
+          </a:p>
+          <a:p>
+            <a:pPr lvl="1">
+              <a:buFont typeface="Arial" panose="020B0604020202020204" pitchFamily="34" charset="0"/>
+              <a:buChar char="•"/>
+            </a:pPr>
+            <a:r>
+              <a:rPr lang="en-US" sz="2400" dirty="0"/>
+              <a:t>Search 1: “Quick Plan”</a:t>
+            </a:r>
+          </a:p>
+          <a:p>
+            <a:pPr marL="627063" lvl="3">
+              <a:buFont typeface="Arial" panose="020B0604020202020204" pitchFamily="34" charset="0"/>
+              <a:buChar char="•"/>
+            </a:pPr>
+            <a:r>
+              <a:rPr lang="en-US" sz="2000" dirty="0"/>
+              <a:t>More rules, parallel exploration; internal cost threshold</a:t>
+            </a:r>
+          </a:p>
+          <a:p>
+            <a:pPr lvl="1">
+              <a:buFont typeface="Arial" panose="020B0604020202020204" pitchFamily="34" charset="0"/>
+              <a:buChar char="•"/>
+            </a:pPr>
+            <a:r>
+              <a:rPr lang="en-US" sz="2400" dirty="0"/>
+              <a:t>Search 2: “Full Optimization”</a:t>
+            </a:r>
+          </a:p>
+          <a:p>
+            <a:pPr marL="627063" lvl="3">
+              <a:buFont typeface="Arial" panose="020B0604020202020204" pitchFamily="34" charset="0"/>
+              <a:buChar char="•"/>
+            </a:pPr>
+            <a:r>
+              <a:rPr lang="en-US" sz="2000" dirty="0"/>
+              <a:t>Full set of rules; usually exits on timeout</a:t>
+            </a:r>
+          </a:p>
+          <a:p>
+            <a:pPr marL="627063" lvl="3">
+              <a:buFont typeface="Arial" panose="020B0604020202020204" pitchFamily="34" charset="0"/>
+              <a:buChar char="•"/>
+            </a:pPr>
+            <a:r>
+              <a:rPr lang="en-US" sz="2000" dirty="0"/>
+              <a:t>Extensive use of heuristics to prune search space</a:t>
+            </a:r>
+            <a:endParaRPr lang="en-US" sz="2400" dirty="0"/>
+          </a:p>
+        </p:txBody>
+      </p:sp>
+    </p:spTree>
+    <p:extLst>
+      <p:ext uri="{BB962C8B-B14F-4D97-AF65-F5344CB8AC3E}">
+        <p14:creationId xmlns:p14="http://schemas.microsoft.com/office/powerpoint/2010/main" val="3627743797"/>
+      </p:ext>
+    </p:extLst>
+  </p:cSld>
+  <p:clrMapOvr>
+    <a:masterClrMapping/>
+  </p:clrMapOvr>
+</p:sld>
+</file>
+
+<file path=ppt/slides/slide34.xml><?xml version="1.0" encoding="utf-8"?>
+<p:sld xmlns:a="http://schemas.openxmlformats.org/drawingml/2006/main" xmlns:r="http://schemas.openxmlformats.org/officeDocument/2006/relationships" xmlns:p="http://schemas.openxmlformats.org/presentationml/2006/main">
+  <p:cSld>
+    <p:spTree>
+      <p:nvGrpSpPr>
+        <p:cNvPr id="1" name=""/>
+        <p:cNvGrpSpPr/>
+        <p:nvPr/>
+      </p:nvGrpSpPr>
+      <p:grpSpPr>
+        <a:xfrm>
+          <a:off x="0" y="0"/>
+          <a:ext cx="0" cy="0"/>
+          <a:chOff x="0" y="0"/>
+          <a:chExt cx="0" cy="0"/>
+        </a:xfrm>
+      </p:grpSpPr>
+      <p:sp>
+        <p:nvSpPr>
+          <p:cNvPr id="2" name="Title 1">
+            <a:extLst>
+              <a:ext uri="{FF2B5EF4-FFF2-40B4-BE49-F238E27FC236}">
+                <a16:creationId xmlns:a16="http://schemas.microsoft.com/office/drawing/2014/main" id="{4EE52E64-C7D2-447E-8956-74B3D8BC13F6}"/>
+              </a:ext>
+            </a:extLst>
+          </p:cNvPr>
+          <p:cNvSpPr>
+            <a:spLocks noGrp="1"/>
+          </p:cNvSpPr>
+          <p:nvPr>
+            <p:ph type="title"/>
+          </p:nvPr>
+        </p:nvSpPr>
+        <p:spPr/>
+        <p:txBody>
+          <a:bodyPr/>
+          <a:lstStyle/>
+          <a:p>
+            <a:r>
+              <a:rPr lang="en-US" dirty="0"/>
+              <a:t>Optimization</a:t>
+            </a:r>
+          </a:p>
+        </p:txBody>
+      </p:sp>
+      <p:sp>
+        <p:nvSpPr>
+          <p:cNvPr id="4" name="Text Placeholder 3">
+            <a:extLst>
+              <a:ext uri="{FF2B5EF4-FFF2-40B4-BE49-F238E27FC236}">
+                <a16:creationId xmlns:a16="http://schemas.microsoft.com/office/drawing/2014/main" id="{3ED082BD-F0CD-4BBF-8F16-7FE68CCBEE55}"/>
+              </a:ext>
+            </a:extLst>
+          </p:cNvPr>
+          <p:cNvSpPr>
+            <a:spLocks noGrp="1"/>
+          </p:cNvSpPr>
+          <p:nvPr>
+            <p:ph type="body" sz="quarter" idx="10"/>
+          </p:nvPr>
+        </p:nvSpPr>
+        <p:spPr>
+          <a:xfrm>
+            <a:off x="331394" y="1118204"/>
+            <a:ext cx="8481211" cy="390525"/>
+          </a:xfrm>
+        </p:spPr>
+        <p:txBody>
+          <a:bodyPr/>
+          <a:lstStyle/>
+          <a:p>
+            <a:endParaRPr lang="en-US" dirty="0"/>
+          </a:p>
+        </p:txBody>
+      </p:sp>
+      <p:sp>
+        <p:nvSpPr>
+          <p:cNvPr id="5" name="Text Placeholder 4">
+            <a:extLst>
+              <a:ext uri="{FF2B5EF4-FFF2-40B4-BE49-F238E27FC236}">
+                <a16:creationId xmlns:a16="http://schemas.microsoft.com/office/drawing/2014/main" id="{FCF38D3C-B5FC-4224-A1B1-76B384587382}"/>
+              </a:ext>
+            </a:extLst>
+          </p:cNvPr>
+          <p:cNvSpPr>
+            <a:spLocks noGrp="1"/>
+          </p:cNvSpPr>
+          <p:nvPr>
+            <p:ph type="body" sz="quarter" idx="22"/>
+          </p:nvPr>
+        </p:nvSpPr>
+        <p:spPr>
+          <a:xfrm>
+            <a:off x="304355" y="1574969"/>
+            <a:ext cx="8481212" cy="2567374"/>
+          </a:xfrm>
+        </p:spPr>
+        <p:txBody>
+          <a:bodyPr/>
+          <a:lstStyle/>
+          <a:p>
+            <a:pPr marL="571500" indent="-571500">
+              <a:buFont typeface="Arial" panose="020B0604020202020204" pitchFamily="34" charset="0"/>
+              <a:buChar char="•"/>
+            </a:pPr>
+            <a:r>
+              <a:rPr lang="en-US" dirty="0"/>
+              <a:t>Construct execution plan</a:t>
+            </a:r>
+          </a:p>
+          <a:p>
+            <a:pPr marL="571500" indent="-571500">
+              <a:buFont typeface="Arial" panose="020B0604020202020204" pitchFamily="34" charset="0"/>
+              <a:buChar char="•"/>
+            </a:pPr>
+            <a:r>
+              <a:rPr lang="en-US" dirty="0"/>
+              <a:t>Plan caching (query text hash, set options)</a:t>
+            </a:r>
+          </a:p>
+        </p:txBody>
+      </p:sp>
+    </p:spTree>
+    <p:extLst>
+      <p:ext uri="{BB962C8B-B14F-4D97-AF65-F5344CB8AC3E}">
+        <p14:creationId xmlns:p14="http://schemas.microsoft.com/office/powerpoint/2010/main" val="2240830210"/>
+      </p:ext>
+    </p:extLst>
+  </p:cSld>
+  <p:clrMapOvr>
+    <a:masterClrMapping/>
+  </p:clrMapOvr>
+</p:sld>
+</file>
+
+<file path=ppt/slides/slide35.xml><?xml version="1.0" encoding="utf-8"?>
+<p:sld xmlns:a="http://schemas.openxmlformats.org/drawingml/2006/main" xmlns:r="http://schemas.openxmlformats.org/officeDocument/2006/relationships" xmlns:p="http://schemas.openxmlformats.org/presentationml/2006/main">
+  <p:cSld>
+    <p:spTree>
+      <p:nvGrpSpPr>
+        <p:cNvPr id="1" name=""/>
+        <p:cNvGrpSpPr/>
+        <p:nvPr/>
+      </p:nvGrpSpPr>
+      <p:grpSpPr>
+        <a:xfrm>
+          <a:off x="0" y="0"/>
+          <a:ext cx="0" cy="0"/>
+          <a:chOff x="0" y="0"/>
+          <a:chExt cx="0" cy="0"/>
+        </a:xfrm>
+      </p:grpSpPr>
+      <p:sp>
+        <p:nvSpPr>
+          <p:cNvPr id="2" name="Picture Placeholder 1">
+            <a:extLst>
+              <a:ext uri="{FF2B5EF4-FFF2-40B4-BE49-F238E27FC236}">
+                <a16:creationId xmlns:a16="http://schemas.microsoft.com/office/drawing/2014/main" id="{27DAD504-4696-4D55-B492-7ADCD2860673}"/>
+              </a:ext>
+              <a:ext uri="{C183D7F6-B498-43B3-948B-1728B52AA6E4}">
+                <adec:decorative xmlns:adec="http://schemas.microsoft.com/office/drawing/2017/decorative" val="1"/>
+              </a:ext>
+            </a:extLst>
+          </p:cNvPr>
+          <p:cNvSpPr>
+            <a:spLocks noGrp="1"/>
+          </p:cNvSpPr>
+          <p:nvPr>
+            <p:ph type="pic" sz="quarter" idx="10"/>
+          </p:nvPr>
+        </p:nvSpPr>
+        <p:spPr/>
+      </p:sp>
+      <p:sp>
+        <p:nvSpPr>
+          <p:cNvPr id="3" name="Title 2">
+            <a:extLst>
+              <a:ext uri="{FF2B5EF4-FFF2-40B4-BE49-F238E27FC236}">
+                <a16:creationId xmlns:a16="http://schemas.microsoft.com/office/drawing/2014/main" id="{30F34D72-EB09-4D3F-9260-1059E5026D6C}"/>
+              </a:ext>
+            </a:extLst>
+          </p:cNvPr>
+          <p:cNvSpPr>
+            <a:spLocks noGrp="1"/>
+          </p:cNvSpPr>
+          <p:nvPr>
+            <p:ph type="title"/>
+          </p:nvPr>
+        </p:nvSpPr>
+        <p:spPr/>
+        <p:txBody>
+          <a:bodyPr/>
+          <a:lstStyle/>
+          <a:p>
+            <a:r>
+              <a:rPr lang="en-CA" dirty="0"/>
+              <a:t>Brian Hansen</a:t>
+            </a:r>
+          </a:p>
+        </p:txBody>
+      </p:sp>
+      <p:sp>
+        <p:nvSpPr>
+          <p:cNvPr id="4" name="Text Placeholder 3">
+            <a:extLst>
+              <a:ext uri="{FF2B5EF4-FFF2-40B4-BE49-F238E27FC236}">
+                <a16:creationId xmlns:a16="http://schemas.microsoft.com/office/drawing/2014/main" id="{FADA50D9-CD2D-4641-9159-9D3C760CFECC}"/>
+              </a:ext>
+            </a:extLst>
+          </p:cNvPr>
+          <p:cNvSpPr>
+            <a:spLocks noGrp="1"/>
+          </p:cNvSpPr>
+          <p:nvPr>
+            <p:ph type="body" sz="quarter" idx="11"/>
+          </p:nvPr>
+        </p:nvSpPr>
+        <p:spPr>
+          <a:xfrm>
+            <a:off x="337299" y="1256881"/>
+            <a:ext cx="4077744" cy="774700"/>
+          </a:xfrm>
+        </p:spPr>
+        <p:txBody>
+          <a:bodyPr/>
+          <a:lstStyle/>
+          <a:p>
+            <a:r>
+              <a:rPr lang="en-CA" dirty="0"/>
+              <a:t>brian@tf3604.com</a:t>
+            </a:r>
+          </a:p>
+          <a:p>
+            <a:r>
+              <a:rPr lang="en-CA" dirty="0"/>
+              <a:t>www.tf3604.com</a:t>
+            </a:r>
+          </a:p>
+        </p:txBody>
+      </p:sp>
+      <p:sp>
+        <p:nvSpPr>
+          <p:cNvPr id="5" name="Text Placeholder 4">
+            <a:extLst>
+              <a:ext uri="{FF2B5EF4-FFF2-40B4-BE49-F238E27FC236}">
+                <a16:creationId xmlns:a16="http://schemas.microsoft.com/office/drawing/2014/main" id="{8FC4220A-4283-41AB-9074-319E2CDBE317}"/>
+              </a:ext>
+            </a:extLst>
+          </p:cNvPr>
+          <p:cNvSpPr>
+            <a:spLocks noGrp="1"/>
+          </p:cNvSpPr>
+          <p:nvPr>
+            <p:ph type="body" sz="quarter" idx="12"/>
+          </p:nvPr>
+        </p:nvSpPr>
+        <p:spPr/>
+        <p:txBody>
+          <a:bodyPr/>
+          <a:lstStyle/>
+          <a:p>
+            <a:endParaRPr lang="en-CA" dirty="0"/>
+          </a:p>
+          <a:p>
+            <a:pPr lvl="0"/>
+            <a:r>
+              <a:rPr lang="en-US" dirty="0"/>
+              <a:t>@tf3604</a:t>
+            </a:r>
+          </a:p>
+          <a:p>
+            <a:endParaRPr lang="en-CA" dirty="0"/>
+          </a:p>
+        </p:txBody>
+      </p:sp>
+      <p:sp>
+        <p:nvSpPr>
+          <p:cNvPr id="7" name="Text Placeholder 6">
+            <a:extLst>
+              <a:ext uri="{FF2B5EF4-FFF2-40B4-BE49-F238E27FC236}">
+                <a16:creationId xmlns:a16="http://schemas.microsoft.com/office/drawing/2014/main" id="{206940A9-7384-4B97-8E84-BE8E5B2B51F1}"/>
+              </a:ext>
+            </a:extLst>
+          </p:cNvPr>
+          <p:cNvSpPr>
+            <a:spLocks noGrp="1"/>
+          </p:cNvSpPr>
+          <p:nvPr>
+            <p:ph type="body" sz="quarter" idx="16"/>
+          </p:nvPr>
+        </p:nvSpPr>
+        <p:spPr/>
+        <p:txBody>
+          <a:bodyPr/>
+          <a:lstStyle/>
+          <a:p>
+            <a:endParaRPr lang="en-CA" dirty="0"/>
+          </a:p>
+        </p:txBody>
+      </p:sp>
+      <p:sp>
+        <p:nvSpPr>
+          <p:cNvPr id="6" name="Text Placeholder 5">
+            <a:extLst>
+              <a:ext uri="{FF2B5EF4-FFF2-40B4-BE49-F238E27FC236}">
+                <a16:creationId xmlns:a16="http://schemas.microsoft.com/office/drawing/2014/main" id="{24A7EF43-E019-4D3D-B62A-917851DCEFC5}"/>
+              </a:ext>
+            </a:extLst>
+          </p:cNvPr>
+          <p:cNvSpPr>
+            <a:spLocks noGrp="1"/>
+          </p:cNvSpPr>
+          <p:nvPr>
+            <p:ph type="body" sz="quarter" idx="15"/>
+          </p:nvPr>
+        </p:nvSpPr>
+        <p:spPr/>
+        <p:txBody>
+          <a:bodyPr/>
+          <a:lstStyle/>
+          <a:p>
+            <a:endParaRPr lang="en-CA" dirty="0"/>
+          </a:p>
+        </p:txBody>
+      </p:sp>
+      <p:pic>
+        <p:nvPicPr>
+          <p:cNvPr id="10" name="Picture 9">
+            <a:extLst>
+              <a:ext uri="{FF2B5EF4-FFF2-40B4-BE49-F238E27FC236}">
+                <a16:creationId xmlns:a16="http://schemas.microsoft.com/office/drawing/2014/main" id="{0EBBAD6A-1319-4AAC-8063-348FD93B4877}"/>
+              </a:ext>
+              <a:ext uri="{C183D7F6-B498-43B3-948B-1728B52AA6E4}">
+                <adec:decorative xmlns:adec="http://schemas.microsoft.com/office/drawing/2017/decorative" val="1"/>
+              </a:ext>
+            </a:extLst>
+          </p:cNvPr>
+          <p:cNvPicPr>
+            <a:picLocks noChangeAspect="1"/>
+          </p:cNvPicPr>
+          <p:nvPr/>
+        </p:nvPicPr>
+        <p:blipFill>
+          <a:blip r:embed="rId2"/>
+          <a:stretch>
+            <a:fillRect/>
+          </a:stretch>
+        </p:blipFill>
+        <p:spPr>
+          <a:xfrm>
+            <a:off x="510414" y="2571750"/>
+            <a:ext cx="342900" cy="342900"/>
+          </a:xfrm>
+          <a:prstGeom prst="rect">
+            <a:avLst/>
+          </a:prstGeom>
+        </p:spPr>
+      </p:pic>
+    </p:spTree>
+    <p:extLst>
+      <p:ext uri="{BB962C8B-B14F-4D97-AF65-F5344CB8AC3E}">
+        <p14:creationId xmlns:p14="http://schemas.microsoft.com/office/powerpoint/2010/main" val="3950039542"/>
+      </p:ext>
+    </p:extLst>
+  </p:cSld>
+  <p:clrMapOvr>
+    <a:masterClrMapping/>
+  </p:clrMapOvr>
+</p:sld>
+</file>
+
+<file path=ppt/slides/slide36.xml><?xml version="1.0" encoding="utf-8"?>
+<p:sld xmlns:a="http://schemas.openxmlformats.org/drawingml/2006/main" xmlns:r="http://schemas.openxmlformats.org/officeDocument/2006/relationships" xmlns:p="http://schemas.openxmlformats.org/presentationml/2006/main">
+  <p:cSld>
+    <p:spTree>
+      <p:nvGrpSpPr>
+        <p:cNvPr id="1" name=""/>
+        <p:cNvGrpSpPr/>
+        <p:nvPr/>
+      </p:nvGrpSpPr>
+      <p:grpSpPr>
+        <a:xfrm>
+          <a:off x="0" y="0"/>
+          <a:ext cx="0" cy="0"/>
+          <a:chOff x="0" y="0"/>
+          <a:chExt cx="0" cy="0"/>
+        </a:xfrm>
+      </p:grpSpPr>
+      <p:sp>
+        <p:nvSpPr>
+          <p:cNvPr id="2" name="Title 1">
+            <a:extLst>
+              <a:ext uri="{FF2B5EF4-FFF2-40B4-BE49-F238E27FC236}">
+                <a16:creationId xmlns:a16="http://schemas.microsoft.com/office/drawing/2014/main" id="{75411F71-6F32-4042-858E-E14B6BEA1A48}"/>
+              </a:ext>
+            </a:extLst>
+          </p:cNvPr>
+          <p:cNvSpPr>
+            <a:spLocks noGrp="1"/>
+          </p:cNvSpPr>
+          <p:nvPr>
+            <p:ph type="title"/>
+          </p:nvPr>
+        </p:nvSpPr>
+        <p:spPr/>
+        <p:txBody>
+          <a:bodyPr/>
+          <a:lstStyle/>
+          <a:p>
+            <a:r>
+              <a:rPr lang="en-CA" dirty="0"/>
+              <a:t>Brian Hansen</a:t>
+            </a:r>
+          </a:p>
+        </p:txBody>
+      </p:sp>
+      <p:sp>
+        <p:nvSpPr>
+          <p:cNvPr id="3" name="Text Placeholder 2">
+            <a:extLst>
+              <a:ext uri="{FF2B5EF4-FFF2-40B4-BE49-F238E27FC236}">
+                <a16:creationId xmlns:a16="http://schemas.microsoft.com/office/drawing/2014/main" id="{6CA62344-CDF4-411F-9A64-67A7D654AA97}"/>
+              </a:ext>
+            </a:extLst>
+          </p:cNvPr>
+          <p:cNvSpPr>
+            <a:spLocks noGrp="1"/>
+          </p:cNvSpPr>
+          <p:nvPr>
+            <p:ph type="body" sz="quarter" idx="13"/>
+          </p:nvPr>
+        </p:nvSpPr>
+        <p:spPr/>
+        <p:txBody>
+          <a:bodyPr/>
+          <a:lstStyle/>
+          <a:p>
+            <a:r>
+              <a:rPr lang="en-US" dirty="0"/>
+              <a:t>@tf3604</a:t>
+            </a:r>
+          </a:p>
+          <a:p>
+            <a:r>
+              <a:rPr lang="en-US" dirty="0"/>
+              <a:t>brian@tf3604.com</a:t>
+            </a:r>
+          </a:p>
+        </p:txBody>
+      </p:sp>
+    </p:spTree>
+    <p:extLst>
+      <p:ext uri="{BB962C8B-B14F-4D97-AF65-F5344CB8AC3E}">
+        <p14:creationId xmlns:p14="http://schemas.microsoft.com/office/powerpoint/2010/main" val="3380234151"/>
+      </p:ext>
+    </p:extLst>
+  </p:cSld>
+  <p:clrMapOvr>
+    <a:masterClrMapping/>
+  </p:clrMapOvr>
+</p:sld>
+</file>
+
+<file path=ppt/slides/slide37.xml><?xml version="1.0" encoding="utf-8"?>
+<p:sld xmlns:a="http://schemas.openxmlformats.org/drawingml/2006/main" xmlns:r="http://schemas.openxmlformats.org/officeDocument/2006/relationships" xmlns:p="http://schemas.openxmlformats.org/presentationml/2006/main">
+  <p:cSld>
+    <p:spTree>
+      <p:nvGrpSpPr>
+        <p:cNvPr id="1" name=""/>
+        <p:cNvGrpSpPr/>
+        <p:nvPr/>
+      </p:nvGrpSpPr>
+      <p:grpSpPr>
+        <a:xfrm>
+          <a:off x="0" y="0"/>
+          <a:ext cx="0" cy="0"/>
+          <a:chOff x="0" y="0"/>
+          <a:chExt cx="0" cy="0"/>
+        </a:xfrm>
+      </p:grpSpPr>
+      <p:sp>
+        <p:nvSpPr>
+          <p:cNvPr id="2" name="Title 1">
+            <a:extLst>
+              <a:ext uri="{FF2B5EF4-FFF2-40B4-BE49-F238E27FC236}">
+                <a16:creationId xmlns:a16="http://schemas.microsoft.com/office/drawing/2014/main" id="{85239CF5-D7FE-43AA-B0E2-34186B0CDBAE}"/>
+              </a:ext>
+            </a:extLst>
+          </p:cNvPr>
+          <p:cNvSpPr>
+            <a:spLocks noGrp="1"/>
+          </p:cNvSpPr>
+          <p:nvPr>
+            <p:ph type="title"/>
+          </p:nvPr>
+        </p:nvSpPr>
+        <p:spPr/>
+        <p:txBody>
+          <a:bodyPr/>
+          <a:lstStyle/>
+          <a:p>
+            <a:r>
+              <a:rPr lang="en-CA" dirty="0"/>
+              <a:t>Palette</a:t>
+            </a:r>
+          </a:p>
+        </p:txBody>
+      </p:sp>
+    </p:spTree>
+    <p:extLst>
+      <p:ext uri="{BB962C8B-B14F-4D97-AF65-F5344CB8AC3E}">
+        <p14:creationId xmlns:p14="http://schemas.microsoft.com/office/powerpoint/2010/main" val="3502767713"/>
+      </p:ext>
+    </p:extLst>
+  </p:cSld>
+  <p:clrMapOvr>
+    <a:masterClrMapping/>
+  </p:clrMapOvr>
+</p:sld>
+</file>
+
+<file path=ppt/slides/slide38.xml><?xml version="1.0" encoding="utf-8"?>
+<p:sld xmlns:a="http://schemas.openxmlformats.org/drawingml/2006/main" xmlns:r="http://schemas.openxmlformats.org/officeDocument/2006/relationships" xmlns:p="http://schemas.openxmlformats.org/presentationml/2006/main">
+  <p:cSld>
+    <p:spTree>
+      <p:nvGrpSpPr>
+        <p:cNvPr id="1" name=""/>
+        <p:cNvGrpSpPr/>
+        <p:nvPr/>
+      </p:nvGrpSpPr>
+      <p:grpSpPr>
+        <a:xfrm>
+          <a:off x="0" y="0"/>
+          <a:ext cx="0" cy="0"/>
+          <a:chOff x="0" y="0"/>
+          <a:chExt cx="0" cy="0"/>
+        </a:xfrm>
+      </p:grpSpPr>
+      <p:sp>
+        <p:nvSpPr>
           <p:cNvPr id="2" name="Title 1">
             <a:extLst>
               <a:ext uri="{FF2B5EF4-FFF2-40B4-BE49-F238E27FC236}">
@@ -21838,7 +23109,7 @@
 </p:sld>
 </file>
 
-<file path=ppt/slides/slide31.xml><?xml version="1.0" encoding="utf-8"?>
+<file path=ppt/slides/slide39.xml><?xml version="1.0" encoding="utf-8"?>
 <p:sld xmlns:a="http://schemas.openxmlformats.org/drawingml/2006/main" xmlns:r="http://schemas.openxmlformats.org/officeDocument/2006/relationships" xmlns:p="http://schemas.openxmlformats.org/presentationml/2006/main">
   <p:cSld>
     <p:spTree>
@@ -22241,7 +23512,183 @@
 </p:sld>
 </file>
 
-<file path=ppt/slides/slide32.xml><?xml version="1.0" encoding="utf-8"?>
+<file path=ppt/slides/slide4.xml><?xml version="1.0" encoding="utf-8"?>
+<p:sld xmlns:a="http://schemas.openxmlformats.org/drawingml/2006/main" xmlns:r="http://schemas.openxmlformats.org/officeDocument/2006/relationships" xmlns:p="http://schemas.openxmlformats.org/presentationml/2006/main">
+  <p:cSld>
+    <p:spTree>
+      <p:nvGrpSpPr>
+        <p:cNvPr id="1" name=""/>
+        <p:cNvGrpSpPr/>
+        <p:nvPr/>
+      </p:nvGrpSpPr>
+      <p:grpSpPr>
+        <a:xfrm>
+          <a:off x="0" y="0"/>
+          <a:ext cx="0" cy="0"/>
+          <a:chOff x="0" y="0"/>
+          <a:chExt cx="0" cy="0"/>
+        </a:xfrm>
+      </p:grpSpPr>
+      <p:sp>
+        <p:nvSpPr>
+          <p:cNvPr id="2" name="Title 1">
+            <a:extLst>
+              <a:ext uri="{FF2B5EF4-FFF2-40B4-BE49-F238E27FC236}">
+                <a16:creationId xmlns:a16="http://schemas.microsoft.com/office/drawing/2014/main" id="{E22D978E-FC66-4FF4-B58F-5036C4B5B586}"/>
+              </a:ext>
+            </a:extLst>
+          </p:cNvPr>
+          <p:cNvSpPr>
+            <a:spLocks noGrp="1"/>
+          </p:cNvSpPr>
+          <p:nvPr>
+            <p:ph type="title"/>
+          </p:nvPr>
+        </p:nvSpPr>
+        <p:spPr/>
+        <p:txBody>
+          <a:bodyPr/>
+          <a:lstStyle/>
+          <a:p>
+            <a:r>
+              <a:rPr lang="en-CA" dirty="0"/>
+              <a:t>Agenda</a:t>
+            </a:r>
+          </a:p>
+        </p:txBody>
+      </p:sp>
+      <p:sp>
+        <p:nvSpPr>
+          <p:cNvPr id="3" name="Text Placeholder 2">
+            <a:extLst>
+              <a:ext uri="{FF2B5EF4-FFF2-40B4-BE49-F238E27FC236}">
+                <a16:creationId xmlns:a16="http://schemas.microsoft.com/office/drawing/2014/main" id="{CBD15C14-39F7-421A-BDE9-B3DB2256B2B7}"/>
+              </a:ext>
+            </a:extLst>
+          </p:cNvPr>
+          <p:cNvSpPr>
+            <a:spLocks noGrp="1"/>
+          </p:cNvSpPr>
+          <p:nvPr>
+            <p:ph type="body" sz="quarter" idx="10"/>
+          </p:nvPr>
+        </p:nvSpPr>
+        <p:spPr>
+          <a:xfrm>
+            <a:off x="2842352" y="715437"/>
+            <a:ext cx="5988904" cy="3902075"/>
+          </a:xfrm>
+        </p:spPr>
+        <p:txBody>
+          <a:bodyPr/>
+          <a:lstStyle/>
+          <a:p>
+            <a:pPr marL="571500" indent="-571500">
+              <a:buFont typeface="Arial" panose="020B0604020202020204" pitchFamily="34" charset="0"/>
+              <a:buChar char="•"/>
+            </a:pPr>
+            <a:r>
+              <a:rPr lang="en-US" dirty="0"/>
+              <a:t>Background:</a:t>
+            </a:r>
+          </a:p>
+          <a:p>
+            <a:pPr marL="1033227" lvl="1" indent="-457200">
+              <a:buFont typeface="Arial" panose="020B0604020202020204" pitchFamily="34" charset="0"/>
+              <a:buChar char="•"/>
+            </a:pPr>
+            <a:r>
+              <a:rPr lang="en-US" sz="2400" dirty="0">
+                <a:solidFill>
+                  <a:schemeClr val="bg2"/>
+                </a:solidFill>
+                <a:latin typeface="Segoe UI Semibold" panose="020B0702040204020203" pitchFamily="34" charset="0"/>
+                <a:cs typeface="Segoe UI Semibold" panose="020B0702040204020203" pitchFamily="34" charset="0"/>
+              </a:rPr>
+              <a:t>Logical processing order</a:t>
+            </a:r>
+          </a:p>
+          <a:p>
+            <a:pPr marL="1033227" lvl="1" indent="-457200">
+              <a:buFont typeface="Arial" panose="020B0604020202020204" pitchFamily="34" charset="0"/>
+              <a:buChar char="•"/>
+            </a:pPr>
+            <a:r>
+              <a:rPr lang="en-US" sz="2400" dirty="0">
+                <a:solidFill>
+                  <a:schemeClr val="bg2"/>
+                </a:solidFill>
+                <a:latin typeface="Segoe UI Semibold" panose="020B0702040204020203" pitchFamily="34" charset="0"/>
+                <a:cs typeface="Segoe UI Semibold" panose="020B0702040204020203" pitchFamily="34" charset="0"/>
+              </a:rPr>
+              <a:t>Physical processing considerations</a:t>
+            </a:r>
+          </a:p>
+          <a:p>
+            <a:pPr marL="571500" indent="-571500">
+              <a:buFont typeface="Arial" panose="020B0604020202020204" pitchFamily="34" charset="0"/>
+              <a:buChar char="•"/>
+            </a:pPr>
+            <a:r>
+              <a:rPr lang="en-US" dirty="0"/>
+              <a:t>Executing a query:</a:t>
+            </a:r>
+          </a:p>
+          <a:p>
+            <a:pPr marL="1147527" lvl="1" indent="-571500">
+              <a:buFont typeface="Arial" panose="020B0604020202020204" pitchFamily="34" charset="0"/>
+              <a:buChar char="•"/>
+            </a:pPr>
+            <a:r>
+              <a:rPr lang="en-US" sz="2400" dirty="0">
+                <a:solidFill>
+                  <a:schemeClr val="bg2"/>
+                </a:solidFill>
+                <a:latin typeface="Segoe UI Semibold" panose="020B0702040204020203" pitchFamily="34" charset="0"/>
+                <a:cs typeface="Segoe UI Semibold" panose="020B0702040204020203" pitchFamily="34" charset="0"/>
+              </a:rPr>
+              <a:t>Parse, bind, transform, optimize, execute</a:t>
+            </a:r>
+          </a:p>
+          <a:p>
+            <a:pPr marL="571500" indent="-571500">
+              <a:buFont typeface="Arial" panose="020B0604020202020204" pitchFamily="34" charset="0"/>
+              <a:buChar char="•"/>
+            </a:pPr>
+            <a:r>
+              <a:rPr lang="en-US" dirty="0"/>
+              <a:t>Heuristics, transformation rules, parse trees, memos</a:t>
+            </a:r>
+          </a:p>
+          <a:p>
+            <a:pPr marL="571500" indent="-571500">
+              <a:buFont typeface="Arial" panose="020B0604020202020204" pitchFamily="34" charset="0"/>
+              <a:buChar char="•"/>
+            </a:pPr>
+            <a:r>
+              <a:rPr lang="en-US" dirty="0"/>
+              <a:t>Limitations &amp; DMVs</a:t>
+            </a:r>
+          </a:p>
+          <a:p>
+            <a:endParaRPr lang="en-CA" dirty="0"/>
+          </a:p>
+        </p:txBody>
+      </p:sp>
+    </p:spTree>
+    <p:extLst>
+      <p:ext uri="{BB962C8B-B14F-4D97-AF65-F5344CB8AC3E}">
+        <p14:creationId xmlns:p14="http://schemas.microsoft.com/office/powerpoint/2010/main" val="806837766"/>
+      </p:ext>
+    </p:extLst>
+  </p:cSld>
+  <p:clrMapOvr>
+    <a:masterClrMapping/>
+  </p:clrMapOvr>
+</p:sld>
+</file>
+
+<file path=ppt/slides/slide40.xml><?xml version="1.0" encoding="utf-8"?>
 <p:sld xmlns:a="http://schemas.openxmlformats.org/drawingml/2006/main" xmlns:r="http://schemas.openxmlformats.org/officeDocument/2006/relationships" xmlns:p="http://schemas.openxmlformats.org/presentationml/2006/main">
   <p:cSld>
     <p:spTree>
@@ -22335,7 +23782,7 @@
 </p:sld>
 </file>
 
-<file path=ppt/slides/slide33.xml><?xml version="1.0" encoding="utf-8"?>
+<file path=ppt/slides/slide41.xml><?xml version="1.0" encoding="utf-8"?>
 <p:sld xmlns:a="http://schemas.openxmlformats.org/drawingml/2006/main" xmlns:r="http://schemas.openxmlformats.org/officeDocument/2006/relationships" xmlns:p="http://schemas.openxmlformats.org/presentationml/2006/main">
   <p:cSld>
     <p:spTree>
@@ -22426,7 +23873,7 @@
 </p:sld>
 </file>
 
-<file path=ppt/slides/slide34.xml><?xml version="1.0" encoding="utf-8"?>
+<file path=ppt/slides/slide42.xml><?xml version="1.0" encoding="utf-8"?>
 <p:sld xmlns:a="http://schemas.openxmlformats.org/drawingml/2006/main" xmlns:r="http://schemas.openxmlformats.org/officeDocument/2006/relationships" xmlns:p="http://schemas.openxmlformats.org/presentationml/2006/main">
   <p:cSld>
     <p:spTree>
@@ -22520,7 +23967,7 @@
 </p:sld>
 </file>
 
-<file path=ppt/slides/slide35.xml><?xml version="1.0" encoding="utf-8"?>
+<file path=ppt/slides/slide43.xml><?xml version="1.0" encoding="utf-8"?>
 <p:sld xmlns:a="http://schemas.openxmlformats.org/drawingml/2006/main" xmlns:r="http://schemas.openxmlformats.org/officeDocument/2006/relationships" xmlns:p="http://schemas.openxmlformats.org/presentationml/2006/main">
   <p:cSld>
     <p:spTree>
@@ -22653,7 +24100,7 @@
 </p:sld>
 </file>
 
-<file path=ppt/slides/slide36.xml><?xml version="1.0" encoding="utf-8"?>
+<file path=ppt/slides/slide44.xml><?xml version="1.0" encoding="utf-8"?>
 <p:sld xmlns:a="http://schemas.openxmlformats.org/drawingml/2006/main" xmlns:r="http://schemas.openxmlformats.org/officeDocument/2006/relationships" xmlns:p="http://schemas.openxmlformats.org/presentationml/2006/main">
   <p:cSld>
     <p:spTree>
@@ -22861,7 +24308,7 @@
 </p:sld>
 </file>
 
-<file path=ppt/slides/slide37.xml><?xml version="1.0" encoding="utf-8"?>
+<file path=ppt/slides/slide45.xml><?xml version="1.0" encoding="utf-8"?>
 <p:sld xmlns:a="http://schemas.openxmlformats.org/drawingml/2006/main" xmlns:r="http://schemas.openxmlformats.org/officeDocument/2006/relationships" xmlns:p="http://schemas.openxmlformats.org/presentationml/2006/main">
   <p:cSld>
     <p:spTree>
@@ -23144,7 +24591,7 @@
 </p:sld>
 </file>
 
-<file path=ppt/slides/slide38.xml><?xml version="1.0" encoding="utf-8"?>
+<file path=ppt/slides/slide46.xml><?xml version="1.0" encoding="utf-8"?>
 <p:sld xmlns:a="http://schemas.openxmlformats.org/drawingml/2006/main" xmlns:r="http://schemas.openxmlformats.org/officeDocument/2006/relationships" xmlns:p="http://schemas.openxmlformats.org/presentationml/2006/main">
   <p:cSld>
     <p:spTree>
@@ -23246,7 +24693,7 @@
 </p:sld>
 </file>
 
-<file path=ppt/slides/slide39.xml><?xml version="1.0" encoding="utf-8"?>
+<file path=ppt/slides/slide47.xml><?xml version="1.0" encoding="utf-8"?>
 <p:sld xmlns:a="http://schemas.openxmlformats.org/drawingml/2006/main" xmlns:r="http://schemas.openxmlformats.org/officeDocument/2006/relationships" xmlns:p="http://schemas.openxmlformats.org/presentationml/2006/main">
   <p:cSld>
     <p:spTree>
@@ -24972,7 +26419,7 @@
 </p:sld>
 </file>
 
-<file path=ppt/slides/slide4.xml><?xml version="1.0" encoding="utf-8"?>
+<file path=ppt/slides/slide48.xml><?xml version="1.0" encoding="utf-8"?>
 <p:sld xmlns:a="http://schemas.openxmlformats.org/drawingml/2006/main" xmlns:r="http://schemas.openxmlformats.org/officeDocument/2006/relationships" xmlns:p="http://schemas.openxmlformats.org/presentationml/2006/main">
   <p:cSld>
     <p:spTree>
@@ -24994,7 +26441,7 @@
           <p:cNvPr id="2" name="Title 1">
             <a:extLst>
               <a:ext uri="{FF2B5EF4-FFF2-40B4-BE49-F238E27FC236}">
-                <a16:creationId xmlns:a16="http://schemas.microsoft.com/office/drawing/2014/main" id="{E22D978E-FC66-4FF4-B58F-5036C4B5B586}"/>
+                <a16:creationId xmlns:a16="http://schemas.microsoft.com/office/drawing/2014/main" id="{CB81EA52-0EEE-46FA-87DC-3AA7196CDF0E}"/>
               </a:ext>
             </a:extLst>
           </p:cNvPr>
@@ -25002,143 +26449,33 @@
             <a:spLocks noGrp="1"/>
           </p:cNvSpPr>
           <p:nvPr>
-            <p:ph type="title"/>
-          </p:nvPr>
-        </p:nvSpPr>
-        <p:spPr/>
-        <p:txBody>
-          <a:bodyPr/>
-          <a:lstStyle/>
-          <a:p>
-            <a:r>
-              <a:rPr lang="en-CA" dirty="0"/>
-              <a:t>Agenda</a:t>
-            </a:r>
-          </a:p>
-        </p:txBody>
-      </p:sp>
-      <p:sp>
-        <p:nvSpPr>
-          <p:cNvPr id="3" name="Text Placeholder 2">
-            <a:extLst>
-              <a:ext uri="{FF2B5EF4-FFF2-40B4-BE49-F238E27FC236}">
-                <a16:creationId xmlns:a16="http://schemas.microsoft.com/office/drawing/2014/main" id="{CBD15C14-39F7-421A-BDE9-B3DB2256B2B7}"/>
-              </a:ext>
-            </a:extLst>
-          </p:cNvPr>
-          <p:cNvSpPr>
-            <a:spLocks noGrp="1"/>
-          </p:cNvSpPr>
-          <p:nvPr>
-            <p:ph type="body" sz="quarter" idx="10"/>
+            <p:ph type="title" idx="4294967295"/>
           </p:nvPr>
         </p:nvSpPr>
         <p:spPr>
           <a:xfrm>
-            <a:off x="2842352" y="715437"/>
-            <a:ext cx="5988904" cy="3902075"/>
+            <a:off x="628650" y="-496888"/>
+            <a:ext cx="796738" cy="402759"/>
           </a:xfrm>
+          <a:prstGeom prst="rect">
+            <a:avLst/>
+          </a:prstGeom>
         </p:spPr>
         <p:txBody>
           <a:bodyPr/>
           <a:lstStyle/>
           <a:p>
-            <a:pPr marL="571500" indent="-571500">
-              <a:buFont typeface="Arial" panose="020B0604020202020204" pitchFamily="34" charset="0"/>
-              <a:buChar char="•"/>
-            </a:pPr>
-            <a:r>
-              <a:rPr lang="en-US" dirty="0"/>
-              <a:t>Background:</a:t>
-            </a:r>
-          </a:p>
-          <a:p>
-            <a:pPr marL="1033227" lvl="1" indent="-457200">
-              <a:buFont typeface="Arial" panose="020B0604020202020204" pitchFamily="34" charset="0"/>
-              <a:buChar char="•"/>
-            </a:pPr>
-            <a:r>
-              <a:rPr lang="en-US" sz="2400" dirty="0">
-                <a:solidFill>
-                  <a:schemeClr val="bg2"/>
-                </a:solidFill>
-                <a:latin typeface="Segoe UI Semibold" panose="020B0702040204020203" pitchFamily="34" charset="0"/>
-                <a:cs typeface="Segoe UI Semibold" panose="020B0702040204020203" pitchFamily="34" charset="0"/>
-              </a:rPr>
-              <a:t>Logical processing order</a:t>
-            </a:r>
-          </a:p>
-          <a:p>
-            <a:pPr marL="1033227" lvl="1" indent="-457200">
-              <a:buFont typeface="Arial" panose="020B0604020202020204" pitchFamily="34" charset="0"/>
-              <a:buChar char="•"/>
-            </a:pPr>
-            <a:r>
-              <a:rPr lang="en-US" sz="2400" dirty="0">
-                <a:solidFill>
-                  <a:schemeClr val="bg2"/>
-                </a:solidFill>
-                <a:latin typeface="Segoe UI Semibold" panose="020B0702040204020203" pitchFamily="34" charset="0"/>
-                <a:cs typeface="Segoe UI Semibold" panose="020B0702040204020203" pitchFamily="34" charset="0"/>
-              </a:rPr>
-              <a:t>Physical processing considerations</a:t>
-            </a:r>
-          </a:p>
-          <a:p>
-            <a:pPr marL="571500" indent="-571500">
-              <a:buFont typeface="Arial" panose="020B0604020202020204" pitchFamily="34" charset="0"/>
-              <a:buChar char="•"/>
-            </a:pPr>
-            <a:r>
-              <a:rPr lang="en-US" dirty="0"/>
-              <a:t>Executing a query:</a:t>
-            </a:r>
-          </a:p>
-          <a:p>
-            <a:pPr marL="1147527" lvl="1" indent="-571500">
-              <a:buFont typeface="Arial" panose="020B0604020202020204" pitchFamily="34" charset="0"/>
-              <a:buChar char="•"/>
-            </a:pPr>
-            <a:r>
-              <a:rPr lang="en-US" sz="2400" dirty="0">
-                <a:solidFill>
-                  <a:schemeClr val="bg2"/>
-                </a:solidFill>
-                <a:latin typeface="Segoe UI Semibold" panose="020B0702040204020203" pitchFamily="34" charset="0"/>
-                <a:cs typeface="Segoe UI Semibold" panose="020B0702040204020203" pitchFamily="34" charset="0"/>
-              </a:rPr>
-              <a:t>Parse, bind, transform, optimize, execute</a:t>
-            </a:r>
-          </a:p>
-          <a:p>
-            <a:pPr marL="571500" indent="-571500">
-              <a:buFont typeface="Arial" panose="020B0604020202020204" pitchFamily="34" charset="0"/>
-              <a:buChar char="•"/>
-            </a:pPr>
-            <a:r>
-              <a:rPr lang="en-US" dirty="0"/>
-              <a:t>Heuristics, transformation rules, parse trees, memos</a:t>
-            </a:r>
-          </a:p>
-          <a:p>
-            <a:pPr marL="571500" indent="-571500">
-              <a:buFont typeface="Arial" panose="020B0604020202020204" pitchFamily="34" charset="0"/>
-              <a:buChar char="•"/>
-            </a:pPr>
-            <a:r>
-              <a:rPr lang="en-US" dirty="0"/>
-              <a:t>Limitations &amp; DMVs</a:t>
-            </a:r>
-          </a:p>
-          <a:p>
-            <a:endParaRPr lang="en-CA" dirty="0"/>
+            <a:r>
+              <a:rPr lang="en-CA" sz="900" dirty="0"/>
+              <a:t>Content</a:t>
+            </a:r>
           </a:p>
         </p:txBody>
       </p:sp>
     </p:spTree>
     <p:extLst>
       <p:ext uri="{BB962C8B-B14F-4D97-AF65-F5344CB8AC3E}">
-        <p14:creationId xmlns:p14="http://schemas.microsoft.com/office/powerpoint/2010/main" val="806837766"/>
+        <p14:creationId xmlns:p14="http://schemas.microsoft.com/office/powerpoint/2010/main" val="783076368"/>
       </p:ext>
     </p:extLst>
   </p:cSld>
@@ -25148,7 +26485,7 @@
 </p:sld>
 </file>
 
-<file path=ppt/slides/slide40.xml><?xml version="1.0" encoding="utf-8"?>
+<file path=ppt/slides/slide49.xml><?xml version="1.0" encoding="utf-8"?>
 <p:sld xmlns:a="http://schemas.openxmlformats.org/drawingml/2006/main" xmlns:r="http://schemas.openxmlformats.org/officeDocument/2006/relationships" xmlns:p="http://schemas.openxmlformats.org/presentationml/2006/main">
   <p:cSld>
     <p:spTree>
@@ -25170,72 +26507,6 @@
           <p:cNvPr id="2" name="Title 1">
             <a:extLst>
               <a:ext uri="{FF2B5EF4-FFF2-40B4-BE49-F238E27FC236}">
-                <a16:creationId xmlns:a16="http://schemas.microsoft.com/office/drawing/2014/main" id="{CB81EA52-0EEE-46FA-87DC-3AA7196CDF0E}"/>
-              </a:ext>
-            </a:extLst>
-          </p:cNvPr>
-          <p:cNvSpPr>
-            <a:spLocks noGrp="1"/>
-          </p:cNvSpPr>
-          <p:nvPr>
-            <p:ph type="title" idx="4294967295"/>
-          </p:nvPr>
-        </p:nvSpPr>
-        <p:spPr>
-          <a:xfrm>
-            <a:off x="628650" y="-496888"/>
-            <a:ext cx="796738" cy="402759"/>
-          </a:xfrm>
-          <a:prstGeom prst="rect">
-            <a:avLst/>
-          </a:prstGeom>
-        </p:spPr>
-        <p:txBody>
-          <a:bodyPr/>
-          <a:lstStyle/>
-          <a:p>
-            <a:r>
-              <a:rPr lang="en-CA" sz="900" dirty="0"/>
-              <a:t>Content</a:t>
-            </a:r>
-          </a:p>
-        </p:txBody>
-      </p:sp>
-    </p:spTree>
-    <p:extLst>
-      <p:ext uri="{BB962C8B-B14F-4D97-AF65-F5344CB8AC3E}">
-        <p14:creationId xmlns:p14="http://schemas.microsoft.com/office/powerpoint/2010/main" val="783076368"/>
-      </p:ext>
-    </p:extLst>
-  </p:cSld>
-  <p:clrMapOvr>
-    <a:masterClrMapping/>
-  </p:clrMapOvr>
-</p:sld>
-</file>
-
-<file path=ppt/slides/slide41.xml><?xml version="1.0" encoding="utf-8"?>
-<p:sld xmlns:a="http://schemas.openxmlformats.org/drawingml/2006/main" xmlns:r="http://schemas.openxmlformats.org/officeDocument/2006/relationships" xmlns:p="http://schemas.openxmlformats.org/presentationml/2006/main">
-  <p:cSld>
-    <p:spTree>
-      <p:nvGrpSpPr>
-        <p:cNvPr id="1" name=""/>
-        <p:cNvGrpSpPr/>
-        <p:nvPr/>
-      </p:nvGrpSpPr>
-      <p:grpSpPr>
-        <a:xfrm>
-          <a:off x="0" y="0"/>
-          <a:ext cx="0" cy="0"/>
-          <a:chOff x="0" y="0"/>
-          <a:chExt cx="0" cy="0"/>
-        </a:xfrm>
-      </p:grpSpPr>
-      <p:sp>
-        <p:nvSpPr>
-          <p:cNvPr id="2" name="Title 1">
-            <a:extLst>
-              <a:ext uri="{FF2B5EF4-FFF2-40B4-BE49-F238E27FC236}">
                 <a16:creationId xmlns:a16="http://schemas.microsoft.com/office/drawing/2014/main" id="{DD39714F-B06E-47F8-A35E-C2276FD675DB}"/>
               </a:ext>
             </a:extLst>
@@ -25260,391 +26531,6 @@
     <p:extLst>
       <p:ext uri="{BB962C8B-B14F-4D97-AF65-F5344CB8AC3E}">
         <p14:creationId xmlns:p14="http://schemas.microsoft.com/office/powerpoint/2010/main" val="761659712"/>
-      </p:ext>
-    </p:extLst>
-  </p:cSld>
-  <p:clrMapOvr>
-    <a:masterClrMapping/>
-  </p:clrMapOvr>
-</p:sld>
-</file>
-
-<file path=ppt/slides/slide42.xml><?xml version="1.0" encoding="utf-8"?>
-<p:sld xmlns:a="http://schemas.openxmlformats.org/drawingml/2006/main" xmlns:r="http://schemas.openxmlformats.org/officeDocument/2006/relationships" xmlns:p="http://schemas.openxmlformats.org/presentationml/2006/main">
-  <p:cSld>
-    <p:spTree>
-      <p:nvGrpSpPr>
-        <p:cNvPr id="1" name=""/>
-        <p:cNvGrpSpPr/>
-        <p:nvPr/>
-      </p:nvGrpSpPr>
-      <p:grpSpPr>
-        <a:xfrm>
-          <a:off x="0" y="0"/>
-          <a:ext cx="0" cy="0"/>
-          <a:chOff x="0" y="0"/>
-          <a:chExt cx="0" cy="0"/>
-        </a:xfrm>
-      </p:grpSpPr>
-      <p:sp>
-        <p:nvSpPr>
-          <p:cNvPr id="2" name="Title 1" descr="Demo Title No Photo">
-            <a:extLst>
-              <a:ext uri="{FF2B5EF4-FFF2-40B4-BE49-F238E27FC236}">
-                <a16:creationId xmlns:a16="http://schemas.microsoft.com/office/drawing/2014/main" id="{1CB52C5B-C58D-4D78-9E9F-2440831C5870}"/>
-              </a:ext>
-            </a:extLst>
-          </p:cNvPr>
-          <p:cNvSpPr>
-            <a:spLocks noGrp="1"/>
-          </p:cNvSpPr>
-          <p:nvPr>
-            <p:ph type="title"/>
-          </p:nvPr>
-        </p:nvSpPr>
-        <p:spPr/>
-        <p:txBody>
-          <a:bodyPr/>
-          <a:lstStyle/>
-          <a:p>
-            <a:endParaRPr lang="en-CA" sz="4000" dirty="0"/>
-          </a:p>
-        </p:txBody>
-      </p:sp>
-    </p:spTree>
-    <p:extLst>
-      <p:ext uri="{BB962C8B-B14F-4D97-AF65-F5344CB8AC3E}">
-        <p14:creationId xmlns:p14="http://schemas.microsoft.com/office/powerpoint/2010/main" val="393055445"/>
-      </p:ext>
-    </p:extLst>
-  </p:cSld>
-  <p:clrMapOvr>
-    <a:masterClrMapping/>
-  </p:clrMapOvr>
-</p:sld>
-</file>
-
-<file path=ppt/slides/slide43.xml><?xml version="1.0" encoding="utf-8"?>
-<p:sld xmlns:a="http://schemas.openxmlformats.org/drawingml/2006/main" xmlns:r="http://schemas.openxmlformats.org/officeDocument/2006/relationships" xmlns:p="http://schemas.openxmlformats.org/presentationml/2006/main">
-  <p:cSld>
-    <p:spTree>
-      <p:nvGrpSpPr>
-        <p:cNvPr id="1" name=""/>
-        <p:cNvGrpSpPr/>
-        <p:nvPr/>
-      </p:nvGrpSpPr>
-      <p:grpSpPr>
-        <a:xfrm>
-          <a:off x="0" y="0"/>
-          <a:ext cx="0" cy="0"/>
-          <a:chOff x="0" y="0"/>
-          <a:chExt cx="0" cy="0"/>
-        </a:xfrm>
-      </p:grpSpPr>
-      <p:sp>
-        <p:nvSpPr>
-          <p:cNvPr id="2" name="Title 1" descr="Video Title">
-            <a:extLst>
-              <a:ext uri="{FF2B5EF4-FFF2-40B4-BE49-F238E27FC236}">
-                <a16:creationId xmlns:a16="http://schemas.microsoft.com/office/drawing/2014/main" id="{74C4932F-2184-441F-AB7A-F5DA2A8F0CE1}"/>
-              </a:ext>
-            </a:extLst>
-          </p:cNvPr>
-          <p:cNvSpPr>
-            <a:spLocks noGrp="1"/>
-          </p:cNvSpPr>
-          <p:nvPr>
-            <p:ph type="title"/>
-          </p:nvPr>
-        </p:nvSpPr>
-        <p:spPr/>
-        <p:txBody>
-          <a:bodyPr/>
-          <a:lstStyle/>
-          <a:p>
-            <a:endParaRPr lang="en-CA" sz="4000" dirty="0"/>
-          </a:p>
-        </p:txBody>
-      </p:sp>
-    </p:spTree>
-    <p:extLst>
-      <p:ext uri="{BB962C8B-B14F-4D97-AF65-F5344CB8AC3E}">
-        <p14:creationId xmlns:p14="http://schemas.microsoft.com/office/powerpoint/2010/main" val="41620290"/>
-      </p:ext>
-    </p:extLst>
-  </p:cSld>
-  <p:clrMapOvr>
-    <a:masterClrMapping/>
-  </p:clrMapOvr>
-</p:sld>
-</file>
-
-<file path=ppt/slides/slide44.xml><?xml version="1.0" encoding="utf-8"?>
-<p:sld xmlns:a="http://schemas.openxmlformats.org/drawingml/2006/main" xmlns:r="http://schemas.openxmlformats.org/officeDocument/2006/relationships" xmlns:p="http://schemas.openxmlformats.org/presentationml/2006/main">
-  <p:cSld>
-    <p:spTree>
-      <p:nvGrpSpPr>
-        <p:cNvPr id="1" name=""/>
-        <p:cNvGrpSpPr/>
-        <p:nvPr/>
-      </p:nvGrpSpPr>
-      <p:grpSpPr>
-        <a:xfrm>
-          <a:off x="0" y="0"/>
-          <a:ext cx="0" cy="0"/>
-          <a:chOff x="0" y="0"/>
-          <a:chExt cx="0" cy="0"/>
-        </a:xfrm>
-      </p:grpSpPr>
-      <p:sp>
-        <p:nvSpPr>
-          <p:cNvPr id="2" name="Title 1" descr="Video Title No Photo">
-            <a:extLst>
-              <a:ext uri="{FF2B5EF4-FFF2-40B4-BE49-F238E27FC236}">
-                <a16:creationId xmlns:a16="http://schemas.microsoft.com/office/drawing/2014/main" id="{2E2FA21B-CEA6-482F-B69A-027B4E5A2B6A}"/>
-              </a:ext>
-            </a:extLst>
-          </p:cNvPr>
-          <p:cNvSpPr>
-            <a:spLocks noGrp="1"/>
-          </p:cNvSpPr>
-          <p:nvPr>
-            <p:ph type="title"/>
-          </p:nvPr>
-        </p:nvSpPr>
-        <p:spPr/>
-        <p:txBody>
-          <a:bodyPr/>
-          <a:lstStyle/>
-          <a:p>
-            <a:endParaRPr lang="en-CA" sz="4000" dirty="0"/>
-          </a:p>
-        </p:txBody>
-      </p:sp>
-    </p:spTree>
-    <p:extLst>
-      <p:ext uri="{BB962C8B-B14F-4D97-AF65-F5344CB8AC3E}">
-        <p14:creationId xmlns:p14="http://schemas.microsoft.com/office/powerpoint/2010/main" val="199334012"/>
-      </p:ext>
-    </p:extLst>
-  </p:cSld>
-  <p:clrMapOvr>
-    <a:masterClrMapping/>
-  </p:clrMapOvr>
-</p:sld>
-</file>
-
-<file path=ppt/slides/slide45.xml><?xml version="1.0" encoding="utf-8"?>
-<p:sld xmlns:a="http://schemas.openxmlformats.org/drawingml/2006/main" xmlns:r="http://schemas.openxmlformats.org/officeDocument/2006/relationships" xmlns:p="http://schemas.openxmlformats.org/presentationml/2006/main">
-  <p:cSld>
-    <p:spTree>
-      <p:nvGrpSpPr>
-        <p:cNvPr id="1" name=""/>
-        <p:cNvGrpSpPr/>
-        <p:nvPr/>
-      </p:nvGrpSpPr>
-      <p:grpSpPr>
-        <a:xfrm>
-          <a:off x="0" y="0"/>
-          <a:ext cx="0" cy="0"/>
-          <a:chOff x="0" y="0"/>
-          <a:chExt cx="0" cy="0"/>
-        </a:xfrm>
-      </p:grpSpPr>
-      <p:sp>
-        <p:nvSpPr>
-          <p:cNvPr id="2" name="Title 1" descr="Customer Title">
-            <a:extLst>
-              <a:ext uri="{FF2B5EF4-FFF2-40B4-BE49-F238E27FC236}">
-                <a16:creationId xmlns:a16="http://schemas.microsoft.com/office/drawing/2014/main" id="{515A6877-5D3A-4508-94FD-4AB154270C6C}"/>
-              </a:ext>
-            </a:extLst>
-          </p:cNvPr>
-          <p:cNvSpPr>
-            <a:spLocks noGrp="1"/>
-          </p:cNvSpPr>
-          <p:nvPr>
-            <p:ph type="title"/>
-          </p:nvPr>
-        </p:nvSpPr>
-        <p:spPr/>
-        <p:txBody>
-          <a:bodyPr/>
-          <a:lstStyle/>
-          <a:p>
-            <a:endParaRPr lang="en-CA" sz="4000" dirty="0"/>
-          </a:p>
-        </p:txBody>
-      </p:sp>
-    </p:spTree>
-    <p:extLst>
-      <p:ext uri="{BB962C8B-B14F-4D97-AF65-F5344CB8AC3E}">
-        <p14:creationId xmlns:p14="http://schemas.microsoft.com/office/powerpoint/2010/main" val="4181018087"/>
-      </p:ext>
-    </p:extLst>
-  </p:cSld>
-  <p:clrMapOvr>
-    <a:masterClrMapping/>
-  </p:clrMapOvr>
-</p:sld>
-</file>
-
-<file path=ppt/slides/slide46.xml><?xml version="1.0" encoding="utf-8"?>
-<p:sld xmlns:a="http://schemas.openxmlformats.org/drawingml/2006/main" xmlns:r="http://schemas.openxmlformats.org/officeDocument/2006/relationships" xmlns:p="http://schemas.openxmlformats.org/presentationml/2006/main">
-  <p:cSld>
-    <p:spTree>
-      <p:nvGrpSpPr>
-        <p:cNvPr id="1" name=""/>
-        <p:cNvGrpSpPr/>
-        <p:nvPr/>
-      </p:nvGrpSpPr>
-      <p:grpSpPr>
-        <a:xfrm>
-          <a:off x="0" y="0"/>
-          <a:ext cx="0" cy="0"/>
-          <a:chOff x="0" y="0"/>
-          <a:chExt cx="0" cy="0"/>
-        </a:xfrm>
-      </p:grpSpPr>
-      <p:sp>
-        <p:nvSpPr>
-          <p:cNvPr id="2" name="Title 1" descr="Customer Title No Photo">
-            <a:extLst>
-              <a:ext uri="{FF2B5EF4-FFF2-40B4-BE49-F238E27FC236}">
-                <a16:creationId xmlns:a16="http://schemas.microsoft.com/office/drawing/2014/main" id="{55D06C87-1034-4B2D-A67A-5543915EF509}"/>
-              </a:ext>
-            </a:extLst>
-          </p:cNvPr>
-          <p:cNvSpPr>
-            <a:spLocks noGrp="1"/>
-          </p:cNvSpPr>
-          <p:nvPr>
-            <p:ph type="title"/>
-          </p:nvPr>
-        </p:nvSpPr>
-        <p:spPr/>
-        <p:txBody>
-          <a:bodyPr/>
-          <a:lstStyle/>
-          <a:p>
-            <a:endParaRPr lang="en-CA" sz="4000" dirty="0"/>
-          </a:p>
-        </p:txBody>
-      </p:sp>
-    </p:spTree>
-    <p:extLst>
-      <p:ext uri="{BB962C8B-B14F-4D97-AF65-F5344CB8AC3E}">
-        <p14:creationId xmlns:p14="http://schemas.microsoft.com/office/powerpoint/2010/main" val="1787632021"/>
-      </p:ext>
-    </p:extLst>
-  </p:cSld>
-  <p:clrMapOvr>
-    <a:masterClrMapping/>
-  </p:clrMapOvr>
-</p:sld>
-</file>
-
-<file path=ppt/slides/slide47.xml><?xml version="1.0" encoding="utf-8"?>
-<p:sld xmlns:a="http://schemas.openxmlformats.org/drawingml/2006/main" xmlns:r="http://schemas.openxmlformats.org/officeDocument/2006/relationships" xmlns:p="http://schemas.openxmlformats.org/presentationml/2006/main">
-  <p:cSld>
-    <p:spTree>
-      <p:nvGrpSpPr>
-        <p:cNvPr id="1" name=""/>
-        <p:cNvGrpSpPr/>
-        <p:nvPr/>
-      </p:nvGrpSpPr>
-      <p:grpSpPr>
-        <a:xfrm>
-          <a:off x="0" y="0"/>
-          <a:ext cx="0" cy="0"/>
-          <a:chOff x="0" y="0"/>
-          <a:chExt cx="0" cy="0"/>
-        </a:xfrm>
-      </p:grpSpPr>
-      <p:sp>
-        <p:nvSpPr>
-          <p:cNvPr id="2" name="Title 1">
-            <a:extLst>
-              <a:ext uri="{FF2B5EF4-FFF2-40B4-BE49-F238E27FC236}">
-                <a16:creationId xmlns:a16="http://schemas.microsoft.com/office/drawing/2014/main" id="{4DCB9659-72B0-49AC-876B-38099C19261E}"/>
-              </a:ext>
-            </a:extLst>
-          </p:cNvPr>
-          <p:cNvSpPr>
-            <a:spLocks noGrp="1"/>
-          </p:cNvSpPr>
-          <p:nvPr>
-            <p:ph type="title"/>
-          </p:nvPr>
-        </p:nvSpPr>
-        <p:spPr/>
-        <p:txBody>
-          <a:bodyPr/>
-          <a:lstStyle/>
-          <a:p>
-            <a:endParaRPr lang="en-CA" sz="4000" dirty="0"/>
-          </a:p>
-        </p:txBody>
-      </p:sp>
-    </p:spTree>
-    <p:extLst>
-      <p:ext uri="{BB962C8B-B14F-4D97-AF65-F5344CB8AC3E}">
-        <p14:creationId xmlns:p14="http://schemas.microsoft.com/office/powerpoint/2010/main" val="898057510"/>
-      </p:ext>
-    </p:extLst>
-  </p:cSld>
-  <p:clrMapOvr>
-    <a:masterClrMapping/>
-  </p:clrMapOvr>
-</p:sld>
-</file>
-
-<file path=ppt/slides/slide48.xml><?xml version="1.0" encoding="utf-8"?>
-<p:sld xmlns:a="http://schemas.openxmlformats.org/drawingml/2006/main" xmlns:r="http://schemas.openxmlformats.org/officeDocument/2006/relationships" xmlns:p="http://schemas.openxmlformats.org/presentationml/2006/main">
-  <p:cSld>
-    <p:spTree>
-      <p:nvGrpSpPr>
-        <p:cNvPr id="1" name=""/>
-        <p:cNvGrpSpPr/>
-        <p:nvPr/>
-      </p:nvGrpSpPr>
-      <p:grpSpPr>
-        <a:xfrm>
-          <a:off x="0" y="0"/>
-          <a:ext cx="0" cy="0"/>
-          <a:chOff x="0" y="0"/>
-          <a:chExt cx="0" cy="0"/>
-        </a:xfrm>
-      </p:grpSpPr>
-      <p:sp>
-        <p:nvSpPr>
-          <p:cNvPr id="2" name="Title 1" descr="Case Study No Photo">
-            <a:extLst>
-              <a:ext uri="{FF2B5EF4-FFF2-40B4-BE49-F238E27FC236}">
-                <a16:creationId xmlns:a16="http://schemas.microsoft.com/office/drawing/2014/main" id="{EBF72FA5-E29A-45FD-B561-B948E9B3E568}"/>
-              </a:ext>
-            </a:extLst>
-          </p:cNvPr>
-          <p:cNvSpPr>
-            <a:spLocks noGrp="1"/>
-          </p:cNvSpPr>
-          <p:nvPr>
-            <p:ph type="title"/>
-          </p:nvPr>
-        </p:nvSpPr>
-        <p:spPr/>
-        <p:txBody>
-          <a:bodyPr/>
-          <a:lstStyle/>
-          <a:p>
-            <a:endParaRPr lang="en-CA" sz="4000" dirty="0"/>
-          </a:p>
-        </p:txBody>
-      </p:sp>
-    </p:spTree>
-    <p:extLst>
-      <p:ext uri="{BB962C8B-B14F-4D97-AF65-F5344CB8AC3E}">
-        <p14:creationId xmlns:p14="http://schemas.microsoft.com/office/powerpoint/2010/main" val="961852935"/>
       </p:ext>
     </p:extLst>
   </p:cSld>
@@ -25703,6 +26589,391 @@
     <p:extLst>
       <p:ext uri="{BB962C8B-B14F-4D97-AF65-F5344CB8AC3E}">
         <p14:creationId xmlns:p14="http://schemas.microsoft.com/office/powerpoint/2010/main" val="439548924"/>
+      </p:ext>
+    </p:extLst>
+  </p:cSld>
+  <p:clrMapOvr>
+    <a:masterClrMapping/>
+  </p:clrMapOvr>
+</p:sld>
+</file>
+
+<file path=ppt/slides/slide50.xml><?xml version="1.0" encoding="utf-8"?>
+<p:sld xmlns:a="http://schemas.openxmlformats.org/drawingml/2006/main" xmlns:r="http://schemas.openxmlformats.org/officeDocument/2006/relationships" xmlns:p="http://schemas.openxmlformats.org/presentationml/2006/main">
+  <p:cSld>
+    <p:spTree>
+      <p:nvGrpSpPr>
+        <p:cNvPr id="1" name=""/>
+        <p:cNvGrpSpPr/>
+        <p:nvPr/>
+      </p:nvGrpSpPr>
+      <p:grpSpPr>
+        <a:xfrm>
+          <a:off x="0" y="0"/>
+          <a:ext cx="0" cy="0"/>
+          <a:chOff x="0" y="0"/>
+          <a:chExt cx="0" cy="0"/>
+        </a:xfrm>
+      </p:grpSpPr>
+      <p:sp>
+        <p:nvSpPr>
+          <p:cNvPr id="2" name="Title 1" descr="Demo Title No Photo">
+            <a:extLst>
+              <a:ext uri="{FF2B5EF4-FFF2-40B4-BE49-F238E27FC236}">
+                <a16:creationId xmlns:a16="http://schemas.microsoft.com/office/drawing/2014/main" id="{1CB52C5B-C58D-4D78-9E9F-2440831C5870}"/>
+              </a:ext>
+            </a:extLst>
+          </p:cNvPr>
+          <p:cNvSpPr>
+            <a:spLocks noGrp="1"/>
+          </p:cNvSpPr>
+          <p:nvPr>
+            <p:ph type="title"/>
+          </p:nvPr>
+        </p:nvSpPr>
+        <p:spPr/>
+        <p:txBody>
+          <a:bodyPr/>
+          <a:lstStyle/>
+          <a:p>
+            <a:endParaRPr lang="en-CA" sz="4000" dirty="0"/>
+          </a:p>
+        </p:txBody>
+      </p:sp>
+    </p:spTree>
+    <p:extLst>
+      <p:ext uri="{BB962C8B-B14F-4D97-AF65-F5344CB8AC3E}">
+        <p14:creationId xmlns:p14="http://schemas.microsoft.com/office/powerpoint/2010/main" val="393055445"/>
+      </p:ext>
+    </p:extLst>
+  </p:cSld>
+  <p:clrMapOvr>
+    <a:masterClrMapping/>
+  </p:clrMapOvr>
+</p:sld>
+</file>
+
+<file path=ppt/slides/slide51.xml><?xml version="1.0" encoding="utf-8"?>
+<p:sld xmlns:a="http://schemas.openxmlformats.org/drawingml/2006/main" xmlns:r="http://schemas.openxmlformats.org/officeDocument/2006/relationships" xmlns:p="http://schemas.openxmlformats.org/presentationml/2006/main">
+  <p:cSld>
+    <p:spTree>
+      <p:nvGrpSpPr>
+        <p:cNvPr id="1" name=""/>
+        <p:cNvGrpSpPr/>
+        <p:nvPr/>
+      </p:nvGrpSpPr>
+      <p:grpSpPr>
+        <a:xfrm>
+          <a:off x="0" y="0"/>
+          <a:ext cx="0" cy="0"/>
+          <a:chOff x="0" y="0"/>
+          <a:chExt cx="0" cy="0"/>
+        </a:xfrm>
+      </p:grpSpPr>
+      <p:sp>
+        <p:nvSpPr>
+          <p:cNvPr id="2" name="Title 1" descr="Video Title">
+            <a:extLst>
+              <a:ext uri="{FF2B5EF4-FFF2-40B4-BE49-F238E27FC236}">
+                <a16:creationId xmlns:a16="http://schemas.microsoft.com/office/drawing/2014/main" id="{74C4932F-2184-441F-AB7A-F5DA2A8F0CE1}"/>
+              </a:ext>
+            </a:extLst>
+          </p:cNvPr>
+          <p:cNvSpPr>
+            <a:spLocks noGrp="1"/>
+          </p:cNvSpPr>
+          <p:nvPr>
+            <p:ph type="title"/>
+          </p:nvPr>
+        </p:nvSpPr>
+        <p:spPr/>
+        <p:txBody>
+          <a:bodyPr/>
+          <a:lstStyle/>
+          <a:p>
+            <a:endParaRPr lang="en-CA" sz="4000" dirty="0"/>
+          </a:p>
+        </p:txBody>
+      </p:sp>
+    </p:spTree>
+    <p:extLst>
+      <p:ext uri="{BB962C8B-B14F-4D97-AF65-F5344CB8AC3E}">
+        <p14:creationId xmlns:p14="http://schemas.microsoft.com/office/powerpoint/2010/main" val="41620290"/>
+      </p:ext>
+    </p:extLst>
+  </p:cSld>
+  <p:clrMapOvr>
+    <a:masterClrMapping/>
+  </p:clrMapOvr>
+</p:sld>
+</file>
+
+<file path=ppt/slides/slide52.xml><?xml version="1.0" encoding="utf-8"?>
+<p:sld xmlns:a="http://schemas.openxmlformats.org/drawingml/2006/main" xmlns:r="http://schemas.openxmlformats.org/officeDocument/2006/relationships" xmlns:p="http://schemas.openxmlformats.org/presentationml/2006/main">
+  <p:cSld>
+    <p:spTree>
+      <p:nvGrpSpPr>
+        <p:cNvPr id="1" name=""/>
+        <p:cNvGrpSpPr/>
+        <p:nvPr/>
+      </p:nvGrpSpPr>
+      <p:grpSpPr>
+        <a:xfrm>
+          <a:off x="0" y="0"/>
+          <a:ext cx="0" cy="0"/>
+          <a:chOff x="0" y="0"/>
+          <a:chExt cx="0" cy="0"/>
+        </a:xfrm>
+      </p:grpSpPr>
+      <p:sp>
+        <p:nvSpPr>
+          <p:cNvPr id="2" name="Title 1" descr="Video Title No Photo">
+            <a:extLst>
+              <a:ext uri="{FF2B5EF4-FFF2-40B4-BE49-F238E27FC236}">
+                <a16:creationId xmlns:a16="http://schemas.microsoft.com/office/drawing/2014/main" id="{2E2FA21B-CEA6-482F-B69A-027B4E5A2B6A}"/>
+              </a:ext>
+            </a:extLst>
+          </p:cNvPr>
+          <p:cNvSpPr>
+            <a:spLocks noGrp="1"/>
+          </p:cNvSpPr>
+          <p:nvPr>
+            <p:ph type="title"/>
+          </p:nvPr>
+        </p:nvSpPr>
+        <p:spPr/>
+        <p:txBody>
+          <a:bodyPr/>
+          <a:lstStyle/>
+          <a:p>
+            <a:endParaRPr lang="en-CA" sz="4000" dirty="0"/>
+          </a:p>
+        </p:txBody>
+      </p:sp>
+    </p:spTree>
+    <p:extLst>
+      <p:ext uri="{BB962C8B-B14F-4D97-AF65-F5344CB8AC3E}">
+        <p14:creationId xmlns:p14="http://schemas.microsoft.com/office/powerpoint/2010/main" val="199334012"/>
+      </p:ext>
+    </p:extLst>
+  </p:cSld>
+  <p:clrMapOvr>
+    <a:masterClrMapping/>
+  </p:clrMapOvr>
+</p:sld>
+</file>
+
+<file path=ppt/slides/slide53.xml><?xml version="1.0" encoding="utf-8"?>
+<p:sld xmlns:a="http://schemas.openxmlformats.org/drawingml/2006/main" xmlns:r="http://schemas.openxmlformats.org/officeDocument/2006/relationships" xmlns:p="http://schemas.openxmlformats.org/presentationml/2006/main">
+  <p:cSld>
+    <p:spTree>
+      <p:nvGrpSpPr>
+        <p:cNvPr id="1" name=""/>
+        <p:cNvGrpSpPr/>
+        <p:nvPr/>
+      </p:nvGrpSpPr>
+      <p:grpSpPr>
+        <a:xfrm>
+          <a:off x="0" y="0"/>
+          <a:ext cx="0" cy="0"/>
+          <a:chOff x="0" y="0"/>
+          <a:chExt cx="0" cy="0"/>
+        </a:xfrm>
+      </p:grpSpPr>
+      <p:sp>
+        <p:nvSpPr>
+          <p:cNvPr id="2" name="Title 1" descr="Customer Title">
+            <a:extLst>
+              <a:ext uri="{FF2B5EF4-FFF2-40B4-BE49-F238E27FC236}">
+                <a16:creationId xmlns:a16="http://schemas.microsoft.com/office/drawing/2014/main" id="{515A6877-5D3A-4508-94FD-4AB154270C6C}"/>
+              </a:ext>
+            </a:extLst>
+          </p:cNvPr>
+          <p:cNvSpPr>
+            <a:spLocks noGrp="1"/>
+          </p:cNvSpPr>
+          <p:nvPr>
+            <p:ph type="title"/>
+          </p:nvPr>
+        </p:nvSpPr>
+        <p:spPr/>
+        <p:txBody>
+          <a:bodyPr/>
+          <a:lstStyle/>
+          <a:p>
+            <a:endParaRPr lang="en-CA" sz="4000" dirty="0"/>
+          </a:p>
+        </p:txBody>
+      </p:sp>
+    </p:spTree>
+    <p:extLst>
+      <p:ext uri="{BB962C8B-B14F-4D97-AF65-F5344CB8AC3E}">
+        <p14:creationId xmlns:p14="http://schemas.microsoft.com/office/powerpoint/2010/main" val="4181018087"/>
+      </p:ext>
+    </p:extLst>
+  </p:cSld>
+  <p:clrMapOvr>
+    <a:masterClrMapping/>
+  </p:clrMapOvr>
+</p:sld>
+</file>
+
+<file path=ppt/slides/slide54.xml><?xml version="1.0" encoding="utf-8"?>
+<p:sld xmlns:a="http://schemas.openxmlformats.org/drawingml/2006/main" xmlns:r="http://schemas.openxmlformats.org/officeDocument/2006/relationships" xmlns:p="http://schemas.openxmlformats.org/presentationml/2006/main">
+  <p:cSld>
+    <p:spTree>
+      <p:nvGrpSpPr>
+        <p:cNvPr id="1" name=""/>
+        <p:cNvGrpSpPr/>
+        <p:nvPr/>
+      </p:nvGrpSpPr>
+      <p:grpSpPr>
+        <a:xfrm>
+          <a:off x="0" y="0"/>
+          <a:ext cx="0" cy="0"/>
+          <a:chOff x="0" y="0"/>
+          <a:chExt cx="0" cy="0"/>
+        </a:xfrm>
+      </p:grpSpPr>
+      <p:sp>
+        <p:nvSpPr>
+          <p:cNvPr id="2" name="Title 1" descr="Customer Title No Photo">
+            <a:extLst>
+              <a:ext uri="{FF2B5EF4-FFF2-40B4-BE49-F238E27FC236}">
+                <a16:creationId xmlns:a16="http://schemas.microsoft.com/office/drawing/2014/main" id="{55D06C87-1034-4B2D-A67A-5543915EF509}"/>
+              </a:ext>
+            </a:extLst>
+          </p:cNvPr>
+          <p:cNvSpPr>
+            <a:spLocks noGrp="1"/>
+          </p:cNvSpPr>
+          <p:nvPr>
+            <p:ph type="title"/>
+          </p:nvPr>
+        </p:nvSpPr>
+        <p:spPr/>
+        <p:txBody>
+          <a:bodyPr/>
+          <a:lstStyle/>
+          <a:p>
+            <a:endParaRPr lang="en-CA" sz="4000" dirty="0"/>
+          </a:p>
+        </p:txBody>
+      </p:sp>
+    </p:spTree>
+    <p:extLst>
+      <p:ext uri="{BB962C8B-B14F-4D97-AF65-F5344CB8AC3E}">
+        <p14:creationId xmlns:p14="http://schemas.microsoft.com/office/powerpoint/2010/main" val="1787632021"/>
+      </p:ext>
+    </p:extLst>
+  </p:cSld>
+  <p:clrMapOvr>
+    <a:masterClrMapping/>
+  </p:clrMapOvr>
+</p:sld>
+</file>
+
+<file path=ppt/slides/slide55.xml><?xml version="1.0" encoding="utf-8"?>
+<p:sld xmlns:a="http://schemas.openxmlformats.org/drawingml/2006/main" xmlns:r="http://schemas.openxmlformats.org/officeDocument/2006/relationships" xmlns:p="http://schemas.openxmlformats.org/presentationml/2006/main">
+  <p:cSld>
+    <p:spTree>
+      <p:nvGrpSpPr>
+        <p:cNvPr id="1" name=""/>
+        <p:cNvGrpSpPr/>
+        <p:nvPr/>
+      </p:nvGrpSpPr>
+      <p:grpSpPr>
+        <a:xfrm>
+          <a:off x="0" y="0"/>
+          <a:ext cx="0" cy="0"/>
+          <a:chOff x="0" y="0"/>
+          <a:chExt cx="0" cy="0"/>
+        </a:xfrm>
+      </p:grpSpPr>
+      <p:sp>
+        <p:nvSpPr>
+          <p:cNvPr id="2" name="Title 1">
+            <a:extLst>
+              <a:ext uri="{FF2B5EF4-FFF2-40B4-BE49-F238E27FC236}">
+                <a16:creationId xmlns:a16="http://schemas.microsoft.com/office/drawing/2014/main" id="{4DCB9659-72B0-49AC-876B-38099C19261E}"/>
+              </a:ext>
+            </a:extLst>
+          </p:cNvPr>
+          <p:cNvSpPr>
+            <a:spLocks noGrp="1"/>
+          </p:cNvSpPr>
+          <p:nvPr>
+            <p:ph type="title"/>
+          </p:nvPr>
+        </p:nvSpPr>
+        <p:spPr/>
+        <p:txBody>
+          <a:bodyPr/>
+          <a:lstStyle/>
+          <a:p>
+            <a:endParaRPr lang="en-CA" sz="4000" dirty="0"/>
+          </a:p>
+        </p:txBody>
+      </p:sp>
+    </p:spTree>
+    <p:extLst>
+      <p:ext uri="{BB962C8B-B14F-4D97-AF65-F5344CB8AC3E}">
+        <p14:creationId xmlns:p14="http://schemas.microsoft.com/office/powerpoint/2010/main" val="898057510"/>
+      </p:ext>
+    </p:extLst>
+  </p:cSld>
+  <p:clrMapOvr>
+    <a:masterClrMapping/>
+  </p:clrMapOvr>
+</p:sld>
+</file>
+
+<file path=ppt/slides/slide56.xml><?xml version="1.0" encoding="utf-8"?>
+<p:sld xmlns:a="http://schemas.openxmlformats.org/drawingml/2006/main" xmlns:r="http://schemas.openxmlformats.org/officeDocument/2006/relationships" xmlns:p="http://schemas.openxmlformats.org/presentationml/2006/main">
+  <p:cSld>
+    <p:spTree>
+      <p:nvGrpSpPr>
+        <p:cNvPr id="1" name=""/>
+        <p:cNvGrpSpPr/>
+        <p:nvPr/>
+      </p:nvGrpSpPr>
+      <p:grpSpPr>
+        <a:xfrm>
+          <a:off x="0" y="0"/>
+          <a:ext cx="0" cy="0"/>
+          <a:chOff x="0" y="0"/>
+          <a:chExt cx="0" cy="0"/>
+        </a:xfrm>
+      </p:grpSpPr>
+      <p:sp>
+        <p:nvSpPr>
+          <p:cNvPr id="2" name="Title 1" descr="Case Study No Photo">
+            <a:extLst>
+              <a:ext uri="{FF2B5EF4-FFF2-40B4-BE49-F238E27FC236}">
+                <a16:creationId xmlns:a16="http://schemas.microsoft.com/office/drawing/2014/main" id="{EBF72FA5-E29A-45FD-B561-B948E9B3E568}"/>
+              </a:ext>
+            </a:extLst>
+          </p:cNvPr>
+          <p:cNvSpPr>
+            <a:spLocks noGrp="1"/>
+          </p:cNvSpPr>
+          <p:nvPr>
+            <p:ph type="title"/>
+          </p:nvPr>
+        </p:nvSpPr>
+        <p:spPr/>
+        <p:txBody>
+          <a:bodyPr/>
+          <a:lstStyle/>
+          <a:p>
+            <a:endParaRPr lang="en-CA" sz="4000" dirty="0"/>
+          </a:p>
+        </p:txBody>
+      </p:sp>
+    </p:spTree>
+    <p:extLst>
+      <p:ext uri="{BB962C8B-B14F-4D97-AF65-F5344CB8AC3E}">
+        <p14:creationId xmlns:p14="http://schemas.microsoft.com/office/powerpoint/2010/main" val="961852935"/>
       </p:ext>
     </p:extLst>
   </p:cSld>

</xml_diff>

<commit_message>
Remove extra slides at end of presentation.
</commit_message>
<xml_diff>
--- a/Hansen - Get Your Optimizer to Give up All Its Secrets.pptx
+++ b/Hansen - Get Your Optimizer to Give up All Its Secrets.pptx
@@ -5,10 +5,10 @@
     <p:sldMasterId id="2147483648" r:id="rId4"/>
   </p:sldMasterIdLst>
   <p:notesMasterIdLst>
-    <p:notesMasterId r:id="rId72"/>
+    <p:notesMasterId r:id="rId52"/>
   </p:notesMasterIdLst>
   <p:handoutMasterIdLst>
-    <p:handoutMasterId r:id="rId73"/>
+    <p:handoutMasterId r:id="rId53"/>
   </p:handoutMasterIdLst>
   <p:sldIdLst>
     <p:sldId id="295" r:id="rId5"/>
@@ -58,31 +58,11 @@
     <p:sldId id="335" r:id="rId49"/>
     <p:sldId id="337" r:id="rId50"/>
     <p:sldId id="296" r:id="rId51"/>
-    <p:sldId id="261" r:id="rId52"/>
-    <p:sldId id="262" r:id="rId53"/>
-    <p:sldId id="275" r:id="rId54"/>
-    <p:sldId id="288" r:id="rId55"/>
-    <p:sldId id="289" r:id="rId56"/>
-    <p:sldId id="290" r:id="rId57"/>
-    <p:sldId id="265" r:id="rId58"/>
-    <p:sldId id="266" r:id="rId59"/>
-    <p:sldId id="267" r:id="rId60"/>
-    <p:sldId id="268" r:id="rId61"/>
-    <p:sldId id="274" r:id="rId62"/>
-    <p:sldId id="285" r:id="rId63"/>
-    <p:sldId id="292" r:id="rId64"/>
-    <p:sldId id="278" r:id="rId65"/>
-    <p:sldId id="279" r:id="rId66"/>
-    <p:sldId id="280" r:id="rId67"/>
-    <p:sldId id="281" r:id="rId68"/>
-    <p:sldId id="282" r:id="rId69"/>
-    <p:sldId id="291" r:id="rId70"/>
-    <p:sldId id="284" r:id="rId71"/>
   </p:sldIdLst>
   <p:sldSz cx="9144000" cy="5143500" type="screen16x9"/>
   <p:notesSz cx="6858000" cy="9144000"/>
   <p:custDataLst>
-    <p:tags r:id="rId74"/>
+    <p:tags r:id="rId54"/>
   </p:custDataLst>
   <p:defaultTextStyle>
     <a:defPPr>
@@ -234,28 +214,7 @@
           </p14:sldIdLst>
         </p14:section>
         <p14:section name="REFERENCE SLIDES" id="{1BF493E7-959B-4098-9BC3-C5CDEA4CA9C0}">
-          <p14:sldIdLst>
-            <p14:sldId id="261"/>
-            <p14:sldId id="262"/>
-            <p14:sldId id="275"/>
-            <p14:sldId id="288"/>
-            <p14:sldId id="289"/>
-            <p14:sldId id="290"/>
-            <p14:sldId id="265"/>
-            <p14:sldId id="266"/>
-            <p14:sldId id="267"/>
-            <p14:sldId id="268"/>
-            <p14:sldId id="274"/>
-            <p14:sldId id="285"/>
-            <p14:sldId id="292"/>
-            <p14:sldId id="278"/>
-            <p14:sldId id="279"/>
-            <p14:sldId id="280"/>
-            <p14:sldId id="281"/>
-            <p14:sldId id="282"/>
-            <p14:sldId id="291"/>
-            <p14:sldId id="284"/>
-          </p14:sldIdLst>
+          <p14:sldIdLst/>
         </p14:section>
       </p14:sectionLst>
     </p:ext>
@@ -6542,36 +6501,6 @@
     <p:extLst>
       <p:ext uri="{BB962C8B-B14F-4D97-AF65-F5344CB8AC3E}">
         <p14:creationId xmlns:p14="http://schemas.microsoft.com/office/powerpoint/2010/main" val="3021953614"/>
-      </p:ext>
-    </p:extLst>
-  </p:cSld>
-  <p:clrMapOvr>
-    <a:masterClrMapping/>
-  </p:clrMapOvr>
-</p:sldLayout>
-</file>
-
-<file path=ppt/slideLayouts/slideLayout28.xml><?xml version="1.0" encoding="utf-8"?>
-<p:sldLayout xmlns:a="http://schemas.openxmlformats.org/drawingml/2006/main" xmlns:r="http://schemas.openxmlformats.org/officeDocument/2006/relationships" xmlns:p="http://schemas.openxmlformats.org/presentationml/2006/main" userDrawn="1">
-  <p:cSld name="Blank">
-    <p:spTree>
-      <p:nvGrpSpPr>
-        <p:cNvPr id="1" name=""/>
-        <p:cNvGrpSpPr/>
-        <p:nvPr/>
-      </p:nvGrpSpPr>
-      <p:grpSpPr>
-        <a:xfrm>
-          <a:off x="0" y="0"/>
-          <a:ext cx="0" cy="0"/>
-          <a:chOff x="0" y="0"/>
-          <a:chExt cx="0" cy="0"/>
-        </a:xfrm>
-      </p:grpSpPr>
-    </p:spTree>
-    <p:extLst>
-      <p:ext uri="{BB962C8B-B14F-4D97-AF65-F5344CB8AC3E}">
-        <p14:creationId xmlns:p14="http://schemas.microsoft.com/office/powerpoint/2010/main" val="2027683231"/>
       </p:ext>
     </p:extLst>
   </p:cSld>
@@ -9842,7 +9771,6 @@
     <p:sldLayoutId id="2147483752" r:id="rId25"/>
     <p:sldLayoutId id="2147483750" r:id="rId26"/>
     <p:sldLayoutId id="2147483744" r:id="rId27"/>
-    <p:sldLayoutId id="2147483734" r:id="rId28"/>
   </p:sldLayoutIdLst>
   <p:hf hdr="0" ftr="0" dt="0"/>
   <p:txStyles>
@@ -24346,122 +24274,6 @@
 </p:sld>
 </file>
 
-<file path=ppt/slides/slide48.xml><?xml version="1.0" encoding="utf-8"?>
-<p:sld xmlns:a="http://schemas.openxmlformats.org/drawingml/2006/main" xmlns:r="http://schemas.openxmlformats.org/officeDocument/2006/relationships" xmlns:p="http://schemas.openxmlformats.org/presentationml/2006/main">
-  <p:cSld>
-    <p:spTree>
-      <p:nvGrpSpPr>
-        <p:cNvPr id="1" name=""/>
-        <p:cNvGrpSpPr/>
-        <p:nvPr/>
-      </p:nvGrpSpPr>
-      <p:grpSpPr>
-        <a:xfrm>
-          <a:off x="0" y="0"/>
-          <a:ext cx="0" cy="0"/>
-          <a:chOff x="0" y="0"/>
-          <a:chExt cx="0" cy="0"/>
-        </a:xfrm>
-      </p:grpSpPr>
-      <p:sp>
-        <p:nvSpPr>
-          <p:cNvPr id="2" name="Title 1">
-            <a:extLst>
-              <a:ext uri="{FF2B5EF4-FFF2-40B4-BE49-F238E27FC236}">
-                <a16:creationId xmlns:a16="http://schemas.microsoft.com/office/drawing/2014/main" id="{85239CF5-D7FE-43AA-B0E2-34186B0CDBAE}"/>
-              </a:ext>
-            </a:extLst>
-          </p:cNvPr>
-          <p:cNvSpPr>
-            <a:spLocks noGrp="1"/>
-          </p:cNvSpPr>
-          <p:nvPr>
-            <p:ph type="title"/>
-          </p:nvPr>
-        </p:nvSpPr>
-        <p:spPr/>
-        <p:txBody>
-          <a:bodyPr/>
-          <a:lstStyle/>
-          <a:p>
-            <a:r>
-              <a:rPr lang="en-CA" dirty="0"/>
-              <a:t>Palette</a:t>
-            </a:r>
-          </a:p>
-        </p:txBody>
-      </p:sp>
-    </p:spTree>
-    <p:extLst>
-      <p:ext uri="{BB962C8B-B14F-4D97-AF65-F5344CB8AC3E}">
-        <p14:creationId xmlns:p14="http://schemas.microsoft.com/office/powerpoint/2010/main" val="3502767713"/>
-      </p:ext>
-    </p:extLst>
-  </p:cSld>
-  <p:clrMapOvr>
-    <a:masterClrMapping/>
-  </p:clrMapOvr>
-</p:sld>
-</file>
-
-<file path=ppt/slides/slide49.xml><?xml version="1.0" encoding="utf-8"?>
-<p:sld xmlns:a="http://schemas.openxmlformats.org/drawingml/2006/main" xmlns:r="http://schemas.openxmlformats.org/officeDocument/2006/relationships" xmlns:p="http://schemas.openxmlformats.org/presentationml/2006/main">
-  <p:cSld>
-    <p:spTree>
-      <p:nvGrpSpPr>
-        <p:cNvPr id="1" name=""/>
-        <p:cNvGrpSpPr/>
-        <p:nvPr/>
-      </p:nvGrpSpPr>
-      <p:grpSpPr>
-        <a:xfrm>
-          <a:off x="0" y="0"/>
-          <a:ext cx="0" cy="0"/>
-          <a:chOff x="0" y="0"/>
-          <a:chExt cx="0" cy="0"/>
-        </a:xfrm>
-      </p:grpSpPr>
-      <p:sp>
-        <p:nvSpPr>
-          <p:cNvPr id="2" name="Title 1">
-            <a:extLst>
-              <a:ext uri="{FF2B5EF4-FFF2-40B4-BE49-F238E27FC236}">
-                <a16:creationId xmlns:a16="http://schemas.microsoft.com/office/drawing/2014/main" id="{5E9C0A8A-D37A-46F3-807F-51E0F7F7B70F}"/>
-              </a:ext>
-            </a:extLst>
-          </p:cNvPr>
-          <p:cNvSpPr>
-            <a:spLocks noGrp="1"/>
-          </p:cNvSpPr>
-          <p:nvPr>
-            <p:ph type="title"/>
-          </p:nvPr>
-        </p:nvSpPr>
-        <p:spPr/>
-        <p:txBody>
-          <a:bodyPr/>
-          <a:lstStyle/>
-          <a:p>
-            <a:r>
-              <a:rPr lang="en-CA" dirty="0"/>
-              <a:t>Font Colors</a:t>
-            </a:r>
-          </a:p>
-        </p:txBody>
-      </p:sp>
-    </p:spTree>
-    <p:extLst>
-      <p:ext uri="{BB962C8B-B14F-4D97-AF65-F5344CB8AC3E}">
-        <p14:creationId xmlns:p14="http://schemas.microsoft.com/office/powerpoint/2010/main" val="336367552"/>
-      </p:ext>
-    </p:extLst>
-  </p:cSld>
-  <p:clrMapOvr>
-    <a:masterClrMapping/>
-  </p:clrMapOvr>
-</p:sld>
-</file>
-
 <file path=ppt/slides/slide5.xml><?xml version="1.0" encoding="utf-8"?>
 <p:sld xmlns:a="http://schemas.openxmlformats.org/drawingml/2006/main" xmlns:r="http://schemas.openxmlformats.org/officeDocument/2006/relationships" xmlns:p="http://schemas.openxmlformats.org/presentationml/2006/main">
   <p:cSld>
@@ -24511,3206 +24323,6 @@
     <p:extLst>
       <p:ext uri="{BB962C8B-B14F-4D97-AF65-F5344CB8AC3E}">
         <p14:creationId xmlns:p14="http://schemas.microsoft.com/office/powerpoint/2010/main" val="439548924"/>
-      </p:ext>
-    </p:extLst>
-  </p:cSld>
-  <p:clrMapOvr>
-    <a:masterClrMapping/>
-  </p:clrMapOvr>
-</p:sld>
-</file>
-
-<file path=ppt/slides/slide50.xml><?xml version="1.0" encoding="utf-8"?>
-<p:sld xmlns:a="http://schemas.openxmlformats.org/drawingml/2006/main" xmlns:r="http://schemas.openxmlformats.org/officeDocument/2006/relationships" xmlns:p="http://schemas.openxmlformats.org/presentationml/2006/main">
-  <p:cSld>
-    <p:spTree>
-      <p:nvGrpSpPr>
-        <p:cNvPr id="1" name=""/>
-        <p:cNvGrpSpPr/>
-        <p:nvPr/>
-      </p:nvGrpSpPr>
-      <p:grpSpPr>
-        <a:xfrm>
-          <a:off x="0" y="0"/>
-          <a:ext cx="0" cy="0"/>
-          <a:chOff x="0" y="0"/>
-          <a:chExt cx="0" cy="0"/>
-        </a:xfrm>
-      </p:grpSpPr>
-      <p:sp>
-        <p:nvSpPr>
-          <p:cNvPr id="2" name="Title 1" descr="Social Media Icon Reference Slide">
-            <a:extLst>
-              <a:ext uri="{FF2B5EF4-FFF2-40B4-BE49-F238E27FC236}">
-                <a16:creationId xmlns:a16="http://schemas.microsoft.com/office/drawing/2014/main" id="{F531AEB4-2BF0-E14A-BE61-270A53AEF7E7}"/>
-              </a:ext>
-            </a:extLst>
-          </p:cNvPr>
-          <p:cNvSpPr txBox="1">
-            <a:spLocks/>
-          </p:cNvSpPr>
-          <p:nvPr/>
-        </p:nvSpPr>
-        <p:spPr>
-          <a:xfrm>
-            <a:off x="325876" y="378621"/>
-            <a:ext cx="8431205" cy="614029"/>
-          </a:xfrm>
-          <a:prstGeom prst="rect">
-            <a:avLst/>
-          </a:prstGeom>
-        </p:spPr>
-        <p:txBody>
-          <a:bodyPr/>
-          <a:lstStyle>
-            <a:lvl1pPr marL="0" marR="0" indent="0" algn="l" defTabSz="457200" rtl="0" eaLnBrk="1" fontAlgn="auto" latinLnBrk="0" hangingPunct="1">
-              <a:lnSpc>
-                <a:spcPts val="3500"/>
-              </a:lnSpc>
-              <a:spcBef>
-                <a:spcPct val="0"/>
-              </a:spcBef>
-              <a:spcAft>
-                <a:spcPts val="0"/>
-              </a:spcAft>
-              <a:buClrTx/>
-              <a:buSzTx/>
-              <a:buFontTx/>
-              <a:buNone/>
-              <a:tabLst/>
-              <a:defRPr kumimoji="0" lang="en-US" sz="3600" b="0" i="0" u="none" strike="noStrike" kern="1200" cap="none" spc="0" normalizeH="0" baseline="0">
-                <a:ln>
-                  <a:noFill/>
-                </a:ln>
-                <a:solidFill>
-                  <a:schemeClr val="tx1"/>
-                </a:solidFill>
-                <a:effectLst/>
-                <a:uLnTx/>
-                <a:uFillTx/>
-                <a:latin typeface="Segoe UI Light" charset="0"/>
-                <a:ea typeface="Segoe UI Light" charset="0"/>
-                <a:cs typeface="Segoe UI Light" charset="0"/>
-              </a:defRPr>
-            </a:lvl1pPr>
-          </a:lstStyle>
-          <a:p>
-            <a:r>
-              <a:rPr lang="en-CA" b="1" dirty="0">
-                <a:latin typeface="Segoe UI" panose="020B0502040204020203" pitchFamily="34" charset="0"/>
-                <a:cs typeface="Segoe UI" panose="020B0502040204020203" pitchFamily="34" charset="0"/>
-              </a:rPr>
-              <a:t>Social Media Icons - Reference Slide </a:t>
-            </a:r>
-          </a:p>
-        </p:txBody>
-      </p:sp>
-      <p:sp>
-        <p:nvSpPr>
-          <p:cNvPr id="5" name="Title 4">
-            <a:extLst>
-              <a:ext uri="{FF2B5EF4-FFF2-40B4-BE49-F238E27FC236}">
-                <a16:creationId xmlns:a16="http://schemas.microsoft.com/office/drawing/2014/main" id="{522C0646-DE41-4C01-9BB6-1D22C1A158E3}"/>
-              </a:ext>
-              <a:ext uri="{C183D7F6-B498-43B3-948B-1728B52AA6E4}">
-                <adec:decorative xmlns:adec="http://schemas.microsoft.com/office/drawing/2017/decorative" val="1"/>
-              </a:ext>
-            </a:extLst>
-          </p:cNvPr>
-          <p:cNvSpPr>
-            <a:spLocks noGrp="1"/>
-          </p:cNvSpPr>
-          <p:nvPr>
-            <p:ph type="title" idx="4294967295"/>
-          </p:nvPr>
-        </p:nvSpPr>
-        <p:spPr>
-          <a:xfrm>
-            <a:off x="0" y="-534123"/>
-            <a:ext cx="7886700" cy="534124"/>
-          </a:xfrm>
-          <a:prstGeom prst="rect">
-            <a:avLst/>
-          </a:prstGeom>
-        </p:spPr>
-        <p:txBody>
-          <a:bodyPr/>
-          <a:lstStyle/>
-          <a:p>
-            <a:r>
-              <a:rPr lang="en-CA" sz="900" dirty="0"/>
-              <a:t>Social Media Icons</a:t>
-            </a:r>
-          </a:p>
-        </p:txBody>
-      </p:sp>
-      <p:pic>
-        <p:nvPicPr>
-          <p:cNvPr id="16" name="Picture 15">
-            <a:extLst>
-              <a:ext uri="{FF2B5EF4-FFF2-40B4-BE49-F238E27FC236}">
-                <a16:creationId xmlns:a16="http://schemas.microsoft.com/office/drawing/2014/main" id="{9AF2A3B1-F4E4-3242-803B-183428922138}"/>
-              </a:ext>
-              <a:ext uri="{C183D7F6-B498-43B3-948B-1728B52AA6E4}">
-                <adec:decorative xmlns:adec="http://schemas.microsoft.com/office/drawing/2017/decorative" val="1"/>
-              </a:ext>
-            </a:extLst>
-          </p:cNvPr>
-          <p:cNvPicPr>
-            <a:picLocks noChangeAspect="1"/>
-          </p:cNvPicPr>
-          <p:nvPr/>
-        </p:nvPicPr>
-        <p:blipFill>
-          <a:blip r:embed="rId2"/>
-          <a:stretch>
-            <a:fillRect/>
-          </a:stretch>
-        </p:blipFill>
-        <p:spPr>
-          <a:xfrm>
-            <a:off x="417368" y="1174173"/>
-            <a:ext cx="342900" cy="342900"/>
-          </a:xfrm>
-          <a:prstGeom prst="rect">
-            <a:avLst/>
-          </a:prstGeom>
-        </p:spPr>
-      </p:pic>
-      <p:pic>
-        <p:nvPicPr>
-          <p:cNvPr id="17" name="Picture 16">
-            <a:extLst>
-              <a:ext uri="{FF2B5EF4-FFF2-40B4-BE49-F238E27FC236}">
-                <a16:creationId xmlns:a16="http://schemas.microsoft.com/office/drawing/2014/main" id="{A04EA4DF-0110-2B40-86B1-1330DFDA3043}"/>
-              </a:ext>
-              <a:ext uri="{C183D7F6-B498-43B3-948B-1728B52AA6E4}">
-                <adec:decorative xmlns:adec="http://schemas.microsoft.com/office/drawing/2017/decorative" val="1"/>
-              </a:ext>
-            </a:extLst>
-          </p:cNvPr>
-          <p:cNvPicPr>
-            <a:picLocks noChangeAspect="1"/>
-          </p:cNvPicPr>
-          <p:nvPr/>
-        </p:nvPicPr>
-        <p:blipFill>
-          <a:blip r:embed="rId3"/>
-          <a:stretch>
-            <a:fillRect/>
-          </a:stretch>
-        </p:blipFill>
-        <p:spPr>
-          <a:xfrm>
-            <a:off x="417368" y="1665691"/>
-            <a:ext cx="342900" cy="342900"/>
-          </a:xfrm>
-          <a:prstGeom prst="rect">
-            <a:avLst/>
-          </a:prstGeom>
-        </p:spPr>
-      </p:pic>
-      <p:pic>
-        <p:nvPicPr>
-          <p:cNvPr id="18" name="Picture 17">
-            <a:extLst>
-              <a:ext uri="{FF2B5EF4-FFF2-40B4-BE49-F238E27FC236}">
-                <a16:creationId xmlns:a16="http://schemas.microsoft.com/office/drawing/2014/main" id="{1AC6F44D-BD0E-A34A-873F-02A8A6C5A450}"/>
-              </a:ext>
-              <a:ext uri="{C183D7F6-B498-43B3-948B-1728B52AA6E4}">
-                <adec:decorative xmlns:adec="http://schemas.microsoft.com/office/drawing/2017/decorative" val="1"/>
-              </a:ext>
-            </a:extLst>
-          </p:cNvPr>
-          <p:cNvPicPr>
-            <a:picLocks noChangeAspect="1"/>
-          </p:cNvPicPr>
-          <p:nvPr/>
-        </p:nvPicPr>
-        <p:blipFill>
-          <a:blip r:embed="rId4"/>
-          <a:stretch>
-            <a:fillRect/>
-          </a:stretch>
-        </p:blipFill>
-        <p:spPr>
-          <a:xfrm>
-            <a:off x="417368" y="2157209"/>
-            <a:ext cx="342900" cy="342900"/>
-          </a:xfrm>
-          <a:prstGeom prst="rect">
-            <a:avLst/>
-          </a:prstGeom>
-        </p:spPr>
-      </p:pic>
-      <p:pic>
-        <p:nvPicPr>
-          <p:cNvPr id="19" name="Picture 18">
-            <a:extLst>
-              <a:ext uri="{FF2B5EF4-FFF2-40B4-BE49-F238E27FC236}">
-                <a16:creationId xmlns:a16="http://schemas.microsoft.com/office/drawing/2014/main" id="{65B80F35-5E65-194E-A1DD-7C696D1D1FE3}"/>
-              </a:ext>
-              <a:ext uri="{C183D7F6-B498-43B3-948B-1728B52AA6E4}">
-                <adec:decorative xmlns:adec="http://schemas.microsoft.com/office/drawing/2017/decorative" val="1"/>
-              </a:ext>
-            </a:extLst>
-          </p:cNvPr>
-          <p:cNvPicPr>
-            <a:picLocks noChangeAspect="1"/>
-          </p:cNvPicPr>
-          <p:nvPr/>
-        </p:nvPicPr>
-        <p:blipFill>
-          <a:blip r:embed="rId5"/>
-          <a:stretch>
-            <a:fillRect/>
-          </a:stretch>
-        </p:blipFill>
-        <p:spPr>
-          <a:xfrm>
-            <a:off x="417368" y="2643392"/>
-            <a:ext cx="342900" cy="342900"/>
-          </a:xfrm>
-          <a:prstGeom prst="rect">
-            <a:avLst/>
-          </a:prstGeom>
-        </p:spPr>
-      </p:pic>
-      <p:pic>
-        <p:nvPicPr>
-          <p:cNvPr id="20" name="Picture 19">
-            <a:extLst>
-              <a:ext uri="{FF2B5EF4-FFF2-40B4-BE49-F238E27FC236}">
-                <a16:creationId xmlns:a16="http://schemas.microsoft.com/office/drawing/2014/main" id="{D46072E9-AC9D-8B45-B444-735245345F9C}"/>
-              </a:ext>
-              <a:ext uri="{C183D7F6-B498-43B3-948B-1728B52AA6E4}">
-                <adec:decorative xmlns:adec="http://schemas.microsoft.com/office/drawing/2017/decorative" val="1"/>
-              </a:ext>
-            </a:extLst>
-          </p:cNvPr>
-          <p:cNvPicPr>
-            <a:picLocks noChangeAspect="1"/>
-          </p:cNvPicPr>
-          <p:nvPr/>
-        </p:nvPicPr>
-        <p:blipFill>
-          <a:blip r:embed="rId6"/>
-          <a:stretch>
-            <a:fillRect/>
-          </a:stretch>
-        </p:blipFill>
-        <p:spPr>
-          <a:xfrm>
-            <a:off x="1955222" y="1174173"/>
-            <a:ext cx="342900" cy="342900"/>
-          </a:xfrm>
-          <a:prstGeom prst="rect">
-            <a:avLst/>
-          </a:prstGeom>
-        </p:spPr>
-      </p:pic>
-      <p:pic>
-        <p:nvPicPr>
-          <p:cNvPr id="21" name="Picture 20">
-            <a:extLst>
-              <a:ext uri="{FF2B5EF4-FFF2-40B4-BE49-F238E27FC236}">
-                <a16:creationId xmlns:a16="http://schemas.microsoft.com/office/drawing/2014/main" id="{C2510DF4-C305-C140-A676-AC638513D841}"/>
-              </a:ext>
-              <a:ext uri="{C183D7F6-B498-43B3-948B-1728B52AA6E4}">
-                <adec:decorative xmlns:adec="http://schemas.microsoft.com/office/drawing/2017/decorative" val="1"/>
-              </a:ext>
-            </a:extLst>
-          </p:cNvPr>
-          <p:cNvPicPr>
-            <a:picLocks noChangeAspect="1"/>
-          </p:cNvPicPr>
-          <p:nvPr/>
-        </p:nvPicPr>
-        <p:blipFill>
-          <a:blip r:embed="rId7"/>
-          <a:stretch>
-            <a:fillRect/>
-          </a:stretch>
-        </p:blipFill>
-        <p:spPr>
-          <a:xfrm>
-            <a:off x="1955222" y="1662366"/>
-            <a:ext cx="342900" cy="342900"/>
-          </a:xfrm>
-          <a:prstGeom prst="rect">
-            <a:avLst/>
-          </a:prstGeom>
-        </p:spPr>
-      </p:pic>
-      <p:pic>
-        <p:nvPicPr>
-          <p:cNvPr id="22" name="Picture 21">
-            <a:extLst>
-              <a:ext uri="{FF2B5EF4-FFF2-40B4-BE49-F238E27FC236}">
-                <a16:creationId xmlns:a16="http://schemas.microsoft.com/office/drawing/2014/main" id="{1E5A8B70-B8A2-E14A-8AD2-8D6B681BF34C}"/>
-              </a:ext>
-              <a:ext uri="{C183D7F6-B498-43B3-948B-1728B52AA6E4}">
-                <adec:decorative xmlns:adec="http://schemas.microsoft.com/office/drawing/2017/decorative" val="1"/>
-              </a:ext>
-            </a:extLst>
-          </p:cNvPr>
-          <p:cNvPicPr>
-            <a:picLocks noChangeAspect="1"/>
-          </p:cNvPicPr>
-          <p:nvPr/>
-        </p:nvPicPr>
-        <p:blipFill>
-          <a:blip r:embed="rId8"/>
-          <a:stretch>
-            <a:fillRect/>
-          </a:stretch>
-        </p:blipFill>
-        <p:spPr>
-          <a:xfrm>
-            <a:off x="1955222" y="2150559"/>
-            <a:ext cx="342900" cy="342900"/>
-          </a:xfrm>
-          <a:prstGeom prst="rect">
-            <a:avLst/>
-          </a:prstGeom>
-        </p:spPr>
-      </p:pic>
-      <p:sp>
-        <p:nvSpPr>
-          <p:cNvPr id="3" name="TextBox 2">
-            <a:extLst>
-              <a:ext uri="{FF2B5EF4-FFF2-40B4-BE49-F238E27FC236}">
-                <a16:creationId xmlns:a16="http://schemas.microsoft.com/office/drawing/2014/main" id="{0EB83ADE-10C1-4670-9E0D-32DA0250E7FE}"/>
-              </a:ext>
-            </a:extLst>
-          </p:cNvPr>
-          <p:cNvSpPr txBox="1"/>
-          <p:nvPr/>
-        </p:nvSpPr>
-        <p:spPr>
-          <a:xfrm>
-            <a:off x="3647312" y="1047300"/>
-            <a:ext cx="4835675" cy="1938992"/>
-          </a:xfrm>
-          <a:prstGeom prst="rect">
-            <a:avLst/>
-          </a:prstGeom>
-          <a:noFill/>
-        </p:spPr>
-        <p:txBody>
-          <a:bodyPr wrap="square" rtlCol="0">
-            <a:spAutoFit/>
-          </a:bodyPr>
-          <a:lstStyle/>
-          <a:p>
-            <a:r>
-              <a:rPr lang="en-CA" sz="2400" dirty="0"/>
-              <a:t>Copy and paste the appropriate icon next to your Social Media handle on both the Speaker Profile slide and the Thank You slide.</a:t>
-            </a:r>
-          </a:p>
-        </p:txBody>
-      </p:sp>
-    </p:spTree>
-    <p:extLst>
-      <p:ext uri="{BB962C8B-B14F-4D97-AF65-F5344CB8AC3E}">
-        <p14:creationId xmlns:p14="http://schemas.microsoft.com/office/powerpoint/2010/main" val="2024672355"/>
-      </p:ext>
-    </p:extLst>
-  </p:cSld>
-  <p:clrMapOvr>
-    <a:masterClrMapping/>
-  </p:clrMapOvr>
-</p:sld>
-</file>
-
-<file path=ppt/slides/slide51.xml><?xml version="1.0" encoding="utf-8"?>
-<p:sld xmlns:a="http://schemas.openxmlformats.org/drawingml/2006/main" xmlns:r="http://schemas.openxmlformats.org/officeDocument/2006/relationships" xmlns:p="http://schemas.openxmlformats.org/presentationml/2006/main">
-  <p:cSld>
-    <p:spTree>
-      <p:nvGrpSpPr>
-        <p:cNvPr id="1" name=""/>
-        <p:cNvGrpSpPr/>
-        <p:nvPr/>
-      </p:nvGrpSpPr>
-      <p:grpSpPr>
-        <a:xfrm>
-          <a:off x="0" y="0"/>
-          <a:ext cx="0" cy="0"/>
-          <a:chOff x="0" y="0"/>
-          <a:chExt cx="0" cy="0"/>
-        </a:xfrm>
-      </p:grpSpPr>
-      <p:sp>
-        <p:nvSpPr>
-          <p:cNvPr id="2" name="Text Placeholder 1">
-            <a:extLst>
-              <a:ext uri="{FF2B5EF4-FFF2-40B4-BE49-F238E27FC236}">
-                <a16:creationId xmlns:a16="http://schemas.microsoft.com/office/drawing/2014/main" id="{165DFC08-35FB-4ABA-A562-C63B855BF5E2}"/>
-              </a:ext>
-            </a:extLst>
-          </p:cNvPr>
-          <p:cNvSpPr>
-            <a:spLocks noGrp="1"/>
-          </p:cNvSpPr>
-          <p:nvPr>
-            <p:ph type="body" sz="quarter" idx="10"/>
-          </p:nvPr>
-        </p:nvSpPr>
-        <p:spPr/>
-        <p:txBody>
-          <a:bodyPr/>
-          <a:lstStyle/>
-          <a:p>
-            <a:endParaRPr lang="en-CA" dirty="0"/>
-          </a:p>
-        </p:txBody>
-      </p:sp>
-      <p:sp>
-        <p:nvSpPr>
-          <p:cNvPr id="3" name="Title 2">
-            <a:extLst>
-              <a:ext uri="{FF2B5EF4-FFF2-40B4-BE49-F238E27FC236}">
-                <a16:creationId xmlns:a16="http://schemas.microsoft.com/office/drawing/2014/main" id="{C257F8DC-1D90-48E8-88B7-E3A6907C277C}"/>
-              </a:ext>
-              <a:ext uri="{C183D7F6-B498-43B3-948B-1728B52AA6E4}">
-                <adec:decorative xmlns:adec="http://schemas.microsoft.com/office/drawing/2017/decorative" val="1"/>
-              </a:ext>
-            </a:extLst>
-          </p:cNvPr>
-          <p:cNvSpPr>
-            <a:spLocks noGrp="1"/>
-          </p:cNvSpPr>
-          <p:nvPr>
-            <p:ph type="title" idx="4294967295"/>
-          </p:nvPr>
-        </p:nvSpPr>
-        <p:spPr>
-          <a:xfrm>
-            <a:off x="2659156" y="-424609"/>
-            <a:ext cx="2881032" cy="424609"/>
-          </a:xfrm>
-          <a:prstGeom prst="rect">
-            <a:avLst/>
-          </a:prstGeom>
-        </p:spPr>
-        <p:txBody>
-          <a:bodyPr/>
-          <a:lstStyle/>
-          <a:p>
-            <a:r>
-              <a:rPr lang="en-CA" sz="900" dirty="0"/>
-              <a:t>Section Title 1</a:t>
-            </a:r>
-          </a:p>
-        </p:txBody>
-      </p:sp>
-    </p:spTree>
-    <p:extLst>
-      <p:ext uri="{BB962C8B-B14F-4D97-AF65-F5344CB8AC3E}">
-        <p14:creationId xmlns:p14="http://schemas.microsoft.com/office/powerpoint/2010/main" val="4170201066"/>
-      </p:ext>
-    </p:extLst>
-  </p:cSld>
-  <p:clrMapOvr>
-    <a:masterClrMapping/>
-  </p:clrMapOvr>
-</p:sld>
-</file>
-
-<file path=ppt/slides/slide52.xml><?xml version="1.0" encoding="utf-8"?>
-<p:sld xmlns:a="http://schemas.openxmlformats.org/drawingml/2006/main" xmlns:r="http://schemas.openxmlformats.org/officeDocument/2006/relationships" xmlns:p="http://schemas.openxmlformats.org/presentationml/2006/main">
-  <p:cSld>
-    <p:spTree>
-      <p:nvGrpSpPr>
-        <p:cNvPr id="1" name=""/>
-        <p:cNvGrpSpPr/>
-        <p:nvPr/>
-      </p:nvGrpSpPr>
-      <p:grpSpPr>
-        <a:xfrm>
-          <a:off x="0" y="0"/>
-          <a:ext cx="0" cy="0"/>
-          <a:chOff x="0" y="0"/>
-          <a:chExt cx="0" cy="0"/>
-        </a:xfrm>
-      </p:grpSpPr>
-      <p:sp>
-        <p:nvSpPr>
-          <p:cNvPr id="2" name="Text Placeholder 1">
-            <a:extLst>
-              <a:ext uri="{FF2B5EF4-FFF2-40B4-BE49-F238E27FC236}">
-                <a16:creationId xmlns:a16="http://schemas.microsoft.com/office/drawing/2014/main" id="{ABF370B5-9E19-4260-BA51-45BCAB906B91}"/>
-              </a:ext>
-            </a:extLst>
-          </p:cNvPr>
-          <p:cNvSpPr>
-            <a:spLocks noGrp="1"/>
-          </p:cNvSpPr>
-          <p:nvPr>
-            <p:ph type="body" sz="quarter" idx="10"/>
-          </p:nvPr>
-        </p:nvSpPr>
-        <p:spPr/>
-        <p:txBody>
-          <a:bodyPr/>
-          <a:lstStyle/>
-          <a:p>
-            <a:endParaRPr lang="en-CA" dirty="0"/>
-          </a:p>
-        </p:txBody>
-      </p:sp>
-      <p:sp>
-        <p:nvSpPr>
-          <p:cNvPr id="4" name="Title 3">
-            <a:extLst>
-              <a:ext uri="{FF2B5EF4-FFF2-40B4-BE49-F238E27FC236}">
-                <a16:creationId xmlns:a16="http://schemas.microsoft.com/office/drawing/2014/main" id="{5B32D550-C5AA-46BF-B418-CA14B63EB51A}"/>
-              </a:ext>
-            </a:extLst>
-          </p:cNvPr>
-          <p:cNvSpPr>
-            <a:spLocks noGrp="1"/>
-          </p:cNvSpPr>
-          <p:nvPr>
-            <p:ph type="title" idx="4294967295"/>
-          </p:nvPr>
-        </p:nvSpPr>
-        <p:spPr>
-          <a:xfrm>
-            <a:off x="2198925" y="-639762"/>
-            <a:ext cx="3140550" cy="478397"/>
-          </a:xfrm>
-          <a:prstGeom prst="rect">
-            <a:avLst/>
-          </a:prstGeom>
-        </p:spPr>
-        <p:txBody>
-          <a:bodyPr/>
-          <a:lstStyle/>
-          <a:p>
-            <a:r>
-              <a:rPr lang="en-CA" sz="900" dirty="0"/>
-              <a:t>Section Title 2</a:t>
-            </a:r>
-          </a:p>
-        </p:txBody>
-      </p:sp>
-    </p:spTree>
-    <p:extLst>
-      <p:ext uri="{BB962C8B-B14F-4D97-AF65-F5344CB8AC3E}">
-        <p14:creationId xmlns:p14="http://schemas.microsoft.com/office/powerpoint/2010/main" val="3204957224"/>
-      </p:ext>
-    </p:extLst>
-  </p:cSld>
-  <p:clrMapOvr>
-    <a:masterClrMapping/>
-  </p:clrMapOvr>
-</p:sld>
-</file>
-
-<file path=ppt/slides/slide53.xml><?xml version="1.0" encoding="utf-8"?>
-<p:sld xmlns:a="http://schemas.openxmlformats.org/drawingml/2006/main" xmlns:r="http://schemas.openxmlformats.org/officeDocument/2006/relationships" xmlns:p="http://schemas.openxmlformats.org/presentationml/2006/main">
-  <p:cSld>
-    <p:spTree>
-      <p:nvGrpSpPr>
-        <p:cNvPr id="1" name=""/>
-        <p:cNvGrpSpPr/>
-        <p:nvPr/>
-      </p:nvGrpSpPr>
-      <p:grpSpPr>
-        <a:xfrm>
-          <a:off x="0" y="0"/>
-          <a:ext cx="0" cy="0"/>
-          <a:chOff x="0" y="0"/>
-          <a:chExt cx="0" cy="0"/>
-        </a:xfrm>
-      </p:grpSpPr>
-      <p:sp>
-        <p:nvSpPr>
-          <p:cNvPr id="2" name="Text Placeholder 1">
-            <a:extLst>
-              <a:ext uri="{FF2B5EF4-FFF2-40B4-BE49-F238E27FC236}">
-                <a16:creationId xmlns:a16="http://schemas.microsoft.com/office/drawing/2014/main" id="{EC716681-8BAA-4886-AAAF-02A736F7F634}"/>
-              </a:ext>
-            </a:extLst>
-          </p:cNvPr>
-          <p:cNvSpPr>
-            <a:spLocks noGrp="1"/>
-          </p:cNvSpPr>
-          <p:nvPr>
-            <p:ph type="body" sz="quarter" idx="10"/>
-          </p:nvPr>
-        </p:nvSpPr>
-        <p:spPr/>
-        <p:txBody>
-          <a:bodyPr/>
-          <a:lstStyle/>
-          <a:p>
-            <a:endParaRPr lang="en-CA" dirty="0"/>
-          </a:p>
-        </p:txBody>
-      </p:sp>
-      <p:sp>
-        <p:nvSpPr>
-          <p:cNvPr id="3" name="Title 2">
-            <a:extLst>
-              <a:ext uri="{FF2B5EF4-FFF2-40B4-BE49-F238E27FC236}">
-                <a16:creationId xmlns:a16="http://schemas.microsoft.com/office/drawing/2014/main" id="{631125EC-8429-4F09-BDB3-44788B497DED}"/>
-              </a:ext>
-              <a:ext uri="{C183D7F6-B498-43B3-948B-1728B52AA6E4}">
-                <adec:decorative xmlns:adec="http://schemas.microsoft.com/office/drawing/2017/decorative" val="1"/>
-              </a:ext>
-            </a:extLst>
-          </p:cNvPr>
-          <p:cNvSpPr>
-            <a:spLocks noGrp="1"/>
-          </p:cNvSpPr>
-          <p:nvPr>
-            <p:ph type="title" idx="4294967295"/>
-          </p:nvPr>
-        </p:nvSpPr>
-        <p:spPr>
-          <a:xfrm>
-            <a:off x="2054038" y="-572527"/>
-            <a:ext cx="3002056" cy="572527"/>
-          </a:xfrm>
-          <a:prstGeom prst="rect">
-            <a:avLst/>
-          </a:prstGeom>
-        </p:spPr>
-        <p:txBody>
-          <a:bodyPr/>
-          <a:lstStyle/>
-          <a:p>
-            <a:r>
-              <a:rPr lang="en-CA" sz="900" dirty="0"/>
-              <a:t>Section Title 3</a:t>
-            </a:r>
-          </a:p>
-        </p:txBody>
-      </p:sp>
-    </p:spTree>
-    <p:extLst>
-      <p:ext uri="{BB962C8B-B14F-4D97-AF65-F5344CB8AC3E}">
-        <p14:creationId xmlns:p14="http://schemas.microsoft.com/office/powerpoint/2010/main" val="682491145"/>
-      </p:ext>
-    </p:extLst>
-  </p:cSld>
-  <p:clrMapOvr>
-    <a:masterClrMapping/>
-  </p:clrMapOvr>
-</p:sld>
-</file>
-
-<file path=ppt/slides/slide54.xml><?xml version="1.0" encoding="utf-8"?>
-<p:sld xmlns:a="http://schemas.openxmlformats.org/drawingml/2006/main" xmlns:r="http://schemas.openxmlformats.org/officeDocument/2006/relationships" xmlns:p="http://schemas.openxmlformats.org/presentationml/2006/main">
-  <p:cSld>
-    <p:spTree>
-      <p:nvGrpSpPr>
-        <p:cNvPr id="1" name=""/>
-        <p:cNvGrpSpPr/>
-        <p:nvPr/>
-      </p:nvGrpSpPr>
-      <p:grpSpPr>
-        <a:xfrm>
-          <a:off x="0" y="0"/>
-          <a:ext cx="0" cy="0"/>
-          <a:chOff x="0" y="0"/>
-          <a:chExt cx="0" cy="0"/>
-        </a:xfrm>
-      </p:grpSpPr>
-      <p:sp>
-        <p:nvSpPr>
-          <p:cNvPr id="2" name="Title 1">
-            <a:extLst>
-              <a:ext uri="{FF2B5EF4-FFF2-40B4-BE49-F238E27FC236}">
-                <a16:creationId xmlns:a16="http://schemas.microsoft.com/office/drawing/2014/main" id="{68F79B2B-3CF7-4524-BECD-C0EF9B2EB698}"/>
-              </a:ext>
-            </a:extLst>
-          </p:cNvPr>
-          <p:cNvSpPr>
-            <a:spLocks noGrp="1"/>
-          </p:cNvSpPr>
-          <p:nvPr>
-            <p:ph type="title"/>
-          </p:nvPr>
-        </p:nvSpPr>
-        <p:spPr/>
-        <p:txBody>
-          <a:bodyPr/>
-          <a:lstStyle/>
-          <a:p>
-            <a:r>
-              <a:rPr lang="en-CA" dirty="0"/>
-              <a:t>Section Slide One Point</a:t>
-            </a:r>
-          </a:p>
-        </p:txBody>
-      </p:sp>
-      <p:sp>
-        <p:nvSpPr>
-          <p:cNvPr id="4" name="Text Placeholder 3" descr="Subtitle">
-            <a:extLst>
-              <a:ext uri="{FF2B5EF4-FFF2-40B4-BE49-F238E27FC236}">
-                <a16:creationId xmlns:a16="http://schemas.microsoft.com/office/drawing/2014/main" id="{6A5E11B5-A282-4859-909B-D71ABD483FE3}"/>
-              </a:ext>
-            </a:extLst>
-          </p:cNvPr>
-          <p:cNvSpPr>
-            <a:spLocks noGrp="1"/>
-          </p:cNvSpPr>
-          <p:nvPr>
-            <p:ph type="body" sz="quarter" idx="10"/>
-          </p:nvPr>
-        </p:nvSpPr>
-        <p:spPr/>
-        <p:txBody>
-          <a:bodyPr/>
-          <a:lstStyle/>
-          <a:p>
-            <a:endParaRPr lang="en-CA" dirty="0"/>
-          </a:p>
-        </p:txBody>
-      </p:sp>
-      <p:sp>
-        <p:nvSpPr>
-          <p:cNvPr id="3" name="Text Placeholder 2" descr="Body Copy">
-            <a:extLst>
-              <a:ext uri="{FF2B5EF4-FFF2-40B4-BE49-F238E27FC236}">
-                <a16:creationId xmlns:a16="http://schemas.microsoft.com/office/drawing/2014/main" id="{608DBA2E-E9B1-4B69-825A-71148BAE9C17}"/>
-              </a:ext>
-            </a:extLst>
-          </p:cNvPr>
-          <p:cNvSpPr>
-            <a:spLocks noGrp="1"/>
-          </p:cNvSpPr>
-          <p:nvPr>
-            <p:ph type="body" sz="quarter" idx="21"/>
-          </p:nvPr>
-        </p:nvSpPr>
-        <p:spPr/>
-        <p:txBody>
-          <a:bodyPr/>
-          <a:lstStyle/>
-          <a:p>
-            <a:endParaRPr lang="en-CA" dirty="0"/>
-          </a:p>
-        </p:txBody>
-      </p:sp>
-      <p:sp>
-        <p:nvSpPr>
-          <p:cNvPr id="5" name="Text Placeholder 4" descr="Bullets">
-            <a:extLst>
-              <a:ext uri="{FF2B5EF4-FFF2-40B4-BE49-F238E27FC236}">
-                <a16:creationId xmlns:a16="http://schemas.microsoft.com/office/drawing/2014/main" id="{C91686E2-DBAC-4BC7-A5B7-A61D3C560165}"/>
-              </a:ext>
-            </a:extLst>
-          </p:cNvPr>
-          <p:cNvSpPr>
-            <a:spLocks noGrp="1"/>
-          </p:cNvSpPr>
-          <p:nvPr>
-            <p:ph type="body" sz="quarter" idx="22"/>
-          </p:nvPr>
-        </p:nvSpPr>
-        <p:spPr/>
-        <p:txBody>
-          <a:bodyPr/>
-          <a:lstStyle/>
-          <a:p>
-            <a:endParaRPr lang="en-CA" dirty="0"/>
-          </a:p>
-        </p:txBody>
-      </p:sp>
-    </p:spTree>
-    <p:extLst>
-      <p:ext uri="{BB962C8B-B14F-4D97-AF65-F5344CB8AC3E}">
-        <p14:creationId xmlns:p14="http://schemas.microsoft.com/office/powerpoint/2010/main" val="1336390196"/>
-      </p:ext>
-    </p:extLst>
-  </p:cSld>
-  <p:clrMapOvr>
-    <a:masterClrMapping/>
-  </p:clrMapOvr>
-</p:sld>
-</file>
-
-<file path=ppt/slides/slide55.xml><?xml version="1.0" encoding="utf-8"?>
-<p:sld xmlns:a="http://schemas.openxmlformats.org/drawingml/2006/main" xmlns:r="http://schemas.openxmlformats.org/officeDocument/2006/relationships" xmlns:p="http://schemas.openxmlformats.org/presentationml/2006/main">
-  <p:cSld>
-    <p:spTree>
-      <p:nvGrpSpPr>
-        <p:cNvPr id="1" name=""/>
-        <p:cNvGrpSpPr/>
-        <p:nvPr/>
-      </p:nvGrpSpPr>
-      <p:grpSpPr>
-        <a:xfrm>
-          <a:off x="0" y="0"/>
-          <a:ext cx="0" cy="0"/>
-          <a:chOff x="0" y="0"/>
-          <a:chExt cx="0" cy="0"/>
-        </a:xfrm>
-      </p:grpSpPr>
-      <p:sp>
-        <p:nvSpPr>
-          <p:cNvPr id="4" name="Title 3">
-            <a:extLst>
-              <a:ext uri="{FF2B5EF4-FFF2-40B4-BE49-F238E27FC236}">
-                <a16:creationId xmlns:a16="http://schemas.microsoft.com/office/drawing/2014/main" id="{47D0595C-46D3-4359-9798-F01612E4948C}"/>
-              </a:ext>
-            </a:extLst>
-          </p:cNvPr>
-          <p:cNvSpPr>
-            <a:spLocks noGrp="1"/>
-          </p:cNvSpPr>
-          <p:nvPr>
-            <p:ph type="title"/>
-          </p:nvPr>
-        </p:nvSpPr>
-        <p:spPr/>
-        <p:txBody>
-          <a:bodyPr/>
-          <a:lstStyle/>
-          <a:p>
-            <a:r>
-              <a:rPr lang="en-CA" dirty="0"/>
-              <a:t>Section Slide Two Points</a:t>
-            </a:r>
-          </a:p>
-        </p:txBody>
-      </p:sp>
-      <p:sp>
-        <p:nvSpPr>
-          <p:cNvPr id="2" name="Text Placeholder 1" descr="Subtitle">
-            <a:extLst>
-              <a:ext uri="{FF2B5EF4-FFF2-40B4-BE49-F238E27FC236}">
-                <a16:creationId xmlns:a16="http://schemas.microsoft.com/office/drawing/2014/main" id="{360DE7F0-668B-4F5F-9B77-31B9A68EDD2A}"/>
-              </a:ext>
-            </a:extLst>
-          </p:cNvPr>
-          <p:cNvSpPr>
-            <a:spLocks noGrp="1"/>
-          </p:cNvSpPr>
-          <p:nvPr>
-            <p:ph type="body" sz="quarter" idx="10"/>
-          </p:nvPr>
-        </p:nvSpPr>
-        <p:spPr/>
-        <p:txBody>
-          <a:bodyPr/>
-          <a:lstStyle/>
-          <a:p>
-            <a:endParaRPr lang="en-CA" dirty="0"/>
-          </a:p>
-        </p:txBody>
-      </p:sp>
-      <p:sp>
-        <p:nvSpPr>
-          <p:cNvPr id="5" name="Text Placeholder 4" descr="Body Copy">
-            <a:extLst>
-              <a:ext uri="{FF2B5EF4-FFF2-40B4-BE49-F238E27FC236}">
-                <a16:creationId xmlns:a16="http://schemas.microsoft.com/office/drawing/2014/main" id="{3637167A-FBA4-4F05-99EC-1A15699D4962}"/>
-              </a:ext>
-            </a:extLst>
-          </p:cNvPr>
-          <p:cNvSpPr>
-            <a:spLocks noGrp="1"/>
-          </p:cNvSpPr>
-          <p:nvPr>
-            <p:ph type="body" sz="quarter" idx="26"/>
-          </p:nvPr>
-        </p:nvSpPr>
-        <p:spPr/>
-        <p:txBody>
-          <a:bodyPr/>
-          <a:lstStyle/>
-          <a:p>
-            <a:endParaRPr lang="en-CA" dirty="0"/>
-          </a:p>
-        </p:txBody>
-      </p:sp>
-      <p:sp>
-        <p:nvSpPr>
-          <p:cNvPr id="7" name="Text Placeholder 6" descr="Bulletpoints">
-            <a:extLst>
-              <a:ext uri="{FF2B5EF4-FFF2-40B4-BE49-F238E27FC236}">
-                <a16:creationId xmlns:a16="http://schemas.microsoft.com/office/drawing/2014/main" id="{5635C9E4-5CE0-4821-BE54-50CBA4B97C2F}"/>
-              </a:ext>
-            </a:extLst>
-          </p:cNvPr>
-          <p:cNvSpPr>
-            <a:spLocks noGrp="1"/>
-          </p:cNvSpPr>
-          <p:nvPr>
-            <p:ph type="body" sz="quarter" idx="28"/>
-          </p:nvPr>
-        </p:nvSpPr>
-        <p:spPr/>
-        <p:txBody>
-          <a:bodyPr/>
-          <a:lstStyle/>
-          <a:p>
-            <a:endParaRPr lang="en-CA" dirty="0"/>
-          </a:p>
-        </p:txBody>
-      </p:sp>
-      <p:sp>
-        <p:nvSpPr>
-          <p:cNvPr id="3" name="Text Placeholder 2" descr="Subtitle 2">
-            <a:extLst>
-              <a:ext uri="{FF2B5EF4-FFF2-40B4-BE49-F238E27FC236}">
-                <a16:creationId xmlns:a16="http://schemas.microsoft.com/office/drawing/2014/main" id="{5A373BD8-E9C3-4561-BDD1-D81D3CC4AA2A}"/>
-              </a:ext>
-            </a:extLst>
-          </p:cNvPr>
-          <p:cNvSpPr>
-            <a:spLocks noGrp="1"/>
-          </p:cNvSpPr>
-          <p:nvPr>
-            <p:ph type="body" sz="quarter" idx="24"/>
-          </p:nvPr>
-        </p:nvSpPr>
-        <p:spPr/>
-        <p:txBody>
-          <a:bodyPr/>
-          <a:lstStyle/>
-          <a:p>
-            <a:endParaRPr lang="en-CA" dirty="0"/>
-          </a:p>
-        </p:txBody>
-      </p:sp>
-      <p:sp>
-        <p:nvSpPr>
-          <p:cNvPr id="6" name="Text Placeholder 5" descr="Body Copy 2">
-            <a:extLst>
-              <a:ext uri="{FF2B5EF4-FFF2-40B4-BE49-F238E27FC236}">
-                <a16:creationId xmlns:a16="http://schemas.microsoft.com/office/drawing/2014/main" id="{BA403272-0689-4536-9DFC-4E0780F6DA6C}"/>
-              </a:ext>
-            </a:extLst>
-          </p:cNvPr>
-          <p:cNvSpPr>
-            <a:spLocks noGrp="1"/>
-          </p:cNvSpPr>
-          <p:nvPr>
-            <p:ph type="body" sz="quarter" idx="27"/>
-          </p:nvPr>
-        </p:nvSpPr>
-        <p:spPr/>
-        <p:txBody>
-          <a:bodyPr/>
-          <a:lstStyle/>
-          <a:p>
-            <a:endParaRPr lang="en-CA" dirty="0"/>
-          </a:p>
-        </p:txBody>
-      </p:sp>
-      <p:sp>
-        <p:nvSpPr>
-          <p:cNvPr id="8" name="Text Placeholder 7" descr="Bulletpoints 2">
-            <a:extLst>
-              <a:ext uri="{FF2B5EF4-FFF2-40B4-BE49-F238E27FC236}">
-                <a16:creationId xmlns:a16="http://schemas.microsoft.com/office/drawing/2014/main" id="{445D4A87-E960-4751-9CE0-DFB27D28CC1F}"/>
-              </a:ext>
-            </a:extLst>
-          </p:cNvPr>
-          <p:cNvSpPr>
-            <a:spLocks noGrp="1"/>
-          </p:cNvSpPr>
-          <p:nvPr>
-            <p:ph type="body" sz="quarter" idx="29"/>
-          </p:nvPr>
-        </p:nvSpPr>
-        <p:spPr/>
-        <p:txBody>
-          <a:bodyPr/>
-          <a:lstStyle/>
-          <a:p>
-            <a:endParaRPr lang="en-CA" dirty="0"/>
-          </a:p>
-        </p:txBody>
-      </p:sp>
-    </p:spTree>
-    <p:extLst>
-      <p:ext uri="{BB962C8B-B14F-4D97-AF65-F5344CB8AC3E}">
-        <p14:creationId xmlns:p14="http://schemas.microsoft.com/office/powerpoint/2010/main" val="1020103187"/>
-      </p:ext>
-    </p:extLst>
-  </p:cSld>
-  <p:clrMapOvr>
-    <a:masterClrMapping/>
-  </p:clrMapOvr>
-</p:sld>
-</file>
-
-<file path=ppt/slides/slide56.xml><?xml version="1.0" encoding="utf-8"?>
-<p:sld xmlns:a="http://schemas.openxmlformats.org/drawingml/2006/main" xmlns:r="http://schemas.openxmlformats.org/officeDocument/2006/relationships" xmlns:p="http://schemas.openxmlformats.org/presentationml/2006/main">
-  <p:cSld>
-    <p:spTree>
-      <p:nvGrpSpPr>
-        <p:cNvPr id="1" name=""/>
-        <p:cNvGrpSpPr/>
-        <p:nvPr/>
-      </p:nvGrpSpPr>
-      <p:grpSpPr>
-        <a:xfrm>
-          <a:off x="0" y="0"/>
-          <a:ext cx="0" cy="0"/>
-          <a:chOff x="0" y="0"/>
-          <a:chExt cx="0" cy="0"/>
-        </a:xfrm>
-      </p:grpSpPr>
-      <p:sp>
-        <p:nvSpPr>
-          <p:cNvPr id="2" name="Title 1">
-            <a:extLst>
-              <a:ext uri="{FF2B5EF4-FFF2-40B4-BE49-F238E27FC236}">
-                <a16:creationId xmlns:a16="http://schemas.microsoft.com/office/drawing/2014/main" id="{26992C24-9AC7-417A-A3AA-562A62F25CD6}"/>
-              </a:ext>
-            </a:extLst>
-          </p:cNvPr>
-          <p:cNvSpPr>
-            <a:spLocks noGrp="1"/>
-          </p:cNvSpPr>
-          <p:nvPr>
-            <p:ph type="title"/>
-          </p:nvPr>
-        </p:nvSpPr>
-        <p:spPr/>
-        <p:txBody>
-          <a:bodyPr/>
-          <a:lstStyle/>
-          <a:p>
-            <a:r>
-              <a:rPr lang="en-CA" dirty="0"/>
-              <a:t>Section Slide Three Points</a:t>
-            </a:r>
-          </a:p>
-        </p:txBody>
-      </p:sp>
-      <p:sp>
-        <p:nvSpPr>
-          <p:cNvPr id="3" name="Text Placeholder 2" descr="Subtitle">
-            <a:extLst>
-              <a:ext uri="{FF2B5EF4-FFF2-40B4-BE49-F238E27FC236}">
-                <a16:creationId xmlns:a16="http://schemas.microsoft.com/office/drawing/2014/main" id="{9FCCA17C-BECD-4ADE-BD07-CF93C2943A63}"/>
-              </a:ext>
-            </a:extLst>
-          </p:cNvPr>
-          <p:cNvSpPr>
-            <a:spLocks noGrp="1"/>
-          </p:cNvSpPr>
-          <p:nvPr>
-            <p:ph type="body" sz="quarter" idx="10"/>
-          </p:nvPr>
-        </p:nvSpPr>
-        <p:spPr/>
-        <p:txBody>
-          <a:bodyPr/>
-          <a:lstStyle/>
-          <a:p>
-            <a:endParaRPr lang="en-CA" dirty="0"/>
-          </a:p>
-        </p:txBody>
-      </p:sp>
-      <p:sp>
-        <p:nvSpPr>
-          <p:cNvPr id="4" name="Text Placeholder 3" descr="Body Copy">
-            <a:extLst>
-              <a:ext uri="{FF2B5EF4-FFF2-40B4-BE49-F238E27FC236}">
-                <a16:creationId xmlns:a16="http://schemas.microsoft.com/office/drawing/2014/main" id="{491C3C11-2C47-4AFB-877B-698E81B9E702}"/>
-              </a:ext>
-            </a:extLst>
-          </p:cNvPr>
-          <p:cNvSpPr>
-            <a:spLocks noGrp="1"/>
-          </p:cNvSpPr>
-          <p:nvPr>
-            <p:ph type="body" sz="quarter" idx="26"/>
-          </p:nvPr>
-        </p:nvSpPr>
-        <p:spPr/>
-        <p:txBody>
-          <a:bodyPr/>
-          <a:lstStyle/>
-          <a:p>
-            <a:endParaRPr lang="en-CA" dirty="0"/>
-          </a:p>
-        </p:txBody>
-      </p:sp>
-      <p:sp>
-        <p:nvSpPr>
-          <p:cNvPr id="9" name="Text Placeholder 8" descr="Bulletpoints">
-            <a:extLst>
-              <a:ext uri="{FF2B5EF4-FFF2-40B4-BE49-F238E27FC236}">
-                <a16:creationId xmlns:a16="http://schemas.microsoft.com/office/drawing/2014/main" id="{355AF0A9-0999-442F-8B92-1B3C0B524D89}"/>
-              </a:ext>
-            </a:extLst>
-          </p:cNvPr>
-          <p:cNvSpPr>
-            <a:spLocks noGrp="1"/>
-          </p:cNvSpPr>
-          <p:nvPr>
-            <p:ph type="body" sz="quarter" idx="31"/>
-          </p:nvPr>
-        </p:nvSpPr>
-        <p:spPr/>
-        <p:txBody>
-          <a:bodyPr/>
-          <a:lstStyle/>
-          <a:p>
-            <a:endParaRPr lang="en-CA" dirty="0"/>
-          </a:p>
-        </p:txBody>
-      </p:sp>
-      <p:sp>
-        <p:nvSpPr>
-          <p:cNvPr id="5" name="Text Placeholder 4" descr="Subtitle 2">
-            <a:extLst>
-              <a:ext uri="{FF2B5EF4-FFF2-40B4-BE49-F238E27FC236}">
-                <a16:creationId xmlns:a16="http://schemas.microsoft.com/office/drawing/2014/main" id="{F6CFE3B6-7807-47DB-848C-4693B66356E1}"/>
-              </a:ext>
-            </a:extLst>
-          </p:cNvPr>
-          <p:cNvSpPr>
-            <a:spLocks noGrp="1"/>
-          </p:cNvSpPr>
-          <p:nvPr>
-            <p:ph type="body" sz="quarter" idx="27"/>
-          </p:nvPr>
-        </p:nvSpPr>
-        <p:spPr/>
-        <p:txBody>
-          <a:bodyPr/>
-          <a:lstStyle/>
-          <a:p>
-            <a:endParaRPr lang="en-CA" dirty="0"/>
-          </a:p>
-        </p:txBody>
-      </p:sp>
-      <p:sp>
-        <p:nvSpPr>
-          <p:cNvPr id="6" name="Text Placeholder 5" descr="Body Copy 2">
-            <a:extLst>
-              <a:ext uri="{FF2B5EF4-FFF2-40B4-BE49-F238E27FC236}">
-                <a16:creationId xmlns:a16="http://schemas.microsoft.com/office/drawing/2014/main" id="{C4B456E1-0E72-4FF4-AD5D-AE9B0D64A0A7}"/>
-              </a:ext>
-            </a:extLst>
-          </p:cNvPr>
-          <p:cNvSpPr>
-            <a:spLocks noGrp="1"/>
-          </p:cNvSpPr>
-          <p:nvPr>
-            <p:ph type="body" sz="quarter" idx="28"/>
-          </p:nvPr>
-        </p:nvSpPr>
-        <p:spPr/>
-        <p:txBody>
-          <a:bodyPr/>
-          <a:lstStyle/>
-          <a:p>
-            <a:endParaRPr lang="en-CA" dirty="0"/>
-          </a:p>
-        </p:txBody>
-      </p:sp>
-      <p:sp>
-        <p:nvSpPr>
-          <p:cNvPr id="10" name="Text Placeholder 9" descr="Bulletpoints 2">
-            <a:extLst>
-              <a:ext uri="{FF2B5EF4-FFF2-40B4-BE49-F238E27FC236}">
-                <a16:creationId xmlns:a16="http://schemas.microsoft.com/office/drawing/2014/main" id="{D7598E47-FA6E-41EA-BE62-F2B14E54485A}"/>
-              </a:ext>
-            </a:extLst>
-          </p:cNvPr>
-          <p:cNvSpPr>
-            <a:spLocks noGrp="1"/>
-          </p:cNvSpPr>
-          <p:nvPr>
-            <p:ph type="body" sz="quarter" idx="32"/>
-          </p:nvPr>
-        </p:nvSpPr>
-        <p:spPr/>
-        <p:txBody>
-          <a:bodyPr/>
-          <a:lstStyle/>
-          <a:p>
-            <a:endParaRPr lang="en-CA" dirty="0"/>
-          </a:p>
-        </p:txBody>
-      </p:sp>
-      <p:sp>
-        <p:nvSpPr>
-          <p:cNvPr id="7" name="Text Placeholder 6" descr="Subtitle 3">
-            <a:extLst>
-              <a:ext uri="{FF2B5EF4-FFF2-40B4-BE49-F238E27FC236}">
-                <a16:creationId xmlns:a16="http://schemas.microsoft.com/office/drawing/2014/main" id="{1482DA34-88F4-4C4F-A41A-76FF2E911227}"/>
-              </a:ext>
-            </a:extLst>
-          </p:cNvPr>
-          <p:cNvSpPr>
-            <a:spLocks noGrp="1"/>
-          </p:cNvSpPr>
-          <p:nvPr>
-            <p:ph type="body" sz="quarter" idx="29"/>
-          </p:nvPr>
-        </p:nvSpPr>
-        <p:spPr/>
-        <p:txBody>
-          <a:bodyPr/>
-          <a:lstStyle/>
-          <a:p>
-            <a:endParaRPr lang="en-CA" dirty="0"/>
-          </a:p>
-        </p:txBody>
-      </p:sp>
-      <p:sp>
-        <p:nvSpPr>
-          <p:cNvPr id="8" name="Text Placeholder 7" descr="Body Copy 3">
-            <a:extLst>
-              <a:ext uri="{FF2B5EF4-FFF2-40B4-BE49-F238E27FC236}">
-                <a16:creationId xmlns:a16="http://schemas.microsoft.com/office/drawing/2014/main" id="{54DCB44D-DE39-4692-8F00-FB6802A57157}"/>
-              </a:ext>
-            </a:extLst>
-          </p:cNvPr>
-          <p:cNvSpPr>
-            <a:spLocks noGrp="1"/>
-          </p:cNvSpPr>
-          <p:nvPr>
-            <p:ph type="body" sz="quarter" idx="30"/>
-          </p:nvPr>
-        </p:nvSpPr>
-        <p:spPr/>
-        <p:txBody>
-          <a:bodyPr/>
-          <a:lstStyle/>
-          <a:p>
-            <a:endParaRPr lang="en-CA" dirty="0"/>
-          </a:p>
-        </p:txBody>
-      </p:sp>
-      <p:sp>
-        <p:nvSpPr>
-          <p:cNvPr id="11" name="Text Placeholder 10" descr="Bulletpoints 3">
-            <a:extLst>
-              <a:ext uri="{FF2B5EF4-FFF2-40B4-BE49-F238E27FC236}">
-                <a16:creationId xmlns:a16="http://schemas.microsoft.com/office/drawing/2014/main" id="{8D456F1F-BE8E-4B08-8415-E1AAA8C6E8CF}"/>
-              </a:ext>
-            </a:extLst>
-          </p:cNvPr>
-          <p:cNvSpPr>
-            <a:spLocks noGrp="1"/>
-          </p:cNvSpPr>
-          <p:nvPr>
-            <p:ph type="body" sz="quarter" idx="33"/>
-          </p:nvPr>
-        </p:nvSpPr>
-        <p:spPr/>
-        <p:txBody>
-          <a:bodyPr/>
-          <a:lstStyle/>
-          <a:p>
-            <a:endParaRPr lang="en-CA" dirty="0"/>
-          </a:p>
-        </p:txBody>
-      </p:sp>
-    </p:spTree>
-    <p:extLst>
-      <p:ext uri="{BB962C8B-B14F-4D97-AF65-F5344CB8AC3E}">
-        <p14:creationId xmlns:p14="http://schemas.microsoft.com/office/powerpoint/2010/main" val="1038489653"/>
-      </p:ext>
-    </p:extLst>
-  </p:cSld>
-  <p:clrMapOvr>
-    <a:masterClrMapping/>
-  </p:clrMapOvr>
-</p:sld>
-</file>
-
-<file path=ppt/slides/slide57.xml><?xml version="1.0" encoding="utf-8"?>
-<p:sld xmlns:a="http://schemas.openxmlformats.org/drawingml/2006/main" xmlns:r="http://schemas.openxmlformats.org/officeDocument/2006/relationships" xmlns:p="http://schemas.openxmlformats.org/presentationml/2006/main">
-  <p:cSld>
-    <p:spTree>
-      <p:nvGrpSpPr>
-        <p:cNvPr id="1" name=""/>
-        <p:cNvGrpSpPr/>
-        <p:nvPr/>
-      </p:nvGrpSpPr>
-      <p:grpSpPr>
-        <a:xfrm>
-          <a:off x="0" y="0"/>
-          <a:ext cx="0" cy="0"/>
-          <a:chOff x="0" y="0"/>
-          <a:chExt cx="0" cy="0"/>
-        </a:xfrm>
-      </p:grpSpPr>
-      <p:sp>
-        <p:nvSpPr>
-          <p:cNvPr id="2" name="Title 1">
-            <a:extLst>
-              <a:ext uri="{FF2B5EF4-FFF2-40B4-BE49-F238E27FC236}">
-                <a16:creationId xmlns:a16="http://schemas.microsoft.com/office/drawing/2014/main" id="{A2490DAD-4A9C-4BC1-A2BC-8BCC0DF1F1A9}"/>
-              </a:ext>
-            </a:extLst>
-          </p:cNvPr>
-          <p:cNvSpPr>
-            <a:spLocks noGrp="1"/>
-          </p:cNvSpPr>
-          <p:nvPr>
-            <p:ph type="title"/>
-          </p:nvPr>
-        </p:nvSpPr>
-        <p:spPr/>
-        <p:txBody>
-          <a:bodyPr/>
-          <a:lstStyle/>
-          <a:p>
-            <a:r>
-              <a:rPr lang="en-US" dirty="0"/>
-              <a:t>Slide for Developer Software Code</a:t>
-            </a:r>
-            <a:endParaRPr lang="en-CA" dirty="0"/>
-          </a:p>
-        </p:txBody>
-      </p:sp>
-      <p:sp>
-        <p:nvSpPr>
-          <p:cNvPr id="3" name="Text Placeholder 2">
-            <a:extLst>
-              <a:ext uri="{FF2B5EF4-FFF2-40B4-BE49-F238E27FC236}">
-                <a16:creationId xmlns:a16="http://schemas.microsoft.com/office/drawing/2014/main" id="{0FA19F0F-25B4-44C6-88F8-87B29E79163A}"/>
-              </a:ext>
-            </a:extLst>
-          </p:cNvPr>
-          <p:cNvSpPr>
-            <a:spLocks noGrp="1"/>
-          </p:cNvSpPr>
-          <p:nvPr>
-            <p:ph type="body" sz="quarter" idx="10"/>
-          </p:nvPr>
-        </p:nvSpPr>
-        <p:spPr/>
-        <p:txBody>
-          <a:bodyPr/>
-          <a:lstStyle/>
-          <a:p>
-            <a:pPr lvl="0"/>
-            <a:r>
-              <a:rPr lang="en-US" dirty="0"/>
-              <a:t>Use this layout to show software code.</a:t>
-            </a:r>
-          </a:p>
-          <a:p>
-            <a:pPr lvl="0"/>
-            <a:r>
-              <a:rPr lang="en-US" dirty="0"/>
-              <a:t>The font is Consolas, a monospace font.</a:t>
-            </a:r>
-          </a:p>
-          <a:p>
-            <a:pPr lvl="0"/>
-            <a:r>
-              <a:rPr lang="en-US" dirty="0"/>
-              <a:t>The slide doesn’t use bullets but levels can be indented using the “Increase List Level” icon on the Home menu.</a:t>
-            </a:r>
-          </a:p>
-        </p:txBody>
-      </p:sp>
-    </p:spTree>
-    <p:extLst>
-      <p:ext uri="{BB962C8B-B14F-4D97-AF65-F5344CB8AC3E}">
-        <p14:creationId xmlns:p14="http://schemas.microsoft.com/office/powerpoint/2010/main" val="2357477551"/>
-      </p:ext>
-    </p:extLst>
-  </p:cSld>
-  <p:clrMapOvr>
-    <a:masterClrMapping/>
-  </p:clrMapOvr>
-</p:sld>
-</file>
-
-<file path=ppt/slides/slide58.xml><?xml version="1.0" encoding="utf-8"?>
-<p:sld xmlns:a="http://schemas.openxmlformats.org/drawingml/2006/main" xmlns:r="http://schemas.openxmlformats.org/officeDocument/2006/relationships" xmlns:p="http://schemas.openxmlformats.org/presentationml/2006/main">
-  <p:cSld>
-    <p:spTree>
-      <p:nvGrpSpPr>
-        <p:cNvPr id="1" name=""/>
-        <p:cNvGrpSpPr/>
-        <p:nvPr/>
-      </p:nvGrpSpPr>
-      <p:grpSpPr>
-        <a:xfrm>
-          <a:off x="0" y="0"/>
-          <a:ext cx="0" cy="0"/>
-          <a:chOff x="0" y="0"/>
-          <a:chExt cx="0" cy="0"/>
-        </a:xfrm>
-      </p:grpSpPr>
-      <p:pic>
-        <p:nvPicPr>
-          <p:cNvPr id="5" name="Picture 4">
-            <a:extLst>
-              <a:ext uri="{FF2B5EF4-FFF2-40B4-BE49-F238E27FC236}">
-                <a16:creationId xmlns:a16="http://schemas.microsoft.com/office/drawing/2014/main" id="{ABD65FDA-BFB6-A647-9C81-EEDF4F6A892C}"/>
-              </a:ext>
-              <a:ext uri="{C183D7F6-B498-43B3-948B-1728B52AA6E4}">
-                <adec:decorative xmlns:adec="http://schemas.microsoft.com/office/drawing/2017/decorative" val="1"/>
-              </a:ext>
-            </a:extLst>
-          </p:cNvPr>
-          <p:cNvPicPr>
-            <a:picLocks noChangeAspect="1"/>
-          </p:cNvPicPr>
-          <p:nvPr/>
-        </p:nvPicPr>
-        <p:blipFill>
-          <a:blip r:embed="rId2">
-            <a:extLst>
-              <a:ext uri="{28A0092B-C50C-407E-A947-70E740481C1C}">
-                <a14:useLocalDpi xmlns:a14="http://schemas.microsoft.com/office/drawing/2010/main"/>
-              </a:ext>
-            </a:extLst>
-          </a:blip>
-          <a:stretch>
-            <a:fillRect/>
-          </a:stretch>
-        </p:blipFill>
-        <p:spPr>
-          <a:xfrm>
-            <a:off x="0" y="0"/>
-            <a:ext cx="9144000" cy="5143500"/>
-          </a:xfrm>
-          <a:prstGeom prst="rect">
-            <a:avLst/>
-          </a:prstGeom>
-        </p:spPr>
-      </p:pic>
-      <p:sp>
-        <p:nvSpPr>
-          <p:cNvPr id="7" name="Title 2" descr="Table">
-            <a:extLst>
-              <a:ext uri="{FF2B5EF4-FFF2-40B4-BE49-F238E27FC236}">
-                <a16:creationId xmlns:a16="http://schemas.microsoft.com/office/drawing/2014/main" id="{7F4F88C8-5675-7740-A279-905E00E2CF89}"/>
-              </a:ext>
-              <a:ext uri="{C183D7F6-B498-43B3-948B-1728B52AA6E4}">
-                <adec:decorative xmlns:adec="http://schemas.microsoft.com/office/drawing/2017/decorative" val="0"/>
-              </a:ext>
-            </a:extLst>
-          </p:cNvPr>
-          <p:cNvSpPr txBox="1">
-            <a:spLocks/>
-          </p:cNvSpPr>
-          <p:nvPr/>
-        </p:nvSpPr>
-        <p:spPr>
-          <a:xfrm>
-            <a:off x="312744" y="437936"/>
-            <a:ext cx="8431205" cy="614029"/>
-          </a:xfrm>
-          <a:prstGeom prst="rect">
-            <a:avLst/>
-          </a:prstGeom>
-        </p:spPr>
-        <p:txBody>
-          <a:bodyPr anchor="b"/>
-          <a:lstStyle>
-            <a:lvl1pPr marL="0" marR="0" indent="0" algn="ctr" defTabSz="457200" rtl="0" eaLnBrk="1" fontAlgn="auto" latinLnBrk="0" hangingPunct="1">
-              <a:lnSpc>
-                <a:spcPts val="3500"/>
-              </a:lnSpc>
-              <a:spcBef>
-                <a:spcPct val="0"/>
-              </a:spcBef>
-              <a:spcAft>
-                <a:spcPts val="0"/>
-              </a:spcAft>
-              <a:buClrTx/>
-              <a:buSzTx/>
-              <a:buFontTx/>
-              <a:buNone/>
-              <a:tabLst/>
-              <a:defRPr kumimoji="0" lang="en-US" sz="6000" b="1" i="0" u="none" strike="noStrike" kern="1200" cap="none" spc="0" normalizeH="0" baseline="0">
-                <a:ln>
-                  <a:noFill/>
-                </a:ln>
-                <a:solidFill>
-                  <a:schemeClr val="tx1"/>
-                </a:solidFill>
-                <a:effectLst/>
-                <a:uLnTx/>
-                <a:uFillTx/>
-                <a:latin typeface="Segoe UI Semibold" panose="020B0502040204020203" pitchFamily="34" charset="0"/>
-                <a:ea typeface="Segoe UI Light" charset="0"/>
-                <a:cs typeface="Segoe UI Semibold" panose="020B0502040204020203" pitchFamily="34" charset="0"/>
-              </a:defRPr>
-            </a:lvl1pPr>
-          </a:lstStyle>
-          <a:p>
-            <a:pPr algn="l"/>
-            <a:r>
-              <a:rPr lang="en-CA" sz="3600" dirty="0"/>
-              <a:t>Table Style</a:t>
-            </a:r>
-          </a:p>
-        </p:txBody>
-      </p:sp>
-      <p:graphicFrame>
-        <p:nvGraphicFramePr>
-          <p:cNvPr id="8" name="Table 7">
-            <a:extLst>
-              <a:ext uri="{FF2B5EF4-FFF2-40B4-BE49-F238E27FC236}">
-                <a16:creationId xmlns:a16="http://schemas.microsoft.com/office/drawing/2014/main" id="{41CA20D5-1084-2C4F-83F6-EA34091F2323}"/>
-              </a:ext>
-              <a:ext uri="{C183D7F6-B498-43B3-948B-1728B52AA6E4}">
-                <adec:decorative xmlns:adec="http://schemas.microsoft.com/office/drawing/2017/decorative" val="0"/>
-              </a:ext>
-            </a:extLst>
-          </p:cNvPr>
-          <p:cNvGraphicFramePr>
-            <a:graphicFrameLocks noGrp="1"/>
-          </p:cNvGraphicFramePr>
-          <p:nvPr>
-            <p:extLst>
-              <p:ext uri="{D42A27DB-BD31-4B8C-83A1-F6EECF244321}">
-                <p14:modId xmlns:p14="http://schemas.microsoft.com/office/powerpoint/2010/main" val="3288676173"/>
-              </p:ext>
-            </p:extLst>
-          </p:nvPr>
-        </p:nvGraphicFramePr>
-        <p:xfrm>
-          <a:off x="377039" y="940388"/>
-          <a:ext cx="8359617" cy="3072161"/>
-        </p:xfrm>
-        <a:graphic>
-          <a:graphicData uri="http://schemas.openxmlformats.org/drawingml/2006/table">
-            <a:tbl>
-              <a:tblPr firstRow="1" bandRow="1">
-                <a:tableStyleId>{2D5ABB26-0587-4C30-8999-92F81FD0307C}</a:tableStyleId>
-              </a:tblPr>
-              <a:tblGrid>
-                <a:gridCol w="2786539">
-                  <a:extLst>
-                    <a:ext uri="{9D8B030D-6E8A-4147-A177-3AD203B41FA5}">
-                      <a16:colId xmlns:a16="http://schemas.microsoft.com/office/drawing/2014/main" val="3310045158"/>
-                    </a:ext>
-                  </a:extLst>
-                </a:gridCol>
-                <a:gridCol w="2786539">
-                  <a:extLst>
-                    <a:ext uri="{9D8B030D-6E8A-4147-A177-3AD203B41FA5}">
-                      <a16:colId xmlns:a16="http://schemas.microsoft.com/office/drawing/2014/main" val="558346684"/>
-                    </a:ext>
-                  </a:extLst>
-                </a:gridCol>
-                <a:gridCol w="2786539">
-                  <a:extLst>
-                    <a:ext uri="{9D8B030D-6E8A-4147-A177-3AD203B41FA5}">
-                      <a16:colId xmlns:a16="http://schemas.microsoft.com/office/drawing/2014/main" val="471058550"/>
-                    </a:ext>
-                  </a:extLst>
-                </a:gridCol>
-              </a:tblGrid>
-              <a:tr h="745101">
-                <a:tc>
-                  <a:txBody>
-                    <a:bodyPr/>
-                    <a:lstStyle/>
-                    <a:p>
-                      <a:pPr marL="0" marR="0" lvl="0" indent="0" algn="l" defTabSz="914400" rtl="0" eaLnBrk="1" fontAlgn="auto" latinLnBrk="0" hangingPunct="1">
-                        <a:lnSpc>
-                          <a:spcPct val="100000"/>
-                        </a:lnSpc>
-                        <a:spcBef>
-                          <a:spcPct val="20000"/>
-                        </a:spcBef>
-                        <a:spcAft>
-                          <a:spcPts val="0"/>
-                        </a:spcAft>
-                        <a:buClr>
-                          <a:srgbClr val="33C0CD"/>
-                        </a:buClr>
-                        <a:buSzTx/>
-                        <a:buFont typeface="Arial"/>
-                        <a:buNone/>
-                        <a:tabLst/>
-                        <a:defRPr/>
-                      </a:pPr>
-                      <a:r>
-                        <a:rPr kumimoji="0" lang="en-US" sz="2400" b="1" i="0" u="none" strike="noStrike" kern="1200" cap="none" spc="0" normalizeH="0" baseline="0" noProof="0" dirty="0">
-                          <a:ln>
-                            <a:noFill/>
-                          </a:ln>
-                          <a:solidFill>
-                            <a:srgbClr val="B8232F"/>
-                          </a:solidFill>
-                          <a:effectLst/>
-                          <a:uLnTx/>
-                          <a:uFillTx/>
-                          <a:latin typeface="Segoe UI Semibold" panose="020B0502040204020203" pitchFamily="34" charset="0"/>
-                          <a:cs typeface="Segoe UI Semibold" panose="020B0502040204020203" pitchFamily="34" charset="0"/>
-                        </a:rPr>
-                        <a:t>Heading</a:t>
-                      </a:r>
-                    </a:p>
-                  </a:txBody>
-                  <a:tcPr anchor="ctr">
-                    <a:lnL>
-                      <a:noFill/>
-                    </a:lnL>
-                    <a:lnR w="12700" cap="flat" cmpd="sng" algn="ctr">
-                      <a:noFill/>
-                      <a:prstDash val="solid"/>
-                      <a:round/>
-                      <a:headEnd type="none" w="med" len="med"/>
-                      <a:tailEnd type="none" w="med" len="med"/>
-                    </a:lnR>
-                    <a:lnT>
-                      <a:noFill/>
-                    </a:lnT>
-                    <a:lnB w="12700" cap="flat" cmpd="sng" algn="ctr">
-                      <a:solidFill>
-                        <a:schemeClr val="accent2"/>
-                      </a:solidFill>
-                      <a:prstDash val="solid"/>
-                      <a:round/>
-                      <a:headEnd type="none" w="med" len="med"/>
-                      <a:tailEnd type="none" w="med" len="med"/>
-                    </a:lnB>
-                    <a:lnTlToBr w="12700" cmpd="sng">
-                      <a:noFill/>
-                      <a:prstDash val="solid"/>
-                    </a:lnTlToBr>
-                    <a:lnBlToTr w="12700" cmpd="sng">
-                      <a:noFill/>
-                      <a:prstDash val="solid"/>
-                    </a:lnBlToTr>
-                  </a:tcPr>
-                </a:tc>
-                <a:tc>
-                  <a:txBody>
-                    <a:bodyPr/>
-                    <a:lstStyle/>
-                    <a:p>
-                      <a:pPr marL="0" marR="0" lvl="0" indent="0" algn="l" defTabSz="914400" rtl="0" eaLnBrk="1" fontAlgn="auto" latinLnBrk="0" hangingPunct="1">
-                        <a:lnSpc>
-                          <a:spcPct val="100000"/>
-                        </a:lnSpc>
-                        <a:spcBef>
-                          <a:spcPct val="20000"/>
-                        </a:spcBef>
-                        <a:spcAft>
-                          <a:spcPts val="0"/>
-                        </a:spcAft>
-                        <a:buClr>
-                          <a:srgbClr val="33C0CD"/>
-                        </a:buClr>
-                        <a:buSzTx/>
-                        <a:buFont typeface="Arial"/>
-                        <a:buNone/>
-                        <a:tabLst/>
-                        <a:defRPr/>
-                      </a:pPr>
-                      <a:r>
-                        <a:rPr kumimoji="0" lang="en-US" sz="2400" b="1" i="0" u="none" strike="noStrike" kern="1200" cap="none" spc="0" normalizeH="0" baseline="0" noProof="0" dirty="0">
-                          <a:ln>
-                            <a:noFill/>
-                          </a:ln>
-                          <a:solidFill>
-                            <a:srgbClr val="B8232F"/>
-                          </a:solidFill>
-                          <a:effectLst/>
-                          <a:uLnTx/>
-                          <a:uFillTx/>
-                          <a:latin typeface="Segoe UI Semibold" panose="020B0502040204020203" pitchFamily="34" charset="0"/>
-                          <a:cs typeface="Segoe UI Semibold" panose="020B0502040204020203" pitchFamily="34" charset="0"/>
-                        </a:rPr>
-                        <a:t>Heading</a:t>
-                      </a:r>
-                    </a:p>
-                  </a:txBody>
-                  <a:tcPr anchor="ctr">
-                    <a:lnL w="12700" cap="flat" cmpd="sng" algn="ctr">
-                      <a:noFill/>
-                      <a:prstDash val="solid"/>
-                      <a:round/>
-                      <a:headEnd type="none" w="med" len="med"/>
-                      <a:tailEnd type="none" w="med" len="med"/>
-                    </a:lnL>
-                    <a:lnR w="12700" cap="flat" cmpd="sng" algn="ctr">
-                      <a:noFill/>
-                      <a:prstDash val="solid"/>
-                      <a:round/>
-                      <a:headEnd type="none" w="med" len="med"/>
-                      <a:tailEnd type="none" w="med" len="med"/>
-                    </a:lnR>
-                    <a:lnT>
-                      <a:noFill/>
-                    </a:lnT>
-                    <a:lnB w="12700" cap="flat" cmpd="sng" algn="ctr">
-                      <a:solidFill>
-                        <a:schemeClr val="accent2"/>
-                      </a:solidFill>
-                      <a:prstDash val="solid"/>
-                      <a:round/>
-                      <a:headEnd type="none" w="med" len="med"/>
-                      <a:tailEnd type="none" w="med" len="med"/>
-                    </a:lnB>
-                    <a:lnTlToBr w="12700" cmpd="sng">
-                      <a:noFill/>
-                      <a:prstDash val="solid"/>
-                    </a:lnTlToBr>
-                    <a:lnBlToTr w="12700" cmpd="sng">
-                      <a:noFill/>
-                      <a:prstDash val="solid"/>
-                    </a:lnBlToTr>
-                  </a:tcPr>
-                </a:tc>
-                <a:tc>
-                  <a:txBody>
-                    <a:bodyPr/>
-                    <a:lstStyle/>
-                    <a:p>
-                      <a:pPr marL="0" marR="0" lvl="0" indent="0" algn="l" defTabSz="914400" rtl="0" eaLnBrk="1" fontAlgn="auto" latinLnBrk="0" hangingPunct="1">
-                        <a:lnSpc>
-                          <a:spcPct val="100000"/>
-                        </a:lnSpc>
-                        <a:spcBef>
-                          <a:spcPct val="20000"/>
-                        </a:spcBef>
-                        <a:spcAft>
-                          <a:spcPts val="0"/>
-                        </a:spcAft>
-                        <a:buClr>
-                          <a:srgbClr val="33C0CD"/>
-                        </a:buClr>
-                        <a:buSzTx/>
-                        <a:buFont typeface="Arial"/>
-                        <a:buNone/>
-                        <a:tabLst/>
-                        <a:defRPr/>
-                      </a:pPr>
-                      <a:r>
-                        <a:rPr kumimoji="0" lang="en-US" sz="2400" b="1" i="0" u="none" strike="noStrike" kern="1200" cap="none" spc="0" normalizeH="0" baseline="0" noProof="0" dirty="0">
-                          <a:ln>
-                            <a:noFill/>
-                          </a:ln>
-                          <a:solidFill>
-                            <a:srgbClr val="B8232F"/>
-                          </a:solidFill>
-                          <a:effectLst/>
-                          <a:uLnTx/>
-                          <a:uFillTx/>
-                          <a:latin typeface="Segoe UI Semibold" panose="020B0502040204020203" pitchFamily="34" charset="0"/>
-                          <a:ea typeface="+mn-ea"/>
-                          <a:cs typeface="Segoe UI Semibold" panose="020B0502040204020203" pitchFamily="34" charset="0"/>
-                        </a:rPr>
-                        <a:t>Heading</a:t>
-                      </a:r>
-                    </a:p>
-                  </a:txBody>
-                  <a:tcPr anchor="ctr">
-                    <a:lnL w="12700" cap="flat" cmpd="sng" algn="ctr">
-                      <a:noFill/>
-                      <a:prstDash val="solid"/>
-                      <a:round/>
-                      <a:headEnd type="none" w="med" len="med"/>
-                      <a:tailEnd type="none" w="med" len="med"/>
-                    </a:lnL>
-                    <a:lnR>
-                      <a:noFill/>
-                    </a:lnR>
-                    <a:lnT>
-                      <a:noFill/>
-                    </a:lnT>
-                    <a:lnB w="12700" cap="flat" cmpd="sng" algn="ctr">
-                      <a:solidFill>
-                        <a:schemeClr val="accent2"/>
-                      </a:solidFill>
-                      <a:prstDash val="solid"/>
-                      <a:round/>
-                      <a:headEnd type="none" w="med" len="med"/>
-                      <a:tailEnd type="none" w="med" len="med"/>
-                    </a:lnB>
-                    <a:lnTlToBr w="12700" cmpd="sng">
-                      <a:noFill/>
-                      <a:prstDash val="solid"/>
-                    </a:lnTlToBr>
-                    <a:lnBlToTr w="12700" cmpd="sng">
-                      <a:noFill/>
-                      <a:prstDash val="solid"/>
-                    </a:lnBlToTr>
-                  </a:tcPr>
-                </a:tc>
-                <a:extLst>
-                  <a:ext uri="{0D108BD9-81ED-4DB2-BD59-A6C34878D82A}">
-                    <a16:rowId xmlns:a16="http://schemas.microsoft.com/office/drawing/2014/main" val="671227163"/>
-                  </a:ext>
-                </a:extLst>
-              </a:tr>
-              <a:tr h="465412">
-                <a:tc>
-                  <a:txBody>
-                    <a:bodyPr/>
-                    <a:lstStyle/>
-                    <a:p>
-                      <a:pPr marL="0" marR="0" lvl="0" indent="0" algn="l" defTabSz="914400" rtl="0" eaLnBrk="1" fontAlgn="auto" latinLnBrk="0" hangingPunct="1">
-                        <a:lnSpc>
-                          <a:spcPct val="100000"/>
-                        </a:lnSpc>
-                        <a:spcBef>
-                          <a:spcPct val="20000"/>
-                        </a:spcBef>
-                        <a:spcAft>
-                          <a:spcPts val="0"/>
-                        </a:spcAft>
-                        <a:buClr>
-                          <a:srgbClr val="33C0CD"/>
-                        </a:buClr>
-                        <a:buSzTx/>
-                        <a:buFont typeface="Arial"/>
-                        <a:buNone/>
-                        <a:tabLst/>
-                        <a:defRPr/>
-                      </a:pPr>
-                      <a:r>
-                        <a:rPr kumimoji="0" lang="en-US" sz="1800" b="0" i="0" u="none" strike="noStrike" kern="1200" cap="none" spc="0" normalizeH="0" baseline="0" noProof="0" dirty="0">
-                          <a:ln>
-                            <a:noFill/>
-                          </a:ln>
-                          <a:solidFill>
-                            <a:schemeClr val="tx1"/>
-                          </a:solidFill>
-                          <a:effectLst/>
-                          <a:uLnTx/>
-                          <a:uFillTx/>
-                          <a:latin typeface="Segoe UI" panose="020B0502040204020203" pitchFamily="34" charset="0"/>
-                          <a:cs typeface="Segoe UI" panose="020B0502040204020203" pitchFamily="34" charset="0"/>
-                        </a:rPr>
-                        <a:t>Table data here</a:t>
-                      </a:r>
-                    </a:p>
-                  </a:txBody>
-                  <a:tcPr anchor="ctr">
-                    <a:lnL>
-                      <a:noFill/>
-                    </a:lnL>
-                    <a:lnR w="12700" cap="flat" cmpd="sng" algn="ctr">
-                      <a:noFill/>
-                      <a:prstDash val="solid"/>
-                      <a:round/>
-                      <a:headEnd type="none" w="med" len="med"/>
-                      <a:tailEnd type="none" w="med" len="med"/>
-                    </a:lnR>
-                    <a:lnT w="12700" cap="flat" cmpd="sng" algn="ctr">
-                      <a:solidFill>
-                        <a:schemeClr val="accent2"/>
-                      </a:solidFill>
-                      <a:prstDash val="solid"/>
-                      <a:round/>
-                      <a:headEnd type="none" w="med" len="med"/>
-                      <a:tailEnd type="none" w="med" len="med"/>
-                    </a:lnT>
-                    <a:lnB w="12700" cap="flat" cmpd="sng" algn="ctr">
-                      <a:solidFill>
-                        <a:schemeClr val="bg1"/>
-                      </a:solidFill>
-                      <a:prstDash val="sysDot"/>
-                      <a:round/>
-                      <a:headEnd type="none" w="med" len="med"/>
-                      <a:tailEnd type="none" w="med" len="med"/>
-                    </a:lnB>
-                    <a:lnTlToBr w="12700" cmpd="sng">
-                      <a:noFill/>
-                      <a:prstDash val="solid"/>
-                    </a:lnTlToBr>
-                    <a:lnBlToTr w="12700" cmpd="sng">
-                      <a:noFill/>
-                      <a:prstDash val="solid"/>
-                    </a:lnBlToTr>
-                  </a:tcPr>
-                </a:tc>
-                <a:tc>
-                  <a:txBody>
-                    <a:bodyPr/>
-                    <a:lstStyle/>
-                    <a:p>
-                      <a:pPr marL="0" marR="0" lvl="0" indent="0" algn="l" defTabSz="914400" rtl="0" eaLnBrk="1" fontAlgn="auto" latinLnBrk="0" hangingPunct="1">
-                        <a:lnSpc>
-                          <a:spcPct val="100000"/>
-                        </a:lnSpc>
-                        <a:spcBef>
-                          <a:spcPct val="20000"/>
-                        </a:spcBef>
-                        <a:spcAft>
-                          <a:spcPts val="0"/>
-                        </a:spcAft>
-                        <a:buClr>
-                          <a:srgbClr val="33C0CD"/>
-                        </a:buClr>
-                        <a:buSzTx/>
-                        <a:buFont typeface="Arial"/>
-                        <a:buNone/>
-                        <a:tabLst/>
-                        <a:defRPr/>
-                      </a:pPr>
-                      <a:r>
-                        <a:rPr kumimoji="0" lang="en-US" sz="1800" b="0" i="0" u="none" strike="noStrike" kern="1200" cap="none" spc="0" normalizeH="0" baseline="0" noProof="0" dirty="0">
-                          <a:ln>
-                            <a:noFill/>
-                          </a:ln>
-                          <a:solidFill>
-                            <a:schemeClr val="tx1"/>
-                          </a:solidFill>
-                          <a:effectLst/>
-                          <a:uLnTx/>
-                          <a:uFillTx/>
-                          <a:latin typeface="Segoe UI" panose="020B0502040204020203" pitchFamily="34" charset="0"/>
-                          <a:cs typeface="Segoe UI" panose="020B0502040204020203" pitchFamily="34" charset="0"/>
-                        </a:rPr>
-                        <a:t>Table data here</a:t>
-                      </a:r>
-                    </a:p>
-                  </a:txBody>
-                  <a:tcPr anchor="ctr">
-                    <a:lnL w="12700" cap="flat" cmpd="sng" algn="ctr">
-                      <a:noFill/>
-                      <a:prstDash val="solid"/>
-                      <a:round/>
-                      <a:headEnd type="none" w="med" len="med"/>
-                      <a:tailEnd type="none" w="med" len="med"/>
-                    </a:lnL>
-                    <a:lnR w="12700" cap="flat" cmpd="sng" algn="ctr">
-                      <a:noFill/>
-                      <a:prstDash val="solid"/>
-                      <a:round/>
-                      <a:headEnd type="none" w="med" len="med"/>
-                      <a:tailEnd type="none" w="med" len="med"/>
-                    </a:lnR>
-                    <a:lnT w="12700" cap="flat" cmpd="sng" algn="ctr">
-                      <a:solidFill>
-                        <a:schemeClr val="accent2"/>
-                      </a:solidFill>
-                      <a:prstDash val="solid"/>
-                      <a:round/>
-                      <a:headEnd type="none" w="med" len="med"/>
-                      <a:tailEnd type="none" w="med" len="med"/>
-                    </a:lnT>
-                    <a:lnB w="12700" cap="flat" cmpd="sng" algn="ctr">
-                      <a:solidFill>
-                        <a:schemeClr val="bg1"/>
-                      </a:solidFill>
-                      <a:prstDash val="sysDot"/>
-                      <a:round/>
-                      <a:headEnd type="none" w="med" len="med"/>
-                      <a:tailEnd type="none" w="med" len="med"/>
-                    </a:lnB>
-                    <a:lnTlToBr w="12700" cmpd="sng">
-                      <a:noFill/>
-                      <a:prstDash val="solid"/>
-                    </a:lnTlToBr>
-                    <a:lnBlToTr w="12700" cmpd="sng">
-                      <a:noFill/>
-                      <a:prstDash val="solid"/>
-                    </a:lnBlToTr>
-                  </a:tcPr>
-                </a:tc>
-                <a:tc>
-                  <a:txBody>
-                    <a:bodyPr/>
-                    <a:lstStyle/>
-                    <a:p>
-                      <a:pPr marL="0" marR="0" lvl="0" indent="0" algn="l" defTabSz="914400" rtl="0" eaLnBrk="1" fontAlgn="auto" latinLnBrk="0" hangingPunct="1">
-                        <a:lnSpc>
-                          <a:spcPct val="100000"/>
-                        </a:lnSpc>
-                        <a:spcBef>
-                          <a:spcPct val="20000"/>
-                        </a:spcBef>
-                        <a:spcAft>
-                          <a:spcPts val="0"/>
-                        </a:spcAft>
-                        <a:buClr>
-                          <a:srgbClr val="33C0CD"/>
-                        </a:buClr>
-                        <a:buSzTx/>
-                        <a:buFont typeface="Arial"/>
-                        <a:buNone/>
-                        <a:tabLst/>
-                        <a:defRPr/>
-                      </a:pPr>
-                      <a:r>
-                        <a:rPr kumimoji="0" lang="en-US" sz="1800" b="0" i="0" u="none" strike="noStrike" kern="1200" cap="none" spc="0" normalizeH="0" baseline="0" noProof="0" dirty="0">
-                          <a:ln>
-                            <a:noFill/>
-                          </a:ln>
-                          <a:solidFill>
-                            <a:schemeClr val="tx1"/>
-                          </a:solidFill>
-                          <a:effectLst/>
-                          <a:uLnTx/>
-                          <a:uFillTx/>
-                          <a:latin typeface="Segoe UI" panose="020B0502040204020203" pitchFamily="34" charset="0"/>
-                          <a:cs typeface="Segoe UI" panose="020B0502040204020203" pitchFamily="34" charset="0"/>
-                        </a:rPr>
-                        <a:t>Table data here</a:t>
-                      </a:r>
-                    </a:p>
-                  </a:txBody>
-                  <a:tcPr anchor="ctr">
-                    <a:lnL w="12700" cap="flat" cmpd="sng" algn="ctr">
-                      <a:noFill/>
-                      <a:prstDash val="solid"/>
-                      <a:round/>
-                      <a:headEnd type="none" w="med" len="med"/>
-                      <a:tailEnd type="none" w="med" len="med"/>
-                    </a:lnL>
-                    <a:lnR>
-                      <a:noFill/>
-                    </a:lnR>
-                    <a:lnT w="12700" cap="flat" cmpd="sng" algn="ctr">
-                      <a:solidFill>
-                        <a:schemeClr val="accent2"/>
-                      </a:solidFill>
-                      <a:prstDash val="solid"/>
-                      <a:round/>
-                      <a:headEnd type="none" w="med" len="med"/>
-                      <a:tailEnd type="none" w="med" len="med"/>
-                    </a:lnT>
-                    <a:lnB w="12700" cap="flat" cmpd="sng" algn="ctr">
-                      <a:solidFill>
-                        <a:schemeClr val="bg1"/>
-                      </a:solidFill>
-                      <a:prstDash val="sysDot"/>
-                      <a:round/>
-                      <a:headEnd type="none" w="med" len="med"/>
-                      <a:tailEnd type="none" w="med" len="med"/>
-                    </a:lnB>
-                    <a:lnTlToBr w="12700" cmpd="sng">
-                      <a:noFill/>
-                      <a:prstDash val="solid"/>
-                    </a:lnTlToBr>
-                    <a:lnBlToTr w="12700" cmpd="sng">
-                      <a:noFill/>
-                      <a:prstDash val="solid"/>
-                    </a:lnBlToTr>
-                  </a:tcPr>
-                </a:tc>
-                <a:extLst>
-                  <a:ext uri="{0D108BD9-81ED-4DB2-BD59-A6C34878D82A}">
-                    <a16:rowId xmlns:a16="http://schemas.microsoft.com/office/drawing/2014/main" val="1341708328"/>
-                  </a:ext>
-                </a:extLst>
-              </a:tr>
-              <a:tr h="465412">
-                <a:tc>
-                  <a:txBody>
-                    <a:bodyPr/>
-                    <a:lstStyle/>
-                    <a:p>
-                      <a:pPr marL="0" marR="0" lvl="0" indent="0" algn="l" defTabSz="914400" rtl="0" eaLnBrk="1" fontAlgn="auto" latinLnBrk="0" hangingPunct="1">
-                        <a:lnSpc>
-                          <a:spcPct val="100000"/>
-                        </a:lnSpc>
-                        <a:spcBef>
-                          <a:spcPct val="20000"/>
-                        </a:spcBef>
-                        <a:spcAft>
-                          <a:spcPts val="0"/>
-                        </a:spcAft>
-                        <a:buClr>
-                          <a:srgbClr val="33C0CD"/>
-                        </a:buClr>
-                        <a:buSzTx/>
-                        <a:buFont typeface="Arial"/>
-                        <a:buNone/>
-                        <a:tabLst/>
-                        <a:defRPr/>
-                      </a:pPr>
-                      <a:r>
-                        <a:rPr kumimoji="0" lang="en-US" sz="1800" b="0" i="0" u="none" strike="noStrike" kern="1200" cap="none" spc="0" normalizeH="0" baseline="0" noProof="0" dirty="0">
-                          <a:ln>
-                            <a:noFill/>
-                          </a:ln>
-                          <a:solidFill>
-                            <a:schemeClr val="tx1"/>
-                          </a:solidFill>
-                          <a:effectLst/>
-                          <a:uLnTx/>
-                          <a:uFillTx/>
-                          <a:latin typeface="Segoe UI" panose="020B0502040204020203" pitchFamily="34" charset="0"/>
-                          <a:cs typeface="Segoe UI" panose="020B0502040204020203" pitchFamily="34" charset="0"/>
-                        </a:rPr>
-                        <a:t>Table data here</a:t>
-                      </a:r>
-                    </a:p>
-                  </a:txBody>
-                  <a:tcPr anchor="ctr">
-                    <a:lnL>
-                      <a:noFill/>
-                    </a:lnL>
-                    <a:lnR w="12700" cap="flat" cmpd="sng" algn="ctr">
-                      <a:noFill/>
-                      <a:prstDash val="solid"/>
-                      <a:round/>
-                      <a:headEnd type="none" w="med" len="med"/>
-                      <a:tailEnd type="none" w="med" len="med"/>
-                    </a:lnR>
-                    <a:lnT w="12700" cap="flat" cmpd="sng" algn="ctr">
-                      <a:solidFill>
-                        <a:schemeClr val="bg1"/>
-                      </a:solidFill>
-                      <a:prstDash val="sysDot"/>
-                      <a:round/>
-                      <a:headEnd type="none" w="med" len="med"/>
-                      <a:tailEnd type="none" w="med" len="med"/>
-                    </a:lnT>
-                    <a:lnB w="12700" cap="flat" cmpd="sng" algn="ctr">
-                      <a:solidFill>
-                        <a:schemeClr val="bg1"/>
-                      </a:solidFill>
-                      <a:prstDash val="sysDot"/>
-                      <a:round/>
-                      <a:headEnd type="none" w="med" len="med"/>
-                      <a:tailEnd type="none" w="med" len="med"/>
-                    </a:lnB>
-                    <a:lnTlToBr w="12700" cmpd="sng">
-                      <a:noFill/>
-                      <a:prstDash val="solid"/>
-                    </a:lnTlToBr>
-                    <a:lnBlToTr w="12700" cmpd="sng">
-                      <a:noFill/>
-                      <a:prstDash val="solid"/>
-                    </a:lnBlToTr>
-                  </a:tcPr>
-                </a:tc>
-                <a:tc>
-                  <a:txBody>
-                    <a:bodyPr/>
-                    <a:lstStyle/>
-                    <a:p>
-                      <a:pPr marL="0" marR="0" lvl="0" indent="0" algn="l" defTabSz="914400" rtl="0" eaLnBrk="1" fontAlgn="auto" latinLnBrk="0" hangingPunct="1">
-                        <a:lnSpc>
-                          <a:spcPct val="100000"/>
-                        </a:lnSpc>
-                        <a:spcBef>
-                          <a:spcPct val="20000"/>
-                        </a:spcBef>
-                        <a:spcAft>
-                          <a:spcPts val="0"/>
-                        </a:spcAft>
-                        <a:buClr>
-                          <a:srgbClr val="33C0CD"/>
-                        </a:buClr>
-                        <a:buSzTx/>
-                        <a:buFont typeface="Arial"/>
-                        <a:buNone/>
-                        <a:tabLst/>
-                        <a:defRPr/>
-                      </a:pPr>
-                      <a:r>
-                        <a:rPr kumimoji="0" lang="en-US" sz="1800" b="0" i="0" u="none" strike="noStrike" kern="1200" cap="none" spc="0" normalizeH="0" baseline="0" noProof="0" dirty="0">
-                          <a:ln>
-                            <a:noFill/>
-                          </a:ln>
-                          <a:solidFill>
-                            <a:schemeClr val="tx1"/>
-                          </a:solidFill>
-                          <a:effectLst/>
-                          <a:uLnTx/>
-                          <a:uFillTx/>
-                          <a:latin typeface="Segoe UI" panose="020B0502040204020203" pitchFamily="34" charset="0"/>
-                          <a:cs typeface="Segoe UI" panose="020B0502040204020203" pitchFamily="34" charset="0"/>
-                        </a:rPr>
-                        <a:t>Table data here</a:t>
-                      </a:r>
-                    </a:p>
-                  </a:txBody>
-                  <a:tcPr anchor="ctr">
-                    <a:lnL w="12700" cap="flat" cmpd="sng" algn="ctr">
-                      <a:noFill/>
-                      <a:prstDash val="solid"/>
-                      <a:round/>
-                      <a:headEnd type="none" w="med" len="med"/>
-                      <a:tailEnd type="none" w="med" len="med"/>
-                    </a:lnL>
-                    <a:lnR w="12700" cap="flat" cmpd="sng" algn="ctr">
-                      <a:noFill/>
-                      <a:prstDash val="solid"/>
-                      <a:round/>
-                      <a:headEnd type="none" w="med" len="med"/>
-                      <a:tailEnd type="none" w="med" len="med"/>
-                    </a:lnR>
-                    <a:lnT w="12700" cap="flat" cmpd="sng" algn="ctr">
-                      <a:solidFill>
-                        <a:schemeClr val="bg1"/>
-                      </a:solidFill>
-                      <a:prstDash val="sysDot"/>
-                      <a:round/>
-                      <a:headEnd type="none" w="med" len="med"/>
-                      <a:tailEnd type="none" w="med" len="med"/>
-                    </a:lnT>
-                    <a:lnB w="12700" cap="flat" cmpd="sng" algn="ctr">
-                      <a:solidFill>
-                        <a:schemeClr val="bg1"/>
-                      </a:solidFill>
-                      <a:prstDash val="sysDot"/>
-                      <a:round/>
-                      <a:headEnd type="none" w="med" len="med"/>
-                      <a:tailEnd type="none" w="med" len="med"/>
-                    </a:lnB>
-                    <a:lnTlToBr w="12700" cmpd="sng">
-                      <a:noFill/>
-                      <a:prstDash val="solid"/>
-                    </a:lnTlToBr>
-                    <a:lnBlToTr w="12700" cmpd="sng">
-                      <a:noFill/>
-                      <a:prstDash val="solid"/>
-                    </a:lnBlToTr>
-                  </a:tcPr>
-                </a:tc>
-                <a:tc>
-                  <a:txBody>
-                    <a:bodyPr/>
-                    <a:lstStyle/>
-                    <a:p>
-                      <a:pPr marL="0" marR="0" lvl="0" indent="0" algn="l" defTabSz="914400" rtl="0" eaLnBrk="1" fontAlgn="auto" latinLnBrk="0" hangingPunct="1">
-                        <a:lnSpc>
-                          <a:spcPct val="100000"/>
-                        </a:lnSpc>
-                        <a:spcBef>
-                          <a:spcPct val="20000"/>
-                        </a:spcBef>
-                        <a:spcAft>
-                          <a:spcPts val="0"/>
-                        </a:spcAft>
-                        <a:buClr>
-                          <a:srgbClr val="33C0CD"/>
-                        </a:buClr>
-                        <a:buSzTx/>
-                        <a:buFont typeface="Arial"/>
-                        <a:buNone/>
-                        <a:tabLst/>
-                        <a:defRPr/>
-                      </a:pPr>
-                      <a:r>
-                        <a:rPr kumimoji="0" lang="en-US" sz="1800" b="0" i="0" u="none" strike="noStrike" kern="1200" cap="none" spc="0" normalizeH="0" baseline="0" noProof="0" dirty="0">
-                          <a:ln>
-                            <a:noFill/>
-                          </a:ln>
-                          <a:solidFill>
-                            <a:schemeClr val="tx1"/>
-                          </a:solidFill>
-                          <a:effectLst/>
-                          <a:uLnTx/>
-                          <a:uFillTx/>
-                          <a:latin typeface="Segoe UI" panose="020B0502040204020203" pitchFamily="34" charset="0"/>
-                          <a:cs typeface="Segoe UI" panose="020B0502040204020203" pitchFamily="34" charset="0"/>
-                        </a:rPr>
-                        <a:t>Table data here</a:t>
-                      </a:r>
-                    </a:p>
-                  </a:txBody>
-                  <a:tcPr anchor="ctr">
-                    <a:lnL w="12700" cap="flat" cmpd="sng" algn="ctr">
-                      <a:noFill/>
-                      <a:prstDash val="solid"/>
-                      <a:round/>
-                      <a:headEnd type="none" w="med" len="med"/>
-                      <a:tailEnd type="none" w="med" len="med"/>
-                    </a:lnL>
-                    <a:lnR>
-                      <a:noFill/>
-                    </a:lnR>
-                    <a:lnT w="12700" cap="flat" cmpd="sng" algn="ctr">
-                      <a:solidFill>
-                        <a:schemeClr val="bg1"/>
-                      </a:solidFill>
-                      <a:prstDash val="sysDot"/>
-                      <a:round/>
-                      <a:headEnd type="none" w="med" len="med"/>
-                      <a:tailEnd type="none" w="med" len="med"/>
-                    </a:lnT>
-                    <a:lnB w="12700" cap="flat" cmpd="sng" algn="ctr">
-                      <a:solidFill>
-                        <a:schemeClr val="bg1"/>
-                      </a:solidFill>
-                      <a:prstDash val="sysDot"/>
-                      <a:round/>
-                      <a:headEnd type="none" w="med" len="med"/>
-                      <a:tailEnd type="none" w="med" len="med"/>
-                    </a:lnB>
-                    <a:lnTlToBr w="12700" cmpd="sng">
-                      <a:noFill/>
-                      <a:prstDash val="solid"/>
-                    </a:lnTlToBr>
-                    <a:lnBlToTr w="12700" cmpd="sng">
-                      <a:noFill/>
-                      <a:prstDash val="solid"/>
-                    </a:lnBlToTr>
-                  </a:tcPr>
-                </a:tc>
-                <a:extLst>
-                  <a:ext uri="{0D108BD9-81ED-4DB2-BD59-A6C34878D82A}">
-                    <a16:rowId xmlns:a16="http://schemas.microsoft.com/office/drawing/2014/main" val="1744979037"/>
-                  </a:ext>
-                </a:extLst>
-              </a:tr>
-              <a:tr h="465412">
-                <a:tc>
-                  <a:txBody>
-                    <a:bodyPr/>
-                    <a:lstStyle/>
-                    <a:p>
-                      <a:pPr marL="0" marR="0" lvl="0" indent="0" algn="l" defTabSz="914400" rtl="0" eaLnBrk="1" fontAlgn="auto" latinLnBrk="0" hangingPunct="1">
-                        <a:lnSpc>
-                          <a:spcPct val="100000"/>
-                        </a:lnSpc>
-                        <a:spcBef>
-                          <a:spcPct val="20000"/>
-                        </a:spcBef>
-                        <a:spcAft>
-                          <a:spcPts val="0"/>
-                        </a:spcAft>
-                        <a:buClr>
-                          <a:srgbClr val="33C0CD"/>
-                        </a:buClr>
-                        <a:buSzTx/>
-                        <a:buFont typeface="Arial"/>
-                        <a:buNone/>
-                        <a:tabLst/>
-                        <a:defRPr/>
-                      </a:pPr>
-                      <a:r>
-                        <a:rPr kumimoji="0" lang="en-US" sz="1800" b="0" i="0" u="none" strike="noStrike" kern="1200" cap="none" spc="0" normalizeH="0" baseline="0" noProof="0" dirty="0">
-                          <a:ln>
-                            <a:noFill/>
-                          </a:ln>
-                          <a:solidFill>
-                            <a:schemeClr val="tx1"/>
-                          </a:solidFill>
-                          <a:effectLst/>
-                          <a:uLnTx/>
-                          <a:uFillTx/>
-                          <a:latin typeface="Segoe UI" panose="020B0502040204020203" pitchFamily="34" charset="0"/>
-                          <a:cs typeface="Segoe UI" panose="020B0502040204020203" pitchFamily="34" charset="0"/>
-                        </a:rPr>
-                        <a:t>Table data here</a:t>
-                      </a:r>
-                    </a:p>
-                  </a:txBody>
-                  <a:tcPr anchor="ctr">
-                    <a:lnL>
-                      <a:noFill/>
-                    </a:lnL>
-                    <a:lnR w="12700" cap="flat" cmpd="sng" algn="ctr">
-                      <a:noFill/>
-                      <a:prstDash val="solid"/>
-                      <a:round/>
-                      <a:headEnd type="none" w="med" len="med"/>
-                      <a:tailEnd type="none" w="med" len="med"/>
-                    </a:lnR>
-                    <a:lnT w="12700" cap="flat" cmpd="sng" algn="ctr">
-                      <a:solidFill>
-                        <a:schemeClr val="bg1"/>
-                      </a:solidFill>
-                      <a:prstDash val="sysDot"/>
-                      <a:round/>
-                      <a:headEnd type="none" w="med" len="med"/>
-                      <a:tailEnd type="none" w="med" len="med"/>
-                    </a:lnT>
-                    <a:lnB w="12700" cap="flat" cmpd="sng" algn="ctr">
-                      <a:solidFill>
-                        <a:schemeClr val="bg1"/>
-                      </a:solidFill>
-                      <a:prstDash val="sysDot"/>
-                      <a:round/>
-                      <a:headEnd type="none" w="med" len="med"/>
-                      <a:tailEnd type="none" w="med" len="med"/>
-                    </a:lnB>
-                    <a:lnTlToBr w="12700" cmpd="sng">
-                      <a:noFill/>
-                      <a:prstDash val="solid"/>
-                    </a:lnTlToBr>
-                    <a:lnBlToTr w="12700" cmpd="sng">
-                      <a:noFill/>
-                      <a:prstDash val="solid"/>
-                    </a:lnBlToTr>
-                  </a:tcPr>
-                </a:tc>
-                <a:tc>
-                  <a:txBody>
-                    <a:bodyPr/>
-                    <a:lstStyle/>
-                    <a:p>
-                      <a:pPr marL="0" marR="0" lvl="0" indent="0" algn="l" defTabSz="914400" rtl="0" eaLnBrk="1" fontAlgn="auto" latinLnBrk="0" hangingPunct="1">
-                        <a:lnSpc>
-                          <a:spcPct val="100000"/>
-                        </a:lnSpc>
-                        <a:spcBef>
-                          <a:spcPct val="20000"/>
-                        </a:spcBef>
-                        <a:spcAft>
-                          <a:spcPts val="0"/>
-                        </a:spcAft>
-                        <a:buClr>
-                          <a:srgbClr val="33C0CD"/>
-                        </a:buClr>
-                        <a:buSzTx/>
-                        <a:buFont typeface="Arial"/>
-                        <a:buNone/>
-                        <a:tabLst/>
-                        <a:defRPr/>
-                      </a:pPr>
-                      <a:r>
-                        <a:rPr kumimoji="0" lang="en-US" sz="1800" b="0" i="0" u="none" strike="noStrike" kern="1200" cap="none" spc="0" normalizeH="0" baseline="0" noProof="0" dirty="0">
-                          <a:ln>
-                            <a:noFill/>
-                          </a:ln>
-                          <a:solidFill>
-                            <a:schemeClr val="tx1"/>
-                          </a:solidFill>
-                          <a:effectLst/>
-                          <a:uLnTx/>
-                          <a:uFillTx/>
-                          <a:latin typeface="Segoe UI" panose="020B0502040204020203" pitchFamily="34" charset="0"/>
-                          <a:cs typeface="Segoe UI" panose="020B0502040204020203" pitchFamily="34" charset="0"/>
-                        </a:rPr>
-                        <a:t>Table data here</a:t>
-                      </a:r>
-                    </a:p>
-                  </a:txBody>
-                  <a:tcPr anchor="ctr">
-                    <a:lnL w="12700" cap="flat" cmpd="sng" algn="ctr">
-                      <a:noFill/>
-                      <a:prstDash val="solid"/>
-                      <a:round/>
-                      <a:headEnd type="none" w="med" len="med"/>
-                      <a:tailEnd type="none" w="med" len="med"/>
-                    </a:lnL>
-                    <a:lnR w="12700" cap="flat" cmpd="sng" algn="ctr">
-                      <a:noFill/>
-                      <a:prstDash val="solid"/>
-                      <a:round/>
-                      <a:headEnd type="none" w="med" len="med"/>
-                      <a:tailEnd type="none" w="med" len="med"/>
-                    </a:lnR>
-                    <a:lnT w="12700" cap="flat" cmpd="sng" algn="ctr">
-                      <a:solidFill>
-                        <a:schemeClr val="bg1"/>
-                      </a:solidFill>
-                      <a:prstDash val="sysDot"/>
-                      <a:round/>
-                      <a:headEnd type="none" w="med" len="med"/>
-                      <a:tailEnd type="none" w="med" len="med"/>
-                    </a:lnT>
-                    <a:lnB w="12700" cap="flat" cmpd="sng" algn="ctr">
-                      <a:solidFill>
-                        <a:schemeClr val="bg1"/>
-                      </a:solidFill>
-                      <a:prstDash val="sysDot"/>
-                      <a:round/>
-                      <a:headEnd type="none" w="med" len="med"/>
-                      <a:tailEnd type="none" w="med" len="med"/>
-                    </a:lnB>
-                    <a:lnTlToBr w="12700" cmpd="sng">
-                      <a:noFill/>
-                      <a:prstDash val="solid"/>
-                    </a:lnTlToBr>
-                    <a:lnBlToTr w="12700" cmpd="sng">
-                      <a:noFill/>
-                      <a:prstDash val="solid"/>
-                    </a:lnBlToTr>
-                  </a:tcPr>
-                </a:tc>
-                <a:tc>
-                  <a:txBody>
-                    <a:bodyPr/>
-                    <a:lstStyle/>
-                    <a:p>
-                      <a:pPr marL="0" marR="0" lvl="0" indent="0" algn="l" defTabSz="914400" rtl="0" eaLnBrk="1" fontAlgn="auto" latinLnBrk="0" hangingPunct="1">
-                        <a:lnSpc>
-                          <a:spcPct val="100000"/>
-                        </a:lnSpc>
-                        <a:spcBef>
-                          <a:spcPct val="20000"/>
-                        </a:spcBef>
-                        <a:spcAft>
-                          <a:spcPts val="0"/>
-                        </a:spcAft>
-                        <a:buClr>
-                          <a:srgbClr val="33C0CD"/>
-                        </a:buClr>
-                        <a:buSzTx/>
-                        <a:buFont typeface="Arial"/>
-                        <a:buNone/>
-                        <a:tabLst/>
-                        <a:defRPr/>
-                      </a:pPr>
-                      <a:r>
-                        <a:rPr kumimoji="0" lang="en-US" sz="1800" b="0" i="0" u="none" strike="noStrike" kern="1200" cap="none" spc="0" normalizeH="0" baseline="0" noProof="0" dirty="0">
-                          <a:ln>
-                            <a:noFill/>
-                          </a:ln>
-                          <a:solidFill>
-                            <a:schemeClr val="tx1"/>
-                          </a:solidFill>
-                          <a:effectLst/>
-                          <a:uLnTx/>
-                          <a:uFillTx/>
-                          <a:latin typeface="Segoe UI" panose="020B0502040204020203" pitchFamily="34" charset="0"/>
-                          <a:cs typeface="Segoe UI" panose="020B0502040204020203" pitchFamily="34" charset="0"/>
-                        </a:rPr>
-                        <a:t>Table data here</a:t>
-                      </a:r>
-                    </a:p>
-                  </a:txBody>
-                  <a:tcPr anchor="ctr">
-                    <a:lnL w="12700" cap="flat" cmpd="sng" algn="ctr">
-                      <a:noFill/>
-                      <a:prstDash val="solid"/>
-                      <a:round/>
-                      <a:headEnd type="none" w="med" len="med"/>
-                      <a:tailEnd type="none" w="med" len="med"/>
-                    </a:lnL>
-                    <a:lnR>
-                      <a:noFill/>
-                    </a:lnR>
-                    <a:lnT w="12700" cap="flat" cmpd="sng" algn="ctr">
-                      <a:solidFill>
-                        <a:schemeClr val="bg1"/>
-                      </a:solidFill>
-                      <a:prstDash val="sysDot"/>
-                      <a:round/>
-                      <a:headEnd type="none" w="med" len="med"/>
-                      <a:tailEnd type="none" w="med" len="med"/>
-                    </a:lnT>
-                    <a:lnB w="12700" cap="flat" cmpd="sng" algn="ctr">
-                      <a:solidFill>
-                        <a:schemeClr val="bg1"/>
-                      </a:solidFill>
-                      <a:prstDash val="sysDot"/>
-                      <a:round/>
-                      <a:headEnd type="none" w="med" len="med"/>
-                      <a:tailEnd type="none" w="med" len="med"/>
-                    </a:lnB>
-                    <a:lnTlToBr w="12700" cmpd="sng">
-                      <a:noFill/>
-                      <a:prstDash val="solid"/>
-                    </a:lnTlToBr>
-                    <a:lnBlToTr w="12700" cmpd="sng">
-                      <a:noFill/>
-                      <a:prstDash val="solid"/>
-                    </a:lnBlToTr>
-                  </a:tcPr>
-                </a:tc>
-                <a:extLst>
-                  <a:ext uri="{0D108BD9-81ED-4DB2-BD59-A6C34878D82A}">
-                    <a16:rowId xmlns:a16="http://schemas.microsoft.com/office/drawing/2014/main" val="1363641488"/>
-                  </a:ext>
-                </a:extLst>
-              </a:tr>
-              <a:tr h="465412">
-                <a:tc>
-                  <a:txBody>
-                    <a:bodyPr/>
-                    <a:lstStyle/>
-                    <a:p>
-                      <a:pPr marL="0" marR="0" lvl="0" indent="0" algn="l" defTabSz="914400" rtl="0" eaLnBrk="1" fontAlgn="auto" latinLnBrk="0" hangingPunct="1">
-                        <a:lnSpc>
-                          <a:spcPct val="100000"/>
-                        </a:lnSpc>
-                        <a:spcBef>
-                          <a:spcPct val="20000"/>
-                        </a:spcBef>
-                        <a:spcAft>
-                          <a:spcPts val="0"/>
-                        </a:spcAft>
-                        <a:buClr>
-                          <a:srgbClr val="33C0CD"/>
-                        </a:buClr>
-                        <a:buSzTx/>
-                        <a:buFont typeface="Arial"/>
-                        <a:buNone/>
-                        <a:tabLst/>
-                        <a:defRPr/>
-                      </a:pPr>
-                      <a:r>
-                        <a:rPr kumimoji="0" lang="en-US" sz="1800" b="0" i="0" u="none" strike="noStrike" kern="1200" cap="none" spc="0" normalizeH="0" baseline="0" noProof="0" dirty="0">
-                          <a:ln>
-                            <a:noFill/>
-                          </a:ln>
-                          <a:solidFill>
-                            <a:schemeClr val="tx1"/>
-                          </a:solidFill>
-                          <a:effectLst/>
-                          <a:uLnTx/>
-                          <a:uFillTx/>
-                          <a:latin typeface="Segoe UI" panose="020B0502040204020203" pitchFamily="34" charset="0"/>
-                          <a:cs typeface="Segoe UI" panose="020B0502040204020203" pitchFamily="34" charset="0"/>
-                        </a:rPr>
-                        <a:t>Table data here</a:t>
-                      </a:r>
-                    </a:p>
-                  </a:txBody>
-                  <a:tcPr anchor="ctr">
-                    <a:lnL>
-                      <a:noFill/>
-                    </a:lnL>
-                    <a:lnR w="12700" cap="flat" cmpd="sng" algn="ctr">
-                      <a:noFill/>
-                      <a:prstDash val="solid"/>
-                      <a:round/>
-                      <a:headEnd type="none" w="med" len="med"/>
-                      <a:tailEnd type="none" w="med" len="med"/>
-                    </a:lnR>
-                    <a:lnT w="12700" cap="flat" cmpd="sng" algn="ctr">
-                      <a:solidFill>
-                        <a:schemeClr val="bg1"/>
-                      </a:solidFill>
-                      <a:prstDash val="sysDot"/>
-                      <a:round/>
-                      <a:headEnd type="none" w="med" len="med"/>
-                      <a:tailEnd type="none" w="med" len="med"/>
-                    </a:lnT>
-                    <a:lnB w="12700" cap="flat" cmpd="sng" algn="ctr">
-                      <a:solidFill>
-                        <a:schemeClr val="bg1"/>
-                      </a:solidFill>
-                      <a:prstDash val="sysDot"/>
-                      <a:round/>
-                      <a:headEnd type="none" w="med" len="med"/>
-                      <a:tailEnd type="none" w="med" len="med"/>
-                    </a:lnB>
-                    <a:lnTlToBr w="12700" cmpd="sng">
-                      <a:noFill/>
-                      <a:prstDash val="solid"/>
-                    </a:lnTlToBr>
-                    <a:lnBlToTr w="12700" cmpd="sng">
-                      <a:noFill/>
-                      <a:prstDash val="solid"/>
-                    </a:lnBlToTr>
-                  </a:tcPr>
-                </a:tc>
-                <a:tc>
-                  <a:txBody>
-                    <a:bodyPr/>
-                    <a:lstStyle/>
-                    <a:p>
-                      <a:pPr marL="0" marR="0" lvl="0" indent="0" algn="l" defTabSz="914400" rtl="0" eaLnBrk="1" fontAlgn="auto" latinLnBrk="0" hangingPunct="1">
-                        <a:lnSpc>
-                          <a:spcPct val="100000"/>
-                        </a:lnSpc>
-                        <a:spcBef>
-                          <a:spcPct val="20000"/>
-                        </a:spcBef>
-                        <a:spcAft>
-                          <a:spcPts val="0"/>
-                        </a:spcAft>
-                        <a:buClr>
-                          <a:srgbClr val="33C0CD"/>
-                        </a:buClr>
-                        <a:buSzTx/>
-                        <a:buFont typeface="Arial"/>
-                        <a:buNone/>
-                        <a:tabLst/>
-                        <a:defRPr/>
-                      </a:pPr>
-                      <a:r>
-                        <a:rPr kumimoji="0" lang="en-US" sz="1800" b="0" i="0" u="none" strike="noStrike" kern="1200" cap="none" spc="0" normalizeH="0" baseline="0" noProof="0" dirty="0">
-                          <a:ln>
-                            <a:noFill/>
-                          </a:ln>
-                          <a:solidFill>
-                            <a:schemeClr val="tx1"/>
-                          </a:solidFill>
-                          <a:effectLst/>
-                          <a:uLnTx/>
-                          <a:uFillTx/>
-                          <a:latin typeface="Segoe UI" panose="020B0502040204020203" pitchFamily="34" charset="0"/>
-                          <a:cs typeface="Segoe UI" panose="020B0502040204020203" pitchFamily="34" charset="0"/>
-                        </a:rPr>
-                        <a:t>Table data here</a:t>
-                      </a:r>
-                    </a:p>
-                  </a:txBody>
-                  <a:tcPr anchor="ctr">
-                    <a:lnL w="12700" cap="flat" cmpd="sng" algn="ctr">
-                      <a:noFill/>
-                      <a:prstDash val="solid"/>
-                      <a:round/>
-                      <a:headEnd type="none" w="med" len="med"/>
-                      <a:tailEnd type="none" w="med" len="med"/>
-                    </a:lnL>
-                    <a:lnR w="12700" cap="flat" cmpd="sng" algn="ctr">
-                      <a:noFill/>
-                      <a:prstDash val="solid"/>
-                      <a:round/>
-                      <a:headEnd type="none" w="med" len="med"/>
-                      <a:tailEnd type="none" w="med" len="med"/>
-                    </a:lnR>
-                    <a:lnT w="12700" cap="flat" cmpd="sng" algn="ctr">
-                      <a:solidFill>
-                        <a:schemeClr val="bg1"/>
-                      </a:solidFill>
-                      <a:prstDash val="sysDot"/>
-                      <a:round/>
-                      <a:headEnd type="none" w="med" len="med"/>
-                      <a:tailEnd type="none" w="med" len="med"/>
-                    </a:lnT>
-                    <a:lnB w="12700" cap="flat" cmpd="sng" algn="ctr">
-                      <a:solidFill>
-                        <a:schemeClr val="bg1"/>
-                      </a:solidFill>
-                      <a:prstDash val="sysDot"/>
-                      <a:round/>
-                      <a:headEnd type="none" w="med" len="med"/>
-                      <a:tailEnd type="none" w="med" len="med"/>
-                    </a:lnB>
-                    <a:lnTlToBr w="12700" cmpd="sng">
-                      <a:noFill/>
-                      <a:prstDash val="solid"/>
-                    </a:lnTlToBr>
-                    <a:lnBlToTr w="12700" cmpd="sng">
-                      <a:noFill/>
-                      <a:prstDash val="solid"/>
-                    </a:lnBlToTr>
-                  </a:tcPr>
-                </a:tc>
-                <a:tc>
-                  <a:txBody>
-                    <a:bodyPr/>
-                    <a:lstStyle/>
-                    <a:p>
-                      <a:pPr marL="0" marR="0" lvl="0" indent="0" algn="l" defTabSz="914400" rtl="0" eaLnBrk="1" fontAlgn="auto" latinLnBrk="0" hangingPunct="1">
-                        <a:lnSpc>
-                          <a:spcPct val="100000"/>
-                        </a:lnSpc>
-                        <a:spcBef>
-                          <a:spcPct val="20000"/>
-                        </a:spcBef>
-                        <a:spcAft>
-                          <a:spcPts val="0"/>
-                        </a:spcAft>
-                        <a:buClr>
-                          <a:srgbClr val="33C0CD"/>
-                        </a:buClr>
-                        <a:buSzTx/>
-                        <a:buFont typeface="Arial"/>
-                        <a:buNone/>
-                        <a:tabLst/>
-                        <a:defRPr/>
-                      </a:pPr>
-                      <a:r>
-                        <a:rPr kumimoji="0" lang="en-US" sz="1800" b="0" i="0" u="none" strike="noStrike" kern="1200" cap="none" spc="0" normalizeH="0" baseline="0" noProof="0" dirty="0">
-                          <a:ln>
-                            <a:noFill/>
-                          </a:ln>
-                          <a:solidFill>
-                            <a:schemeClr val="tx1"/>
-                          </a:solidFill>
-                          <a:effectLst/>
-                          <a:uLnTx/>
-                          <a:uFillTx/>
-                          <a:latin typeface="Segoe UI" panose="020B0502040204020203" pitchFamily="34" charset="0"/>
-                          <a:cs typeface="Segoe UI" panose="020B0502040204020203" pitchFamily="34" charset="0"/>
-                        </a:rPr>
-                        <a:t>Table data here</a:t>
-                      </a:r>
-                    </a:p>
-                  </a:txBody>
-                  <a:tcPr anchor="ctr">
-                    <a:lnL w="12700" cap="flat" cmpd="sng" algn="ctr">
-                      <a:noFill/>
-                      <a:prstDash val="solid"/>
-                      <a:round/>
-                      <a:headEnd type="none" w="med" len="med"/>
-                      <a:tailEnd type="none" w="med" len="med"/>
-                    </a:lnL>
-                    <a:lnR>
-                      <a:noFill/>
-                    </a:lnR>
-                    <a:lnT w="12700" cap="flat" cmpd="sng" algn="ctr">
-                      <a:solidFill>
-                        <a:schemeClr val="bg1"/>
-                      </a:solidFill>
-                      <a:prstDash val="sysDot"/>
-                      <a:round/>
-                      <a:headEnd type="none" w="med" len="med"/>
-                      <a:tailEnd type="none" w="med" len="med"/>
-                    </a:lnT>
-                    <a:lnB w="12700" cap="flat" cmpd="sng" algn="ctr">
-                      <a:solidFill>
-                        <a:schemeClr val="bg1"/>
-                      </a:solidFill>
-                      <a:prstDash val="sysDot"/>
-                      <a:round/>
-                      <a:headEnd type="none" w="med" len="med"/>
-                      <a:tailEnd type="none" w="med" len="med"/>
-                    </a:lnB>
-                    <a:lnTlToBr w="12700" cmpd="sng">
-                      <a:noFill/>
-                      <a:prstDash val="solid"/>
-                    </a:lnTlToBr>
-                    <a:lnBlToTr w="12700" cmpd="sng">
-                      <a:noFill/>
-                      <a:prstDash val="solid"/>
-                    </a:lnBlToTr>
-                  </a:tcPr>
-                </a:tc>
-                <a:extLst>
-                  <a:ext uri="{0D108BD9-81ED-4DB2-BD59-A6C34878D82A}">
-                    <a16:rowId xmlns:a16="http://schemas.microsoft.com/office/drawing/2014/main" val="1538486461"/>
-                  </a:ext>
-                </a:extLst>
-              </a:tr>
-              <a:tr h="465412">
-                <a:tc>
-                  <a:txBody>
-                    <a:bodyPr/>
-                    <a:lstStyle/>
-                    <a:p>
-                      <a:pPr marL="0" marR="0" lvl="0" indent="0" algn="l" defTabSz="914400" rtl="0" eaLnBrk="1" fontAlgn="auto" latinLnBrk="0" hangingPunct="1">
-                        <a:lnSpc>
-                          <a:spcPct val="100000"/>
-                        </a:lnSpc>
-                        <a:spcBef>
-                          <a:spcPct val="20000"/>
-                        </a:spcBef>
-                        <a:spcAft>
-                          <a:spcPts val="0"/>
-                        </a:spcAft>
-                        <a:buClr>
-                          <a:srgbClr val="33C0CD"/>
-                        </a:buClr>
-                        <a:buSzTx/>
-                        <a:buFont typeface="Arial"/>
-                        <a:buNone/>
-                        <a:tabLst/>
-                        <a:defRPr/>
-                      </a:pPr>
-                      <a:r>
-                        <a:rPr kumimoji="0" lang="en-US" sz="1800" b="0" i="0" u="none" strike="noStrike" kern="1200" cap="none" spc="0" normalizeH="0" baseline="0" noProof="0" dirty="0">
-                          <a:ln>
-                            <a:noFill/>
-                          </a:ln>
-                          <a:solidFill>
-                            <a:schemeClr val="tx1"/>
-                          </a:solidFill>
-                          <a:effectLst/>
-                          <a:uLnTx/>
-                          <a:uFillTx/>
-                          <a:latin typeface="Segoe UI" panose="020B0502040204020203" pitchFamily="34" charset="0"/>
-                          <a:cs typeface="Segoe UI" panose="020B0502040204020203" pitchFamily="34" charset="0"/>
-                        </a:rPr>
-                        <a:t>Table data here</a:t>
-                      </a:r>
-                    </a:p>
-                  </a:txBody>
-                  <a:tcPr anchor="ctr">
-                    <a:lnL>
-                      <a:noFill/>
-                    </a:lnL>
-                    <a:lnR w="12700" cap="flat" cmpd="sng" algn="ctr">
-                      <a:noFill/>
-                      <a:prstDash val="solid"/>
-                      <a:round/>
-                      <a:headEnd type="none" w="med" len="med"/>
-                      <a:tailEnd type="none" w="med" len="med"/>
-                    </a:lnR>
-                    <a:lnT w="12700" cap="flat" cmpd="sng" algn="ctr">
-                      <a:solidFill>
-                        <a:schemeClr val="bg1"/>
-                      </a:solidFill>
-                      <a:prstDash val="sysDot"/>
-                      <a:round/>
-                      <a:headEnd type="none" w="med" len="med"/>
-                      <a:tailEnd type="none" w="med" len="med"/>
-                    </a:lnT>
-                    <a:lnB>
-                      <a:noFill/>
-                    </a:lnB>
-                    <a:lnTlToBr w="12700" cmpd="sng">
-                      <a:noFill/>
-                      <a:prstDash val="solid"/>
-                    </a:lnTlToBr>
-                    <a:lnBlToTr w="12700" cmpd="sng">
-                      <a:noFill/>
-                      <a:prstDash val="solid"/>
-                    </a:lnBlToTr>
-                  </a:tcPr>
-                </a:tc>
-                <a:tc>
-                  <a:txBody>
-                    <a:bodyPr/>
-                    <a:lstStyle/>
-                    <a:p>
-                      <a:pPr marL="0" marR="0" lvl="0" indent="0" algn="l" defTabSz="914400" rtl="0" eaLnBrk="1" fontAlgn="auto" latinLnBrk="0" hangingPunct="1">
-                        <a:lnSpc>
-                          <a:spcPct val="100000"/>
-                        </a:lnSpc>
-                        <a:spcBef>
-                          <a:spcPct val="20000"/>
-                        </a:spcBef>
-                        <a:spcAft>
-                          <a:spcPts val="0"/>
-                        </a:spcAft>
-                        <a:buClr>
-                          <a:srgbClr val="33C0CD"/>
-                        </a:buClr>
-                        <a:buSzTx/>
-                        <a:buFont typeface="Arial"/>
-                        <a:buNone/>
-                        <a:tabLst/>
-                        <a:defRPr/>
-                      </a:pPr>
-                      <a:r>
-                        <a:rPr kumimoji="0" lang="en-US" sz="1800" b="0" i="0" u="none" strike="noStrike" kern="1200" cap="none" spc="0" normalizeH="0" baseline="0" noProof="0" dirty="0">
-                          <a:ln>
-                            <a:noFill/>
-                          </a:ln>
-                          <a:solidFill>
-                            <a:schemeClr val="tx1"/>
-                          </a:solidFill>
-                          <a:effectLst/>
-                          <a:uLnTx/>
-                          <a:uFillTx/>
-                          <a:latin typeface="Segoe UI" panose="020B0502040204020203" pitchFamily="34" charset="0"/>
-                          <a:cs typeface="Segoe UI" panose="020B0502040204020203" pitchFamily="34" charset="0"/>
-                        </a:rPr>
-                        <a:t>Table data here</a:t>
-                      </a:r>
-                    </a:p>
-                  </a:txBody>
-                  <a:tcPr anchor="ctr">
-                    <a:lnL w="12700" cap="flat" cmpd="sng" algn="ctr">
-                      <a:noFill/>
-                      <a:prstDash val="solid"/>
-                      <a:round/>
-                      <a:headEnd type="none" w="med" len="med"/>
-                      <a:tailEnd type="none" w="med" len="med"/>
-                    </a:lnL>
-                    <a:lnR w="12700" cap="flat" cmpd="sng" algn="ctr">
-                      <a:noFill/>
-                      <a:prstDash val="solid"/>
-                      <a:round/>
-                      <a:headEnd type="none" w="med" len="med"/>
-                      <a:tailEnd type="none" w="med" len="med"/>
-                    </a:lnR>
-                    <a:lnT w="12700" cap="flat" cmpd="sng" algn="ctr">
-                      <a:solidFill>
-                        <a:schemeClr val="bg1"/>
-                      </a:solidFill>
-                      <a:prstDash val="sysDot"/>
-                      <a:round/>
-                      <a:headEnd type="none" w="med" len="med"/>
-                      <a:tailEnd type="none" w="med" len="med"/>
-                    </a:lnT>
-                    <a:lnB>
-                      <a:noFill/>
-                    </a:lnB>
-                    <a:lnTlToBr w="12700" cmpd="sng">
-                      <a:noFill/>
-                      <a:prstDash val="solid"/>
-                    </a:lnTlToBr>
-                    <a:lnBlToTr w="12700" cmpd="sng">
-                      <a:noFill/>
-                      <a:prstDash val="solid"/>
-                    </a:lnBlToTr>
-                  </a:tcPr>
-                </a:tc>
-                <a:tc>
-                  <a:txBody>
-                    <a:bodyPr/>
-                    <a:lstStyle/>
-                    <a:p>
-                      <a:pPr marL="0" marR="0" lvl="0" indent="0" algn="l" defTabSz="914400" rtl="0" eaLnBrk="1" fontAlgn="auto" latinLnBrk="0" hangingPunct="1">
-                        <a:lnSpc>
-                          <a:spcPct val="100000"/>
-                        </a:lnSpc>
-                        <a:spcBef>
-                          <a:spcPct val="20000"/>
-                        </a:spcBef>
-                        <a:spcAft>
-                          <a:spcPts val="0"/>
-                        </a:spcAft>
-                        <a:buClr>
-                          <a:srgbClr val="33C0CD"/>
-                        </a:buClr>
-                        <a:buSzTx/>
-                        <a:buFont typeface="Arial"/>
-                        <a:buNone/>
-                        <a:tabLst/>
-                        <a:defRPr/>
-                      </a:pPr>
-                      <a:r>
-                        <a:rPr kumimoji="0" lang="en-US" sz="1800" b="0" i="0" u="none" strike="noStrike" kern="1200" cap="none" spc="0" normalizeH="0" baseline="0" noProof="0" dirty="0">
-                          <a:ln>
-                            <a:noFill/>
-                          </a:ln>
-                          <a:solidFill>
-                            <a:schemeClr val="tx1"/>
-                          </a:solidFill>
-                          <a:effectLst/>
-                          <a:uLnTx/>
-                          <a:uFillTx/>
-                          <a:latin typeface="Segoe UI" panose="020B0502040204020203" pitchFamily="34" charset="0"/>
-                          <a:cs typeface="Segoe UI" panose="020B0502040204020203" pitchFamily="34" charset="0"/>
-                        </a:rPr>
-                        <a:t>Table data here</a:t>
-                      </a:r>
-                    </a:p>
-                  </a:txBody>
-                  <a:tcPr anchor="ctr">
-                    <a:lnL w="12700" cap="flat" cmpd="sng" algn="ctr">
-                      <a:noFill/>
-                      <a:prstDash val="solid"/>
-                      <a:round/>
-                      <a:headEnd type="none" w="med" len="med"/>
-                      <a:tailEnd type="none" w="med" len="med"/>
-                    </a:lnL>
-                    <a:lnR>
-                      <a:noFill/>
-                    </a:lnR>
-                    <a:lnT w="12700" cap="flat" cmpd="sng" algn="ctr">
-                      <a:solidFill>
-                        <a:schemeClr val="bg1"/>
-                      </a:solidFill>
-                      <a:prstDash val="sysDot"/>
-                      <a:round/>
-                      <a:headEnd type="none" w="med" len="med"/>
-                      <a:tailEnd type="none" w="med" len="med"/>
-                    </a:lnT>
-                    <a:lnB>
-                      <a:noFill/>
-                    </a:lnB>
-                    <a:lnTlToBr w="12700" cmpd="sng">
-                      <a:noFill/>
-                      <a:prstDash val="solid"/>
-                    </a:lnTlToBr>
-                    <a:lnBlToTr w="12700" cmpd="sng">
-                      <a:noFill/>
-                      <a:prstDash val="solid"/>
-                    </a:lnBlToTr>
-                  </a:tcPr>
-                </a:tc>
-                <a:extLst>
-                  <a:ext uri="{0D108BD9-81ED-4DB2-BD59-A6C34878D82A}">
-                    <a16:rowId xmlns:a16="http://schemas.microsoft.com/office/drawing/2014/main" val="1463975009"/>
-                  </a:ext>
-                </a:extLst>
-              </a:tr>
-            </a:tbl>
-          </a:graphicData>
-        </a:graphic>
-      </p:graphicFrame>
-      <p:sp>
-        <p:nvSpPr>
-          <p:cNvPr id="2" name="Title 1">
-            <a:extLst>
-              <a:ext uri="{FF2B5EF4-FFF2-40B4-BE49-F238E27FC236}">
-                <a16:creationId xmlns:a16="http://schemas.microsoft.com/office/drawing/2014/main" id="{2C1C1BBC-C665-4A9A-82DB-BB73D4AD2202}"/>
-              </a:ext>
-              <a:ext uri="{C183D7F6-B498-43B3-948B-1728B52AA6E4}">
-                <adec:decorative xmlns:adec="http://schemas.microsoft.com/office/drawing/2017/decorative" val="1"/>
-              </a:ext>
-            </a:extLst>
-          </p:cNvPr>
-          <p:cNvSpPr>
-            <a:spLocks noGrp="1"/>
-          </p:cNvSpPr>
-          <p:nvPr>
-            <p:ph type="title" idx="4294967295"/>
-          </p:nvPr>
-        </p:nvSpPr>
-        <p:spPr>
-          <a:xfrm>
-            <a:off x="628650" y="-496888"/>
-            <a:ext cx="7886700" cy="993775"/>
-          </a:xfrm>
-          <a:prstGeom prst="rect">
-            <a:avLst/>
-          </a:prstGeom>
-        </p:spPr>
-        <p:txBody>
-          <a:bodyPr/>
-          <a:lstStyle/>
-          <a:p>
-            <a:r>
-              <a:rPr lang="en-CA" sz="900" dirty="0"/>
-              <a:t>Table</a:t>
-            </a:r>
-          </a:p>
-        </p:txBody>
-      </p:sp>
-    </p:spTree>
-    <p:extLst>
-      <p:ext uri="{BB962C8B-B14F-4D97-AF65-F5344CB8AC3E}">
-        <p14:creationId xmlns:p14="http://schemas.microsoft.com/office/powerpoint/2010/main" val="1582809442"/>
-      </p:ext>
-    </p:extLst>
-  </p:cSld>
-  <p:clrMapOvr>
-    <a:masterClrMapping/>
-  </p:clrMapOvr>
-</p:sld>
-</file>
-
-<file path=ppt/slides/slide59.xml><?xml version="1.0" encoding="utf-8"?>
-<p:sld xmlns:a="http://schemas.openxmlformats.org/drawingml/2006/main" xmlns:r="http://schemas.openxmlformats.org/officeDocument/2006/relationships" xmlns:p="http://schemas.openxmlformats.org/presentationml/2006/main">
-  <p:cSld>
-    <p:spTree>
-      <p:nvGrpSpPr>
-        <p:cNvPr id="1" name=""/>
-        <p:cNvGrpSpPr/>
-        <p:nvPr/>
-      </p:nvGrpSpPr>
-      <p:grpSpPr>
-        <a:xfrm>
-          <a:off x="0" y="0"/>
-          <a:ext cx="0" cy="0"/>
-          <a:chOff x="0" y="0"/>
-          <a:chExt cx="0" cy="0"/>
-        </a:xfrm>
-      </p:grpSpPr>
-      <p:sp>
-        <p:nvSpPr>
-          <p:cNvPr id="2" name="Title 1">
-            <a:extLst>
-              <a:ext uri="{FF2B5EF4-FFF2-40B4-BE49-F238E27FC236}">
-                <a16:creationId xmlns:a16="http://schemas.microsoft.com/office/drawing/2014/main" id="{CB81EA52-0EEE-46FA-87DC-3AA7196CDF0E}"/>
-              </a:ext>
-            </a:extLst>
-          </p:cNvPr>
-          <p:cNvSpPr>
-            <a:spLocks noGrp="1"/>
-          </p:cNvSpPr>
-          <p:nvPr>
-            <p:ph type="title" idx="4294967295"/>
-          </p:nvPr>
-        </p:nvSpPr>
-        <p:spPr>
-          <a:xfrm>
-            <a:off x="628650" y="-496888"/>
-            <a:ext cx="796738" cy="402759"/>
-          </a:xfrm>
-          <a:prstGeom prst="rect">
-            <a:avLst/>
-          </a:prstGeom>
-        </p:spPr>
-        <p:txBody>
-          <a:bodyPr/>
-          <a:lstStyle/>
-          <a:p>
-            <a:r>
-              <a:rPr lang="en-CA" sz="900" dirty="0"/>
-              <a:t>Content</a:t>
-            </a:r>
-          </a:p>
-        </p:txBody>
-      </p:sp>
-    </p:spTree>
-    <p:extLst>
-      <p:ext uri="{BB962C8B-B14F-4D97-AF65-F5344CB8AC3E}">
-        <p14:creationId xmlns:p14="http://schemas.microsoft.com/office/powerpoint/2010/main" val="783076368"/>
       </p:ext>
     </p:extLst>
   </p:cSld>
@@ -27843,446 +24455,6 @@
     <p:extLst>
       <p:ext uri="{BB962C8B-B14F-4D97-AF65-F5344CB8AC3E}">
         <p14:creationId xmlns:p14="http://schemas.microsoft.com/office/powerpoint/2010/main" val="1079351"/>
-      </p:ext>
-    </p:extLst>
-  </p:cSld>
-  <p:clrMapOvr>
-    <a:masterClrMapping/>
-  </p:clrMapOvr>
-</p:sld>
-</file>
-
-<file path=ppt/slides/slide60.xml><?xml version="1.0" encoding="utf-8"?>
-<p:sld xmlns:a="http://schemas.openxmlformats.org/drawingml/2006/main" xmlns:r="http://schemas.openxmlformats.org/officeDocument/2006/relationships" xmlns:p="http://schemas.openxmlformats.org/presentationml/2006/main">
-  <p:cSld>
-    <p:spTree>
-      <p:nvGrpSpPr>
-        <p:cNvPr id="1" name=""/>
-        <p:cNvGrpSpPr/>
-        <p:nvPr/>
-      </p:nvGrpSpPr>
-      <p:grpSpPr>
-        <a:xfrm>
-          <a:off x="0" y="0"/>
-          <a:ext cx="0" cy="0"/>
-          <a:chOff x="0" y="0"/>
-          <a:chExt cx="0" cy="0"/>
-        </a:xfrm>
-      </p:grpSpPr>
-      <p:sp>
-        <p:nvSpPr>
-          <p:cNvPr id="2" name="Title 1">
-            <a:extLst>
-              <a:ext uri="{FF2B5EF4-FFF2-40B4-BE49-F238E27FC236}">
-                <a16:creationId xmlns:a16="http://schemas.microsoft.com/office/drawing/2014/main" id="{DD39714F-B06E-47F8-A35E-C2276FD675DB}"/>
-              </a:ext>
-            </a:extLst>
-          </p:cNvPr>
-          <p:cNvSpPr>
-            <a:spLocks noGrp="1"/>
-          </p:cNvSpPr>
-          <p:nvPr>
-            <p:ph type="title"/>
-          </p:nvPr>
-        </p:nvSpPr>
-        <p:spPr/>
-        <p:txBody>
-          <a:bodyPr/>
-          <a:lstStyle/>
-          <a:p>
-            <a:endParaRPr lang="en-CA" sz="4000" dirty="0"/>
-          </a:p>
-        </p:txBody>
-      </p:sp>
-    </p:spTree>
-    <p:extLst>
-      <p:ext uri="{BB962C8B-B14F-4D97-AF65-F5344CB8AC3E}">
-        <p14:creationId xmlns:p14="http://schemas.microsoft.com/office/powerpoint/2010/main" val="761659712"/>
-      </p:ext>
-    </p:extLst>
-  </p:cSld>
-  <p:clrMapOvr>
-    <a:masterClrMapping/>
-  </p:clrMapOvr>
-</p:sld>
-</file>
-
-<file path=ppt/slides/slide61.xml><?xml version="1.0" encoding="utf-8"?>
-<p:sld xmlns:a="http://schemas.openxmlformats.org/drawingml/2006/main" xmlns:r="http://schemas.openxmlformats.org/officeDocument/2006/relationships" xmlns:p="http://schemas.openxmlformats.org/presentationml/2006/main">
-  <p:cSld>
-    <p:spTree>
-      <p:nvGrpSpPr>
-        <p:cNvPr id="1" name=""/>
-        <p:cNvGrpSpPr/>
-        <p:nvPr/>
-      </p:nvGrpSpPr>
-      <p:grpSpPr>
-        <a:xfrm>
-          <a:off x="0" y="0"/>
-          <a:ext cx="0" cy="0"/>
-          <a:chOff x="0" y="0"/>
-          <a:chExt cx="0" cy="0"/>
-        </a:xfrm>
-      </p:grpSpPr>
-      <p:sp>
-        <p:nvSpPr>
-          <p:cNvPr id="2" name="Title 1" descr="Demo Title No Photo">
-            <a:extLst>
-              <a:ext uri="{FF2B5EF4-FFF2-40B4-BE49-F238E27FC236}">
-                <a16:creationId xmlns:a16="http://schemas.microsoft.com/office/drawing/2014/main" id="{1CB52C5B-C58D-4D78-9E9F-2440831C5870}"/>
-              </a:ext>
-            </a:extLst>
-          </p:cNvPr>
-          <p:cNvSpPr>
-            <a:spLocks noGrp="1"/>
-          </p:cNvSpPr>
-          <p:nvPr>
-            <p:ph type="title"/>
-          </p:nvPr>
-        </p:nvSpPr>
-        <p:spPr/>
-        <p:txBody>
-          <a:bodyPr/>
-          <a:lstStyle/>
-          <a:p>
-            <a:endParaRPr lang="en-CA" sz="4000" dirty="0"/>
-          </a:p>
-        </p:txBody>
-      </p:sp>
-    </p:spTree>
-    <p:extLst>
-      <p:ext uri="{BB962C8B-B14F-4D97-AF65-F5344CB8AC3E}">
-        <p14:creationId xmlns:p14="http://schemas.microsoft.com/office/powerpoint/2010/main" val="393055445"/>
-      </p:ext>
-    </p:extLst>
-  </p:cSld>
-  <p:clrMapOvr>
-    <a:masterClrMapping/>
-  </p:clrMapOvr>
-</p:sld>
-</file>
-
-<file path=ppt/slides/slide62.xml><?xml version="1.0" encoding="utf-8"?>
-<p:sld xmlns:a="http://schemas.openxmlformats.org/drawingml/2006/main" xmlns:r="http://schemas.openxmlformats.org/officeDocument/2006/relationships" xmlns:p="http://schemas.openxmlformats.org/presentationml/2006/main">
-  <p:cSld>
-    <p:spTree>
-      <p:nvGrpSpPr>
-        <p:cNvPr id="1" name=""/>
-        <p:cNvGrpSpPr/>
-        <p:nvPr/>
-      </p:nvGrpSpPr>
-      <p:grpSpPr>
-        <a:xfrm>
-          <a:off x="0" y="0"/>
-          <a:ext cx="0" cy="0"/>
-          <a:chOff x="0" y="0"/>
-          <a:chExt cx="0" cy="0"/>
-        </a:xfrm>
-      </p:grpSpPr>
-      <p:sp>
-        <p:nvSpPr>
-          <p:cNvPr id="2" name="Title 1" descr="Video Title">
-            <a:extLst>
-              <a:ext uri="{FF2B5EF4-FFF2-40B4-BE49-F238E27FC236}">
-                <a16:creationId xmlns:a16="http://schemas.microsoft.com/office/drawing/2014/main" id="{74C4932F-2184-441F-AB7A-F5DA2A8F0CE1}"/>
-              </a:ext>
-            </a:extLst>
-          </p:cNvPr>
-          <p:cNvSpPr>
-            <a:spLocks noGrp="1"/>
-          </p:cNvSpPr>
-          <p:nvPr>
-            <p:ph type="title"/>
-          </p:nvPr>
-        </p:nvSpPr>
-        <p:spPr/>
-        <p:txBody>
-          <a:bodyPr/>
-          <a:lstStyle/>
-          <a:p>
-            <a:endParaRPr lang="en-CA" sz="4000" dirty="0"/>
-          </a:p>
-        </p:txBody>
-      </p:sp>
-    </p:spTree>
-    <p:extLst>
-      <p:ext uri="{BB962C8B-B14F-4D97-AF65-F5344CB8AC3E}">
-        <p14:creationId xmlns:p14="http://schemas.microsoft.com/office/powerpoint/2010/main" val="41620290"/>
-      </p:ext>
-    </p:extLst>
-  </p:cSld>
-  <p:clrMapOvr>
-    <a:masterClrMapping/>
-  </p:clrMapOvr>
-</p:sld>
-</file>
-
-<file path=ppt/slides/slide63.xml><?xml version="1.0" encoding="utf-8"?>
-<p:sld xmlns:a="http://schemas.openxmlformats.org/drawingml/2006/main" xmlns:r="http://schemas.openxmlformats.org/officeDocument/2006/relationships" xmlns:p="http://schemas.openxmlformats.org/presentationml/2006/main">
-  <p:cSld>
-    <p:spTree>
-      <p:nvGrpSpPr>
-        <p:cNvPr id="1" name=""/>
-        <p:cNvGrpSpPr/>
-        <p:nvPr/>
-      </p:nvGrpSpPr>
-      <p:grpSpPr>
-        <a:xfrm>
-          <a:off x="0" y="0"/>
-          <a:ext cx="0" cy="0"/>
-          <a:chOff x="0" y="0"/>
-          <a:chExt cx="0" cy="0"/>
-        </a:xfrm>
-      </p:grpSpPr>
-      <p:sp>
-        <p:nvSpPr>
-          <p:cNvPr id="2" name="Title 1" descr="Video Title No Photo">
-            <a:extLst>
-              <a:ext uri="{FF2B5EF4-FFF2-40B4-BE49-F238E27FC236}">
-                <a16:creationId xmlns:a16="http://schemas.microsoft.com/office/drawing/2014/main" id="{2E2FA21B-CEA6-482F-B69A-027B4E5A2B6A}"/>
-              </a:ext>
-            </a:extLst>
-          </p:cNvPr>
-          <p:cNvSpPr>
-            <a:spLocks noGrp="1"/>
-          </p:cNvSpPr>
-          <p:nvPr>
-            <p:ph type="title"/>
-          </p:nvPr>
-        </p:nvSpPr>
-        <p:spPr/>
-        <p:txBody>
-          <a:bodyPr/>
-          <a:lstStyle/>
-          <a:p>
-            <a:endParaRPr lang="en-CA" sz="4000" dirty="0"/>
-          </a:p>
-        </p:txBody>
-      </p:sp>
-    </p:spTree>
-    <p:extLst>
-      <p:ext uri="{BB962C8B-B14F-4D97-AF65-F5344CB8AC3E}">
-        <p14:creationId xmlns:p14="http://schemas.microsoft.com/office/powerpoint/2010/main" val="199334012"/>
-      </p:ext>
-    </p:extLst>
-  </p:cSld>
-  <p:clrMapOvr>
-    <a:masterClrMapping/>
-  </p:clrMapOvr>
-</p:sld>
-</file>
-
-<file path=ppt/slides/slide64.xml><?xml version="1.0" encoding="utf-8"?>
-<p:sld xmlns:a="http://schemas.openxmlformats.org/drawingml/2006/main" xmlns:r="http://schemas.openxmlformats.org/officeDocument/2006/relationships" xmlns:p="http://schemas.openxmlformats.org/presentationml/2006/main">
-  <p:cSld>
-    <p:spTree>
-      <p:nvGrpSpPr>
-        <p:cNvPr id="1" name=""/>
-        <p:cNvGrpSpPr/>
-        <p:nvPr/>
-      </p:nvGrpSpPr>
-      <p:grpSpPr>
-        <a:xfrm>
-          <a:off x="0" y="0"/>
-          <a:ext cx="0" cy="0"/>
-          <a:chOff x="0" y="0"/>
-          <a:chExt cx="0" cy="0"/>
-        </a:xfrm>
-      </p:grpSpPr>
-      <p:sp>
-        <p:nvSpPr>
-          <p:cNvPr id="2" name="Title 1" descr="Customer Title">
-            <a:extLst>
-              <a:ext uri="{FF2B5EF4-FFF2-40B4-BE49-F238E27FC236}">
-                <a16:creationId xmlns:a16="http://schemas.microsoft.com/office/drawing/2014/main" id="{515A6877-5D3A-4508-94FD-4AB154270C6C}"/>
-              </a:ext>
-            </a:extLst>
-          </p:cNvPr>
-          <p:cNvSpPr>
-            <a:spLocks noGrp="1"/>
-          </p:cNvSpPr>
-          <p:nvPr>
-            <p:ph type="title"/>
-          </p:nvPr>
-        </p:nvSpPr>
-        <p:spPr/>
-        <p:txBody>
-          <a:bodyPr/>
-          <a:lstStyle/>
-          <a:p>
-            <a:endParaRPr lang="en-CA" sz="4000" dirty="0"/>
-          </a:p>
-        </p:txBody>
-      </p:sp>
-    </p:spTree>
-    <p:extLst>
-      <p:ext uri="{BB962C8B-B14F-4D97-AF65-F5344CB8AC3E}">
-        <p14:creationId xmlns:p14="http://schemas.microsoft.com/office/powerpoint/2010/main" val="4181018087"/>
-      </p:ext>
-    </p:extLst>
-  </p:cSld>
-  <p:clrMapOvr>
-    <a:masterClrMapping/>
-  </p:clrMapOvr>
-</p:sld>
-</file>
-
-<file path=ppt/slides/slide65.xml><?xml version="1.0" encoding="utf-8"?>
-<p:sld xmlns:a="http://schemas.openxmlformats.org/drawingml/2006/main" xmlns:r="http://schemas.openxmlformats.org/officeDocument/2006/relationships" xmlns:p="http://schemas.openxmlformats.org/presentationml/2006/main">
-  <p:cSld>
-    <p:spTree>
-      <p:nvGrpSpPr>
-        <p:cNvPr id="1" name=""/>
-        <p:cNvGrpSpPr/>
-        <p:nvPr/>
-      </p:nvGrpSpPr>
-      <p:grpSpPr>
-        <a:xfrm>
-          <a:off x="0" y="0"/>
-          <a:ext cx="0" cy="0"/>
-          <a:chOff x="0" y="0"/>
-          <a:chExt cx="0" cy="0"/>
-        </a:xfrm>
-      </p:grpSpPr>
-      <p:sp>
-        <p:nvSpPr>
-          <p:cNvPr id="2" name="Title 1" descr="Customer Title No Photo">
-            <a:extLst>
-              <a:ext uri="{FF2B5EF4-FFF2-40B4-BE49-F238E27FC236}">
-                <a16:creationId xmlns:a16="http://schemas.microsoft.com/office/drawing/2014/main" id="{55D06C87-1034-4B2D-A67A-5543915EF509}"/>
-              </a:ext>
-            </a:extLst>
-          </p:cNvPr>
-          <p:cNvSpPr>
-            <a:spLocks noGrp="1"/>
-          </p:cNvSpPr>
-          <p:nvPr>
-            <p:ph type="title"/>
-          </p:nvPr>
-        </p:nvSpPr>
-        <p:spPr/>
-        <p:txBody>
-          <a:bodyPr/>
-          <a:lstStyle/>
-          <a:p>
-            <a:endParaRPr lang="en-CA" sz="4000" dirty="0"/>
-          </a:p>
-        </p:txBody>
-      </p:sp>
-    </p:spTree>
-    <p:extLst>
-      <p:ext uri="{BB962C8B-B14F-4D97-AF65-F5344CB8AC3E}">
-        <p14:creationId xmlns:p14="http://schemas.microsoft.com/office/powerpoint/2010/main" val="1787632021"/>
-      </p:ext>
-    </p:extLst>
-  </p:cSld>
-  <p:clrMapOvr>
-    <a:masterClrMapping/>
-  </p:clrMapOvr>
-</p:sld>
-</file>
-
-<file path=ppt/slides/slide66.xml><?xml version="1.0" encoding="utf-8"?>
-<p:sld xmlns:a="http://schemas.openxmlformats.org/drawingml/2006/main" xmlns:r="http://schemas.openxmlformats.org/officeDocument/2006/relationships" xmlns:p="http://schemas.openxmlformats.org/presentationml/2006/main">
-  <p:cSld>
-    <p:spTree>
-      <p:nvGrpSpPr>
-        <p:cNvPr id="1" name=""/>
-        <p:cNvGrpSpPr/>
-        <p:nvPr/>
-      </p:nvGrpSpPr>
-      <p:grpSpPr>
-        <a:xfrm>
-          <a:off x="0" y="0"/>
-          <a:ext cx="0" cy="0"/>
-          <a:chOff x="0" y="0"/>
-          <a:chExt cx="0" cy="0"/>
-        </a:xfrm>
-      </p:grpSpPr>
-      <p:sp>
-        <p:nvSpPr>
-          <p:cNvPr id="2" name="Title 1">
-            <a:extLst>
-              <a:ext uri="{FF2B5EF4-FFF2-40B4-BE49-F238E27FC236}">
-                <a16:creationId xmlns:a16="http://schemas.microsoft.com/office/drawing/2014/main" id="{4DCB9659-72B0-49AC-876B-38099C19261E}"/>
-              </a:ext>
-            </a:extLst>
-          </p:cNvPr>
-          <p:cNvSpPr>
-            <a:spLocks noGrp="1"/>
-          </p:cNvSpPr>
-          <p:nvPr>
-            <p:ph type="title"/>
-          </p:nvPr>
-        </p:nvSpPr>
-        <p:spPr/>
-        <p:txBody>
-          <a:bodyPr/>
-          <a:lstStyle/>
-          <a:p>
-            <a:endParaRPr lang="en-CA" sz="4000" dirty="0"/>
-          </a:p>
-        </p:txBody>
-      </p:sp>
-    </p:spTree>
-    <p:extLst>
-      <p:ext uri="{BB962C8B-B14F-4D97-AF65-F5344CB8AC3E}">
-        <p14:creationId xmlns:p14="http://schemas.microsoft.com/office/powerpoint/2010/main" val="898057510"/>
-      </p:ext>
-    </p:extLst>
-  </p:cSld>
-  <p:clrMapOvr>
-    <a:masterClrMapping/>
-  </p:clrMapOvr>
-</p:sld>
-</file>
-
-<file path=ppt/slides/slide67.xml><?xml version="1.0" encoding="utf-8"?>
-<p:sld xmlns:a="http://schemas.openxmlformats.org/drawingml/2006/main" xmlns:r="http://schemas.openxmlformats.org/officeDocument/2006/relationships" xmlns:p="http://schemas.openxmlformats.org/presentationml/2006/main">
-  <p:cSld>
-    <p:spTree>
-      <p:nvGrpSpPr>
-        <p:cNvPr id="1" name=""/>
-        <p:cNvGrpSpPr/>
-        <p:nvPr/>
-      </p:nvGrpSpPr>
-      <p:grpSpPr>
-        <a:xfrm>
-          <a:off x="0" y="0"/>
-          <a:ext cx="0" cy="0"/>
-          <a:chOff x="0" y="0"/>
-          <a:chExt cx="0" cy="0"/>
-        </a:xfrm>
-      </p:grpSpPr>
-      <p:sp>
-        <p:nvSpPr>
-          <p:cNvPr id="2" name="Title 1" descr="Case Study No Photo">
-            <a:extLst>
-              <a:ext uri="{FF2B5EF4-FFF2-40B4-BE49-F238E27FC236}">
-                <a16:creationId xmlns:a16="http://schemas.microsoft.com/office/drawing/2014/main" id="{EBF72FA5-E29A-45FD-B561-B948E9B3E568}"/>
-              </a:ext>
-            </a:extLst>
-          </p:cNvPr>
-          <p:cNvSpPr>
-            <a:spLocks noGrp="1"/>
-          </p:cNvSpPr>
-          <p:nvPr>
-            <p:ph type="title"/>
-          </p:nvPr>
-        </p:nvSpPr>
-        <p:spPr/>
-        <p:txBody>
-          <a:bodyPr/>
-          <a:lstStyle/>
-          <a:p>
-            <a:endParaRPr lang="en-CA" sz="4000" dirty="0"/>
-          </a:p>
-        </p:txBody>
-      </p:sp>
-    </p:spTree>
-    <p:extLst>
-      <p:ext uri="{BB962C8B-B14F-4D97-AF65-F5344CB8AC3E}">
-        <p14:creationId xmlns:p14="http://schemas.microsoft.com/office/powerpoint/2010/main" val="961852935"/>
       </p:ext>
     </p:extLst>
   </p:cSld>
@@ -29964,16 +26136,16 @@
 <file path=customXml/itemProps3.xml><?xml version="1.0" encoding="utf-8"?>
 <ds:datastoreItem xmlns:ds="http://schemas.openxmlformats.org/officeDocument/2006/customXml" ds:itemID="{05B72F81-0575-463A-82A3-B988D742353D}">
   <ds:schemaRefs>
+    <ds:schemaRef ds:uri="http://purl.org/dc/terms/"/>
+    <ds:schemaRef ds:uri="http://schemas.microsoft.com/office/2006/metadata/properties"/>
     <ds:schemaRef ds:uri="http://schemas.microsoft.com/office/2006/documentManagement/types"/>
     <ds:schemaRef ds:uri="d10e2f95-430a-4dd6-ae0c-dc822f427a88"/>
-    <ds:schemaRef ds:uri="http://purl.org/dc/dcmitype/"/>
     <ds:schemaRef ds:uri="http://purl.org/dc/elements/1.1/"/>
     <ds:schemaRef ds:uri="http://schemas.microsoft.com/office/infopath/2007/PartnerControls"/>
-    <ds:schemaRef ds:uri="http://schemas.microsoft.com/office/2006/metadata/properties"/>
-    <ds:schemaRef ds:uri="http://purl.org/dc/terms/"/>
     <ds:schemaRef ds:uri="http://schemas.openxmlformats.org/package/2006/metadata/core-properties"/>
     <ds:schemaRef ds:uri="d20358f7-2922-4755-8013-d9d9a0b41fb8"/>
     <ds:schemaRef ds:uri="http://www.w3.org/XML/1998/namespace"/>
+    <ds:schemaRef ds:uri="http://purl.org/dc/dcmitype/"/>
   </ds:schemaRefs>
 </ds:datastoreItem>
 </file>
</xml_diff>

<commit_message>
Add in some notes to certain slides.
</commit_message>
<xml_diff>
--- a/Hansen - Get Your Optimizer to Give up All Its Secrets.pptx
+++ b/Hansen - Get Your Optimizer to Give up All Its Secrets.pptx
@@ -746,6 +746,909 @@
     </a:lvl9pPr>
   </p:notesStyle>
 </p:notesMaster>
+</file>
+
+<file path=ppt/notesSlides/notesSlide1.xml><?xml version="1.0" encoding="utf-8"?>
+<p:notes xmlns:a="http://schemas.openxmlformats.org/drawingml/2006/main" xmlns:r="http://schemas.openxmlformats.org/officeDocument/2006/relationships" xmlns:p="http://schemas.openxmlformats.org/presentationml/2006/main">
+  <p:cSld>
+    <p:spTree>
+      <p:nvGrpSpPr>
+        <p:cNvPr id="1" name=""/>
+        <p:cNvGrpSpPr/>
+        <p:nvPr/>
+      </p:nvGrpSpPr>
+      <p:grpSpPr>
+        <a:xfrm>
+          <a:off x="0" y="0"/>
+          <a:ext cx="0" cy="0"/>
+          <a:chOff x="0" y="0"/>
+          <a:chExt cx="0" cy="0"/>
+        </a:xfrm>
+      </p:grpSpPr>
+      <p:sp>
+        <p:nvSpPr>
+          <p:cNvPr id="2" name="Slide Image Placeholder 1"/>
+          <p:cNvSpPr>
+            <a:spLocks noGrp="1" noRot="1" noChangeAspect="1"/>
+          </p:cNvSpPr>
+          <p:nvPr>
+            <p:ph type="sldImg"/>
+          </p:nvPr>
+        </p:nvSpPr>
+        <p:spPr/>
+      </p:sp>
+      <p:sp>
+        <p:nvSpPr>
+          <p:cNvPr id="3" name="Notes Placeholder 2"/>
+          <p:cNvSpPr>
+            <a:spLocks noGrp="1"/>
+          </p:cNvSpPr>
+          <p:nvPr>
+            <p:ph type="body" idx="1"/>
+          </p:nvPr>
+        </p:nvSpPr>
+        <p:spPr/>
+        <p:txBody>
+          <a:bodyPr/>
+          <a:lstStyle/>
+          <a:p>
+            <a:pPr marL="0" marR="0" lvl="0" indent="0" algn="l" defTabSz="914400" rtl="0" eaLnBrk="1" fontAlgn="auto" latinLnBrk="0" hangingPunct="1">
+              <a:lnSpc>
+                <a:spcPct val="100000"/>
+              </a:lnSpc>
+              <a:spcBef>
+                <a:spcPts val="0"/>
+              </a:spcBef>
+              <a:spcAft>
+                <a:spcPts val="0"/>
+              </a:spcAft>
+              <a:buClrTx/>
+              <a:buSzTx/>
+              <a:buFontTx/>
+              <a:buNone/>
+              <a:tabLst/>
+              <a:defRPr/>
+            </a:pPr>
+            <a:r>
+              <a:rPr lang="en-US" dirty="0"/>
+              <a:t>Include here a</a:t>
+            </a:r>
+            <a:r>
+              <a:rPr lang="en-US" baseline="0" dirty="0"/>
+              <a:t> word of warning (and a word of encouragement) regarding undocumented functionality in SQL Server.</a:t>
+            </a:r>
+            <a:endParaRPr lang="en-US" dirty="0"/>
+          </a:p>
+        </p:txBody>
+      </p:sp>
+      <p:sp>
+        <p:nvSpPr>
+          <p:cNvPr id="4" name="Slide Number Placeholder 3"/>
+          <p:cNvSpPr>
+            <a:spLocks noGrp="1"/>
+          </p:cNvSpPr>
+          <p:nvPr>
+            <p:ph type="sldNum" sz="quarter" idx="5"/>
+          </p:nvPr>
+        </p:nvSpPr>
+        <p:spPr/>
+        <p:txBody>
+          <a:bodyPr/>
+          <a:lstStyle/>
+          <a:p>
+            <a:fld id="{DDD65AC4-17B0-4E19-8496-B264E70A18D3}" type="slidenum">
+              <a:rPr lang="en-US" smtClean="0"/>
+              <a:t>4</a:t>
+            </a:fld>
+            <a:endParaRPr lang="en-US" dirty="0"/>
+          </a:p>
+        </p:txBody>
+      </p:sp>
+    </p:spTree>
+    <p:extLst>
+      <p:ext uri="{BB962C8B-B14F-4D97-AF65-F5344CB8AC3E}">
+        <p14:creationId xmlns:p14="http://schemas.microsoft.com/office/powerpoint/2010/main" val="228639394"/>
+      </p:ext>
+    </p:extLst>
+  </p:cSld>
+  <p:clrMapOvr>
+    <a:masterClrMapping/>
+  </p:clrMapOvr>
+</p:notes>
+</file>
+
+<file path=ppt/notesSlides/notesSlide2.xml><?xml version="1.0" encoding="utf-8"?>
+<p:notes xmlns:a="http://schemas.openxmlformats.org/drawingml/2006/main" xmlns:r="http://schemas.openxmlformats.org/officeDocument/2006/relationships" xmlns:p="http://schemas.openxmlformats.org/presentationml/2006/main">
+  <p:cSld>
+    <p:spTree>
+      <p:nvGrpSpPr>
+        <p:cNvPr id="1" name=""/>
+        <p:cNvGrpSpPr/>
+        <p:nvPr/>
+      </p:nvGrpSpPr>
+      <p:grpSpPr>
+        <a:xfrm>
+          <a:off x="0" y="0"/>
+          <a:ext cx="0" cy="0"/>
+          <a:chOff x="0" y="0"/>
+          <a:chExt cx="0" cy="0"/>
+        </a:xfrm>
+      </p:grpSpPr>
+      <p:sp>
+        <p:nvSpPr>
+          <p:cNvPr id="2" name="Slide Image Placeholder 1"/>
+          <p:cNvSpPr>
+            <a:spLocks noGrp="1" noRot="1" noChangeAspect="1"/>
+          </p:cNvSpPr>
+          <p:nvPr>
+            <p:ph type="sldImg"/>
+          </p:nvPr>
+        </p:nvSpPr>
+        <p:spPr/>
+      </p:sp>
+      <p:sp>
+        <p:nvSpPr>
+          <p:cNvPr id="3" name="Notes Placeholder 2"/>
+          <p:cNvSpPr>
+            <a:spLocks noGrp="1"/>
+          </p:cNvSpPr>
+          <p:nvPr>
+            <p:ph type="body" idx="1"/>
+          </p:nvPr>
+        </p:nvSpPr>
+        <p:spPr/>
+        <p:txBody>
+          <a:bodyPr/>
+          <a:lstStyle/>
+          <a:p>
+            <a:pPr marL="0" marR="0" lvl="0" indent="0" algn="l" defTabSz="914400" rtl="0" eaLnBrk="1" fontAlgn="auto" latinLnBrk="0" hangingPunct="1">
+              <a:lnSpc>
+                <a:spcPct val="100000"/>
+              </a:lnSpc>
+              <a:spcBef>
+                <a:spcPts val="0"/>
+              </a:spcBef>
+              <a:spcAft>
+                <a:spcPts val="0"/>
+              </a:spcAft>
+              <a:buClrTx/>
+              <a:buSzTx/>
+              <a:buFontTx/>
+              <a:buNone/>
+              <a:tabLst/>
+              <a:defRPr/>
+            </a:pPr>
+            <a:r>
+              <a:rPr lang="en-US" dirty="0"/>
+              <a:t>Ask: w</a:t>
+            </a:r>
+            <a:r>
+              <a:rPr lang="en-US" baseline="0" dirty="0"/>
+              <a:t>hat efficiency problems would we encounter if SQL Server simply followed logical processing order?</a:t>
+            </a:r>
+            <a:endParaRPr lang="en-US" dirty="0"/>
+          </a:p>
+          <a:p>
+            <a:endParaRPr lang="en-US" dirty="0"/>
+          </a:p>
+        </p:txBody>
+      </p:sp>
+      <p:sp>
+        <p:nvSpPr>
+          <p:cNvPr id="4" name="Slide Number Placeholder 3"/>
+          <p:cNvSpPr>
+            <a:spLocks noGrp="1"/>
+          </p:cNvSpPr>
+          <p:nvPr>
+            <p:ph type="sldNum" sz="quarter" idx="5"/>
+          </p:nvPr>
+        </p:nvSpPr>
+        <p:spPr/>
+        <p:txBody>
+          <a:bodyPr/>
+          <a:lstStyle/>
+          <a:p>
+            <a:fld id="{DDD65AC4-17B0-4E19-8496-B264E70A18D3}" type="slidenum">
+              <a:rPr lang="en-US" smtClean="0"/>
+              <a:t>14</a:t>
+            </a:fld>
+            <a:endParaRPr lang="en-US" dirty="0"/>
+          </a:p>
+        </p:txBody>
+      </p:sp>
+    </p:spTree>
+    <p:extLst>
+      <p:ext uri="{BB962C8B-B14F-4D97-AF65-F5344CB8AC3E}">
+        <p14:creationId xmlns:p14="http://schemas.microsoft.com/office/powerpoint/2010/main" val="3787927202"/>
+      </p:ext>
+    </p:extLst>
+  </p:cSld>
+  <p:clrMapOvr>
+    <a:masterClrMapping/>
+  </p:clrMapOvr>
+</p:notes>
+</file>
+
+<file path=ppt/notesSlides/notesSlide3.xml><?xml version="1.0" encoding="utf-8"?>
+<p:notes xmlns:a="http://schemas.openxmlformats.org/drawingml/2006/main" xmlns:r="http://schemas.openxmlformats.org/officeDocument/2006/relationships" xmlns:p="http://schemas.openxmlformats.org/presentationml/2006/main">
+  <p:cSld>
+    <p:spTree>
+      <p:nvGrpSpPr>
+        <p:cNvPr id="1" name=""/>
+        <p:cNvGrpSpPr/>
+        <p:nvPr/>
+      </p:nvGrpSpPr>
+      <p:grpSpPr>
+        <a:xfrm>
+          <a:off x="0" y="0"/>
+          <a:ext cx="0" cy="0"/>
+          <a:chOff x="0" y="0"/>
+          <a:chExt cx="0" cy="0"/>
+        </a:xfrm>
+      </p:grpSpPr>
+      <p:sp>
+        <p:nvSpPr>
+          <p:cNvPr id="2" name="Slide Image Placeholder 1"/>
+          <p:cNvSpPr>
+            <a:spLocks noGrp="1" noRot="1" noChangeAspect="1"/>
+          </p:cNvSpPr>
+          <p:nvPr>
+            <p:ph type="sldImg"/>
+          </p:nvPr>
+        </p:nvSpPr>
+        <p:spPr/>
+      </p:sp>
+      <p:sp>
+        <p:nvSpPr>
+          <p:cNvPr id="3" name="Notes Placeholder 2"/>
+          <p:cNvSpPr>
+            <a:spLocks noGrp="1"/>
+          </p:cNvSpPr>
+          <p:nvPr>
+            <p:ph type="body" idx="1"/>
+          </p:nvPr>
+        </p:nvSpPr>
+        <p:spPr/>
+        <p:txBody>
+          <a:bodyPr/>
+          <a:lstStyle/>
+          <a:p>
+            <a:r>
+              <a:rPr lang="en-US" dirty="0"/>
+              <a:t>As an</a:t>
+            </a:r>
+            <a:r>
+              <a:rPr lang="en-US" baseline="0" dirty="0"/>
+              <a:t> example, data type resolution with the UNION operator will ensure that data types between the upper expression are compatible with the lower expression.</a:t>
+            </a:r>
+          </a:p>
+          <a:p>
+            <a:endParaRPr lang="en-US" dirty="0"/>
+          </a:p>
+        </p:txBody>
+      </p:sp>
+      <p:sp>
+        <p:nvSpPr>
+          <p:cNvPr id="4" name="Slide Number Placeholder 3"/>
+          <p:cNvSpPr>
+            <a:spLocks noGrp="1"/>
+          </p:cNvSpPr>
+          <p:nvPr>
+            <p:ph type="sldNum" sz="quarter" idx="5"/>
+          </p:nvPr>
+        </p:nvSpPr>
+        <p:spPr/>
+        <p:txBody>
+          <a:bodyPr/>
+          <a:lstStyle/>
+          <a:p>
+            <a:fld id="{DDD65AC4-17B0-4E19-8496-B264E70A18D3}" type="slidenum">
+              <a:rPr lang="en-US" smtClean="0"/>
+              <a:t>22</a:t>
+            </a:fld>
+            <a:endParaRPr lang="en-US" dirty="0"/>
+          </a:p>
+        </p:txBody>
+      </p:sp>
+    </p:spTree>
+    <p:extLst>
+      <p:ext uri="{BB962C8B-B14F-4D97-AF65-F5344CB8AC3E}">
+        <p14:creationId xmlns:p14="http://schemas.microsoft.com/office/powerpoint/2010/main" val="1561718423"/>
+      </p:ext>
+    </p:extLst>
+  </p:cSld>
+  <p:clrMapOvr>
+    <a:masterClrMapping/>
+  </p:clrMapOvr>
+</p:notes>
+</file>
+
+<file path=ppt/notesSlides/notesSlide4.xml><?xml version="1.0" encoding="utf-8"?>
+<p:notes xmlns:a="http://schemas.openxmlformats.org/drawingml/2006/main" xmlns:r="http://schemas.openxmlformats.org/officeDocument/2006/relationships" xmlns:p="http://schemas.openxmlformats.org/presentationml/2006/main">
+  <p:cSld>
+    <p:spTree>
+      <p:nvGrpSpPr>
+        <p:cNvPr id="1" name=""/>
+        <p:cNvGrpSpPr/>
+        <p:nvPr/>
+      </p:nvGrpSpPr>
+      <p:grpSpPr>
+        <a:xfrm>
+          <a:off x="0" y="0"/>
+          <a:ext cx="0" cy="0"/>
+          <a:chOff x="0" y="0"/>
+          <a:chExt cx="0" cy="0"/>
+        </a:xfrm>
+      </p:grpSpPr>
+      <p:sp>
+        <p:nvSpPr>
+          <p:cNvPr id="2" name="Slide Image Placeholder 1"/>
+          <p:cNvSpPr>
+            <a:spLocks noGrp="1" noRot="1" noChangeAspect="1"/>
+          </p:cNvSpPr>
+          <p:nvPr>
+            <p:ph type="sldImg"/>
+          </p:nvPr>
+        </p:nvSpPr>
+        <p:spPr/>
+      </p:sp>
+      <p:sp>
+        <p:nvSpPr>
+          <p:cNvPr id="3" name="Notes Placeholder 2"/>
+          <p:cNvSpPr>
+            <a:spLocks noGrp="1"/>
+          </p:cNvSpPr>
+          <p:nvPr>
+            <p:ph type="body" idx="1"/>
+          </p:nvPr>
+        </p:nvSpPr>
+        <p:spPr/>
+        <p:txBody>
+          <a:bodyPr/>
+          <a:lstStyle/>
+          <a:p>
+            <a:pPr marL="0" marR="0" lvl="0" indent="0" algn="l" defTabSz="914400" rtl="0" eaLnBrk="1" fontAlgn="auto" latinLnBrk="0" hangingPunct="1">
+              <a:lnSpc>
+                <a:spcPct val="100000"/>
+              </a:lnSpc>
+              <a:spcBef>
+                <a:spcPts val="0"/>
+              </a:spcBef>
+              <a:spcAft>
+                <a:spcPts val="0"/>
+              </a:spcAft>
+              <a:buClrTx/>
+              <a:buSzTx/>
+              <a:buFontTx/>
+              <a:buNone/>
+              <a:tabLst/>
+              <a:defRPr/>
+            </a:pPr>
+            <a:r>
+              <a:rPr lang="en-US" baseline="0" dirty="0"/>
+              <a:t>Aggregate binding checks if invalid columns are referenced downstream of the GROUP BY logical processing step.</a:t>
+            </a:r>
+            <a:endParaRPr lang="en-US" dirty="0"/>
+          </a:p>
+          <a:p>
+            <a:endParaRPr lang="en-US" dirty="0"/>
+          </a:p>
+        </p:txBody>
+      </p:sp>
+      <p:sp>
+        <p:nvSpPr>
+          <p:cNvPr id="4" name="Slide Number Placeholder 3"/>
+          <p:cNvSpPr>
+            <a:spLocks noGrp="1"/>
+          </p:cNvSpPr>
+          <p:nvPr>
+            <p:ph type="sldNum" sz="quarter" idx="5"/>
+          </p:nvPr>
+        </p:nvSpPr>
+        <p:spPr/>
+        <p:txBody>
+          <a:bodyPr/>
+          <a:lstStyle/>
+          <a:p>
+            <a:fld id="{DDD65AC4-17B0-4E19-8496-B264E70A18D3}" type="slidenum">
+              <a:rPr lang="en-US" smtClean="0"/>
+              <a:t>23</a:t>
+            </a:fld>
+            <a:endParaRPr lang="en-US" dirty="0"/>
+          </a:p>
+        </p:txBody>
+      </p:sp>
+    </p:spTree>
+    <p:extLst>
+      <p:ext uri="{BB962C8B-B14F-4D97-AF65-F5344CB8AC3E}">
+        <p14:creationId xmlns:p14="http://schemas.microsoft.com/office/powerpoint/2010/main" val="2336874330"/>
+      </p:ext>
+    </p:extLst>
+  </p:cSld>
+  <p:clrMapOvr>
+    <a:masterClrMapping/>
+  </p:clrMapOvr>
+</p:notes>
+</file>
+
+<file path=ppt/notesSlides/notesSlide5.xml><?xml version="1.0" encoding="utf-8"?>
+<p:notes xmlns:a="http://schemas.openxmlformats.org/drawingml/2006/main" xmlns:r="http://schemas.openxmlformats.org/officeDocument/2006/relationships" xmlns:p="http://schemas.openxmlformats.org/presentationml/2006/main">
+  <p:cSld>
+    <p:spTree>
+      <p:nvGrpSpPr>
+        <p:cNvPr id="1" name=""/>
+        <p:cNvGrpSpPr/>
+        <p:nvPr/>
+      </p:nvGrpSpPr>
+      <p:grpSpPr>
+        <a:xfrm>
+          <a:off x="0" y="0"/>
+          <a:ext cx="0" cy="0"/>
+          <a:chOff x="0" y="0"/>
+          <a:chExt cx="0" cy="0"/>
+        </a:xfrm>
+      </p:grpSpPr>
+      <p:sp>
+        <p:nvSpPr>
+          <p:cNvPr id="2" name="Slide Image Placeholder 1"/>
+          <p:cNvSpPr>
+            <a:spLocks noGrp="1" noRot="1" noChangeAspect="1"/>
+          </p:cNvSpPr>
+          <p:nvPr>
+            <p:ph type="sldImg"/>
+          </p:nvPr>
+        </p:nvSpPr>
+        <p:spPr/>
+      </p:sp>
+      <p:sp>
+        <p:nvSpPr>
+          <p:cNvPr id="3" name="Notes Placeholder 2"/>
+          <p:cNvSpPr>
+            <a:spLocks noGrp="1"/>
+          </p:cNvSpPr>
+          <p:nvPr>
+            <p:ph type="body" idx="1"/>
+          </p:nvPr>
+        </p:nvSpPr>
+        <p:spPr/>
+        <p:txBody>
+          <a:bodyPr/>
+          <a:lstStyle/>
+          <a:p>
+            <a:r>
+              <a:rPr lang="en-US" baseline="0" dirty="0"/>
+              <a:t>The concept of Statistics and Cardinality Estimation is a complex topic to itself.  It is important to note that the CE underwent a significant re-write starting in SQL Server 2014 which can lead to very different plans being selected.</a:t>
+            </a:r>
+          </a:p>
+          <a:p>
+            <a:endParaRPr lang="en-US" baseline="0" dirty="0"/>
+          </a:p>
+          <a:p>
+            <a:pPr marL="0" marR="0" lvl="0" indent="0" algn="l" defTabSz="914400" rtl="0" eaLnBrk="1" fontAlgn="auto" latinLnBrk="0" hangingPunct="1">
+              <a:lnSpc>
+                <a:spcPct val="100000"/>
+              </a:lnSpc>
+              <a:spcBef>
+                <a:spcPts val="0"/>
+              </a:spcBef>
+              <a:spcAft>
+                <a:spcPts val="0"/>
+              </a:spcAft>
+              <a:buClrTx/>
+              <a:buSzTx/>
+              <a:buFontTx/>
+              <a:buNone/>
+              <a:tabLst/>
+              <a:defRPr/>
+            </a:pPr>
+            <a:r>
+              <a:rPr lang="en-US" dirty="0"/>
+              <a:t>Examples of physical properties: heap</a:t>
+            </a:r>
+            <a:r>
+              <a:rPr lang="en-US" baseline="0" dirty="0"/>
+              <a:t> vs. clustered </a:t>
+            </a:r>
+            <a:r>
+              <a:rPr lang="en-US" baseline="0" dirty="0" err="1"/>
+              <a:t>idx</a:t>
+            </a:r>
+            <a:r>
+              <a:rPr lang="en-US" baseline="0" dirty="0"/>
+              <a:t>, </a:t>
+            </a:r>
+            <a:r>
+              <a:rPr lang="en-US" baseline="0" dirty="0" err="1"/>
+              <a:t>nonclustered</a:t>
+            </a:r>
+            <a:r>
+              <a:rPr lang="en-US" baseline="0" dirty="0"/>
+              <a:t> </a:t>
+            </a:r>
+            <a:r>
+              <a:rPr lang="en-US" baseline="0" dirty="0" err="1"/>
+              <a:t>idx</a:t>
+            </a:r>
+            <a:r>
+              <a:rPr lang="en-US" baseline="0" dirty="0"/>
+              <a:t>, sort orders, etc.</a:t>
+            </a:r>
+            <a:endParaRPr lang="en-US" dirty="0"/>
+          </a:p>
+          <a:p>
+            <a:endParaRPr lang="en-US" dirty="0"/>
+          </a:p>
+        </p:txBody>
+      </p:sp>
+      <p:sp>
+        <p:nvSpPr>
+          <p:cNvPr id="4" name="Slide Number Placeholder 3"/>
+          <p:cNvSpPr>
+            <a:spLocks noGrp="1"/>
+          </p:cNvSpPr>
+          <p:nvPr>
+            <p:ph type="sldNum" sz="quarter" idx="5"/>
+          </p:nvPr>
+        </p:nvSpPr>
+        <p:spPr/>
+        <p:txBody>
+          <a:bodyPr/>
+          <a:lstStyle/>
+          <a:p>
+            <a:fld id="{DDD65AC4-17B0-4E19-8496-B264E70A18D3}" type="slidenum">
+              <a:rPr lang="en-US" smtClean="0"/>
+              <a:t>32</a:t>
+            </a:fld>
+            <a:endParaRPr lang="en-US" dirty="0"/>
+          </a:p>
+        </p:txBody>
+      </p:sp>
+    </p:spTree>
+    <p:extLst>
+      <p:ext uri="{BB962C8B-B14F-4D97-AF65-F5344CB8AC3E}">
+        <p14:creationId xmlns:p14="http://schemas.microsoft.com/office/powerpoint/2010/main" val="3401104005"/>
+      </p:ext>
+    </p:extLst>
+  </p:cSld>
+  <p:clrMapOvr>
+    <a:masterClrMapping/>
+  </p:clrMapOvr>
+</p:notes>
+</file>
+
+<file path=ppt/notesSlides/notesSlide6.xml><?xml version="1.0" encoding="utf-8"?>
+<p:notes xmlns:a="http://schemas.openxmlformats.org/drawingml/2006/main" xmlns:r="http://schemas.openxmlformats.org/officeDocument/2006/relationships" xmlns:p="http://schemas.openxmlformats.org/presentationml/2006/main">
+  <p:cSld>
+    <p:spTree>
+      <p:nvGrpSpPr>
+        <p:cNvPr id="1" name=""/>
+        <p:cNvGrpSpPr/>
+        <p:nvPr/>
+      </p:nvGrpSpPr>
+      <p:grpSpPr>
+        <a:xfrm>
+          <a:off x="0" y="0"/>
+          <a:ext cx="0" cy="0"/>
+          <a:chOff x="0" y="0"/>
+          <a:chExt cx="0" cy="0"/>
+        </a:xfrm>
+      </p:grpSpPr>
+      <p:sp>
+        <p:nvSpPr>
+          <p:cNvPr id="2" name="Slide Image Placeholder 1"/>
+          <p:cNvSpPr>
+            <a:spLocks noGrp="1" noRot="1" noChangeAspect="1"/>
+          </p:cNvSpPr>
+          <p:nvPr>
+            <p:ph type="sldImg"/>
+          </p:nvPr>
+        </p:nvSpPr>
+        <p:spPr/>
+      </p:sp>
+      <p:sp>
+        <p:nvSpPr>
+          <p:cNvPr id="3" name="Notes Placeholder 2"/>
+          <p:cNvSpPr>
+            <a:spLocks noGrp="1"/>
+          </p:cNvSpPr>
+          <p:nvPr>
+            <p:ph type="body" idx="1"/>
+          </p:nvPr>
+        </p:nvSpPr>
+        <p:spPr/>
+        <p:txBody>
+          <a:bodyPr/>
+          <a:lstStyle/>
+          <a:p>
+            <a:r>
+              <a:rPr lang="en-US" dirty="0"/>
+              <a:t>A trivial plan is one which can only be executed</a:t>
+            </a:r>
+            <a:r>
+              <a:rPr lang="en-US" baseline="0" dirty="0"/>
+              <a:t> in one possible way.  A common example is select * from table, or select * from table where col = value (if there are no index on “col”).  The query can be relatively complex, but only contain one table.  Having a subquery or a an inequality predicate automatically make the query non-trivial.  Trivial plans can be avoided using TF8757.</a:t>
+            </a:r>
+          </a:p>
+          <a:p>
+            <a:endParaRPr lang="en-US" baseline="0" dirty="0"/>
+          </a:p>
+          <a:p>
+            <a:r>
+              <a:rPr lang="en-US" baseline="0" dirty="0"/>
+              <a:t>The Optimization Level property on a query plan will be “Trivial” or “Full”</a:t>
+            </a:r>
+          </a:p>
+          <a:p>
+            <a:endParaRPr lang="en-US" dirty="0"/>
+          </a:p>
+        </p:txBody>
+      </p:sp>
+      <p:sp>
+        <p:nvSpPr>
+          <p:cNvPr id="4" name="Slide Number Placeholder 3"/>
+          <p:cNvSpPr>
+            <a:spLocks noGrp="1"/>
+          </p:cNvSpPr>
+          <p:nvPr>
+            <p:ph type="sldNum" sz="quarter" idx="5"/>
+          </p:nvPr>
+        </p:nvSpPr>
+        <p:spPr/>
+        <p:txBody>
+          <a:bodyPr/>
+          <a:lstStyle/>
+          <a:p>
+            <a:fld id="{DDD65AC4-17B0-4E19-8496-B264E70A18D3}" type="slidenum">
+              <a:rPr lang="en-US" smtClean="0"/>
+              <a:t>33</a:t>
+            </a:fld>
+            <a:endParaRPr lang="en-US" dirty="0"/>
+          </a:p>
+        </p:txBody>
+      </p:sp>
+    </p:spTree>
+    <p:extLst>
+      <p:ext uri="{BB962C8B-B14F-4D97-AF65-F5344CB8AC3E}">
+        <p14:creationId xmlns:p14="http://schemas.microsoft.com/office/powerpoint/2010/main" val="3084407758"/>
+      </p:ext>
+    </p:extLst>
+  </p:cSld>
+  <p:clrMapOvr>
+    <a:masterClrMapping/>
+  </p:clrMapOvr>
+</p:notes>
+</file>
+
+<file path=ppt/notesSlides/notesSlide7.xml><?xml version="1.0" encoding="utf-8"?>
+<p:notes xmlns:a="http://schemas.openxmlformats.org/drawingml/2006/main" xmlns:r="http://schemas.openxmlformats.org/officeDocument/2006/relationships" xmlns:p="http://schemas.openxmlformats.org/presentationml/2006/main">
+  <p:cSld>
+    <p:spTree>
+      <p:nvGrpSpPr>
+        <p:cNvPr id="1" name=""/>
+        <p:cNvGrpSpPr/>
+        <p:nvPr/>
+      </p:nvGrpSpPr>
+      <p:grpSpPr>
+        <a:xfrm>
+          <a:off x="0" y="0"/>
+          <a:ext cx="0" cy="0"/>
+          <a:chOff x="0" y="0"/>
+          <a:chExt cx="0" cy="0"/>
+        </a:xfrm>
+      </p:grpSpPr>
+      <p:sp>
+        <p:nvSpPr>
+          <p:cNvPr id="2" name="Slide Image Placeholder 1"/>
+          <p:cNvSpPr>
+            <a:spLocks noGrp="1" noRot="1" noChangeAspect="1"/>
+          </p:cNvSpPr>
+          <p:nvPr>
+            <p:ph type="sldImg"/>
+          </p:nvPr>
+        </p:nvSpPr>
+        <p:spPr/>
+      </p:sp>
+      <p:sp>
+        <p:nvSpPr>
+          <p:cNvPr id="3" name="Notes Placeholder 2"/>
+          <p:cNvSpPr>
+            <a:spLocks noGrp="1"/>
+          </p:cNvSpPr>
+          <p:nvPr>
+            <p:ph type="body" idx="1"/>
+          </p:nvPr>
+        </p:nvSpPr>
+        <p:spPr/>
+        <p:txBody>
+          <a:bodyPr/>
+          <a:lstStyle/>
+          <a:p>
+            <a:r>
+              <a:rPr lang="en-US" dirty="0"/>
+              <a:t>Unlike </a:t>
+            </a:r>
+            <a:r>
+              <a:rPr lang="en-US" dirty="0" err="1"/>
+              <a:t>sys.dm_exec_query_optimizer_info</a:t>
+            </a:r>
+            <a:r>
+              <a:rPr lang="en-US" dirty="0"/>
+              <a:t>,</a:t>
+            </a:r>
+            <a:r>
+              <a:rPr lang="en-US" baseline="0" dirty="0"/>
+              <a:t> this one is completely undocumented.</a:t>
+            </a:r>
+          </a:p>
+          <a:p>
+            <a:endParaRPr lang="en-US" baseline="0" dirty="0"/>
+          </a:p>
+          <a:p>
+            <a:r>
+              <a:rPr lang="en-US" baseline="0" dirty="0"/>
+              <a:t>“Promise Total” values are, presumably, unitless.</a:t>
+            </a:r>
+          </a:p>
+          <a:p>
+            <a:r>
+              <a:rPr lang="en-US" baseline="0" dirty="0"/>
+              <a:t>Promised = number of times rule’s usefulness evaluated; </a:t>
+            </a:r>
+            <a:r>
+              <a:rPr lang="en-US" baseline="0" dirty="0" err="1"/>
+              <a:t>promise_total</a:t>
+            </a:r>
+            <a:r>
+              <a:rPr lang="en-US" baseline="0" dirty="0"/>
+              <a:t> = sum of computed “value”</a:t>
+            </a:r>
+            <a:endParaRPr lang="en-US" dirty="0"/>
+          </a:p>
+          <a:p>
+            <a:endParaRPr lang="en-US" dirty="0"/>
+          </a:p>
+        </p:txBody>
+      </p:sp>
+      <p:sp>
+        <p:nvSpPr>
+          <p:cNvPr id="4" name="Slide Number Placeholder 3"/>
+          <p:cNvSpPr>
+            <a:spLocks noGrp="1"/>
+          </p:cNvSpPr>
+          <p:nvPr>
+            <p:ph type="sldNum" sz="quarter" idx="5"/>
+          </p:nvPr>
+        </p:nvSpPr>
+        <p:spPr/>
+        <p:txBody>
+          <a:bodyPr/>
+          <a:lstStyle/>
+          <a:p>
+            <a:fld id="{DDD65AC4-17B0-4E19-8496-B264E70A18D3}" type="slidenum">
+              <a:rPr lang="en-US" smtClean="0"/>
+              <a:t>40</a:t>
+            </a:fld>
+            <a:endParaRPr lang="en-US" dirty="0"/>
+          </a:p>
+        </p:txBody>
+      </p:sp>
+    </p:spTree>
+    <p:extLst>
+      <p:ext uri="{BB962C8B-B14F-4D97-AF65-F5344CB8AC3E}">
+        <p14:creationId xmlns:p14="http://schemas.microsoft.com/office/powerpoint/2010/main" val="2375617911"/>
+      </p:ext>
+    </p:extLst>
+  </p:cSld>
+  <p:clrMapOvr>
+    <a:masterClrMapping/>
+  </p:clrMapOvr>
+</p:notes>
+</file>
+
+<file path=ppt/notesSlides/notesSlide8.xml><?xml version="1.0" encoding="utf-8"?>
+<p:notes xmlns:a="http://schemas.openxmlformats.org/drawingml/2006/main" xmlns:r="http://schemas.openxmlformats.org/officeDocument/2006/relationships" xmlns:p="http://schemas.openxmlformats.org/presentationml/2006/main">
+  <p:cSld>
+    <p:spTree>
+      <p:nvGrpSpPr>
+        <p:cNvPr id="1" name=""/>
+        <p:cNvGrpSpPr/>
+        <p:nvPr/>
+      </p:nvGrpSpPr>
+      <p:grpSpPr>
+        <a:xfrm>
+          <a:off x="0" y="0"/>
+          <a:ext cx="0" cy="0"/>
+          <a:chOff x="0" y="0"/>
+          <a:chExt cx="0" cy="0"/>
+        </a:xfrm>
+      </p:grpSpPr>
+      <p:sp>
+        <p:nvSpPr>
+          <p:cNvPr id="2" name="Slide Image Placeholder 1"/>
+          <p:cNvSpPr>
+            <a:spLocks noGrp="1" noRot="1" noChangeAspect="1"/>
+          </p:cNvSpPr>
+          <p:nvPr>
+            <p:ph type="sldImg"/>
+          </p:nvPr>
+        </p:nvSpPr>
+        <p:spPr/>
+      </p:sp>
+      <p:sp>
+        <p:nvSpPr>
+          <p:cNvPr id="3" name="Notes Placeholder 2"/>
+          <p:cNvSpPr>
+            <a:spLocks noGrp="1"/>
+          </p:cNvSpPr>
+          <p:nvPr>
+            <p:ph type="body" idx="1"/>
+          </p:nvPr>
+        </p:nvSpPr>
+        <p:spPr/>
+        <p:txBody>
+          <a:bodyPr/>
+          <a:lstStyle/>
+          <a:p>
+            <a:r>
+              <a:rPr lang="en-US" dirty="0"/>
+              <a:t>One copy of the memo structure is created for each optimization and is then destroyed when optimization is completed.</a:t>
+            </a:r>
+          </a:p>
+          <a:p>
+            <a:r>
+              <a:rPr lang="en-US" dirty="0"/>
+              <a:t>Alternatives can be either</a:t>
+            </a:r>
+            <a:r>
+              <a:rPr lang="en-US" baseline="0" dirty="0"/>
+              <a:t> logical or physical.</a:t>
+            </a:r>
+          </a:p>
+          <a:p>
+            <a:r>
+              <a:rPr lang="en-US" baseline="0" dirty="0"/>
+              <a:t>New groups can be created as options are explored.</a:t>
+            </a:r>
+          </a:p>
+          <a:p>
+            <a:endParaRPr lang="en-US" dirty="0"/>
+          </a:p>
+        </p:txBody>
+      </p:sp>
+      <p:sp>
+        <p:nvSpPr>
+          <p:cNvPr id="4" name="Slide Number Placeholder 3"/>
+          <p:cNvSpPr>
+            <a:spLocks noGrp="1"/>
+          </p:cNvSpPr>
+          <p:nvPr>
+            <p:ph type="sldNum" sz="quarter" idx="5"/>
+          </p:nvPr>
+        </p:nvSpPr>
+        <p:spPr/>
+        <p:txBody>
+          <a:bodyPr/>
+          <a:lstStyle/>
+          <a:p>
+            <a:fld id="{DDD65AC4-17B0-4E19-8496-B264E70A18D3}" type="slidenum">
+              <a:rPr lang="en-US" smtClean="0"/>
+              <a:t>42</a:t>
+            </a:fld>
+            <a:endParaRPr lang="en-US" dirty="0"/>
+          </a:p>
+        </p:txBody>
+      </p:sp>
+    </p:spTree>
+    <p:extLst>
+      <p:ext uri="{BB962C8B-B14F-4D97-AF65-F5344CB8AC3E}">
+        <p14:creationId xmlns:p14="http://schemas.microsoft.com/office/powerpoint/2010/main" val="963321369"/>
+      </p:ext>
+    </p:extLst>
+  </p:cSld>
+  <p:clrMapOvr>
+    <a:masterClrMapping/>
+  </p:clrMapOvr>
+</p:notes>
 </file>
 
 <file path=ppt/slideLayouts/slideLayout1.xml><?xml version="1.0" encoding="utf-8"?>

</xml_diff>